<commit_message>
SQlite support SQLAlchemy support Temporary CCDB on doesn't compile on linux
git-svn-id: https://phys12svn.jlab.org/repos/trunk/ccdb@1054 c5ed4466-e916-0410-8347-b3263e9c103d
</commit_message>
<xml_diff>
--- a/doc/ccdb_design_romanovda_10_06_2011.pptx
+++ b/doc/ccdb_design_romanovda_10_06_2011.pptx
@@ -45,7 +45,7 @@
     <p:sldId id="317" r:id="rId36"/>
   </p:sldIdLst>
   <p:sldSz cx="9144000" cy="6858000" type="screen4x3"/>
-  <p:notesSz cx="6858000" cy="9144000"/>
+  <p:notesSz cx="7315200" cy="9601200"/>
   <p:defaultTextStyle>
     <a:defPPr>
       <a:defRPr lang="ru-RU"/>
@@ -225,3123 +225,6 @@
 </p:presentation>
 </file>
 
-<file path=ppt/diagrams/colors1.xml><?xml version="1.0" encoding="utf-8"?>
-<dgm:colorsDef xmlns:dgm="http://schemas.openxmlformats.org/drawingml/2006/diagram" xmlns:a="http://schemas.openxmlformats.org/drawingml/2006/main" uniqueId="urn:microsoft.com/office/officeart/2005/8/colors/accent1_2">
-  <dgm:title val=""/>
-  <dgm:desc val=""/>
-  <dgm:catLst>
-    <dgm:cat type="accent1" pri="11200"/>
-  </dgm:catLst>
-  <dgm:styleLbl name="node0">
-    <dgm:fillClrLst meth="repeat">
-      <a:schemeClr val="accent1"/>
-    </dgm:fillClrLst>
-    <dgm:linClrLst meth="repeat">
-      <a:schemeClr val="lt1"/>
-    </dgm:linClrLst>
-    <dgm:effectClrLst/>
-    <dgm:txLinClrLst/>
-    <dgm:txFillClrLst/>
-    <dgm:txEffectClrLst/>
-  </dgm:styleLbl>
-  <dgm:styleLbl name="alignNode1">
-    <dgm:fillClrLst meth="repeat">
-      <a:schemeClr val="accent1"/>
-    </dgm:fillClrLst>
-    <dgm:linClrLst meth="repeat">
-      <a:schemeClr val="accent1"/>
-    </dgm:linClrLst>
-    <dgm:effectClrLst/>
-    <dgm:txLinClrLst/>
-    <dgm:txFillClrLst/>
-    <dgm:txEffectClrLst/>
-  </dgm:styleLbl>
-  <dgm:styleLbl name="node1">
-    <dgm:fillClrLst meth="repeat">
-      <a:schemeClr val="accent1"/>
-    </dgm:fillClrLst>
-    <dgm:linClrLst meth="repeat">
-      <a:schemeClr val="lt1"/>
-    </dgm:linClrLst>
-    <dgm:effectClrLst/>
-    <dgm:txLinClrLst/>
-    <dgm:txFillClrLst/>
-    <dgm:txEffectClrLst/>
-  </dgm:styleLbl>
-  <dgm:styleLbl name="lnNode1">
-    <dgm:fillClrLst meth="repeat">
-      <a:schemeClr val="accent1"/>
-    </dgm:fillClrLst>
-    <dgm:linClrLst meth="repeat">
-      <a:schemeClr val="lt1"/>
-    </dgm:linClrLst>
-    <dgm:effectClrLst/>
-    <dgm:txLinClrLst/>
-    <dgm:txFillClrLst/>
-    <dgm:txEffectClrLst/>
-  </dgm:styleLbl>
-  <dgm:styleLbl name="vennNode1">
-    <dgm:fillClrLst meth="repeat">
-      <a:schemeClr val="accent1">
-        <a:alpha val="50000"/>
-      </a:schemeClr>
-    </dgm:fillClrLst>
-    <dgm:linClrLst meth="repeat">
-      <a:schemeClr val="lt1"/>
-    </dgm:linClrLst>
-    <dgm:effectClrLst/>
-    <dgm:txLinClrLst/>
-    <dgm:txFillClrLst/>
-    <dgm:txEffectClrLst/>
-  </dgm:styleLbl>
-  <dgm:styleLbl name="node2">
-    <dgm:fillClrLst meth="repeat">
-      <a:schemeClr val="accent1"/>
-    </dgm:fillClrLst>
-    <dgm:linClrLst meth="repeat">
-      <a:schemeClr val="lt1"/>
-    </dgm:linClrLst>
-    <dgm:effectClrLst/>
-    <dgm:txLinClrLst/>
-    <dgm:txFillClrLst/>
-    <dgm:txEffectClrLst/>
-  </dgm:styleLbl>
-  <dgm:styleLbl name="node3">
-    <dgm:fillClrLst meth="repeat">
-      <a:schemeClr val="accent1"/>
-    </dgm:fillClrLst>
-    <dgm:linClrLst meth="repeat">
-      <a:schemeClr val="lt1"/>
-    </dgm:linClrLst>
-    <dgm:effectClrLst/>
-    <dgm:txLinClrLst/>
-    <dgm:txFillClrLst/>
-    <dgm:txEffectClrLst/>
-  </dgm:styleLbl>
-  <dgm:styleLbl name="node4">
-    <dgm:fillClrLst meth="repeat">
-      <a:schemeClr val="accent1"/>
-    </dgm:fillClrLst>
-    <dgm:linClrLst meth="repeat">
-      <a:schemeClr val="lt1"/>
-    </dgm:linClrLst>
-    <dgm:effectClrLst/>
-    <dgm:txLinClrLst/>
-    <dgm:txFillClrLst/>
-    <dgm:txEffectClrLst/>
-  </dgm:styleLbl>
-  <dgm:styleLbl name="fgImgPlace1">
-    <dgm:fillClrLst meth="repeat">
-      <a:schemeClr val="accent1">
-        <a:tint val="50000"/>
-      </a:schemeClr>
-    </dgm:fillClrLst>
-    <dgm:linClrLst meth="repeat">
-      <a:schemeClr val="lt1"/>
-    </dgm:linClrLst>
-    <dgm:effectClrLst/>
-    <dgm:txLinClrLst/>
-    <dgm:txFillClrLst meth="repeat">
-      <a:schemeClr val="lt1"/>
-    </dgm:txFillClrLst>
-    <dgm:txEffectClrLst/>
-  </dgm:styleLbl>
-  <dgm:styleLbl name="alignImgPlace1">
-    <dgm:fillClrLst meth="repeat">
-      <a:schemeClr val="accent1">
-        <a:tint val="50000"/>
-      </a:schemeClr>
-    </dgm:fillClrLst>
-    <dgm:linClrLst meth="repeat">
-      <a:schemeClr val="lt1"/>
-    </dgm:linClrLst>
-    <dgm:effectClrLst/>
-    <dgm:txLinClrLst/>
-    <dgm:txFillClrLst meth="repeat">
-      <a:schemeClr val="lt1"/>
-    </dgm:txFillClrLst>
-    <dgm:txEffectClrLst/>
-  </dgm:styleLbl>
-  <dgm:styleLbl name="bgImgPlace1">
-    <dgm:fillClrLst meth="repeat">
-      <a:schemeClr val="accent1">
-        <a:tint val="50000"/>
-      </a:schemeClr>
-    </dgm:fillClrLst>
-    <dgm:linClrLst meth="repeat">
-      <a:schemeClr val="lt1"/>
-    </dgm:linClrLst>
-    <dgm:effectClrLst/>
-    <dgm:txLinClrLst/>
-    <dgm:txFillClrLst meth="repeat">
-      <a:schemeClr val="lt1"/>
-    </dgm:txFillClrLst>
-    <dgm:txEffectClrLst/>
-  </dgm:styleLbl>
-  <dgm:styleLbl name="sibTrans2D1">
-    <dgm:fillClrLst meth="repeat">
-      <a:schemeClr val="accent1">
-        <a:tint val="60000"/>
-      </a:schemeClr>
-    </dgm:fillClrLst>
-    <dgm:linClrLst meth="repeat">
-      <a:schemeClr val="accent1">
-        <a:tint val="60000"/>
-      </a:schemeClr>
-    </dgm:linClrLst>
-    <dgm:effectClrLst/>
-    <dgm:txLinClrLst/>
-    <dgm:txFillClrLst/>
-    <dgm:txEffectClrLst/>
-  </dgm:styleLbl>
-  <dgm:styleLbl name="fgSibTrans2D1">
-    <dgm:fillClrLst meth="repeat">
-      <a:schemeClr val="accent1">
-        <a:tint val="60000"/>
-      </a:schemeClr>
-    </dgm:fillClrLst>
-    <dgm:linClrLst meth="repeat">
-      <a:schemeClr val="accent1">
-        <a:tint val="60000"/>
-      </a:schemeClr>
-    </dgm:linClrLst>
-    <dgm:effectClrLst/>
-    <dgm:txLinClrLst/>
-    <dgm:txFillClrLst/>
-    <dgm:txEffectClrLst/>
-  </dgm:styleLbl>
-  <dgm:styleLbl name="bgSibTrans2D1">
-    <dgm:fillClrLst meth="repeat">
-      <a:schemeClr val="accent1">
-        <a:tint val="60000"/>
-      </a:schemeClr>
-    </dgm:fillClrLst>
-    <dgm:linClrLst meth="repeat">
-      <a:schemeClr val="accent1">
-        <a:tint val="60000"/>
-      </a:schemeClr>
-    </dgm:linClrLst>
-    <dgm:effectClrLst/>
-    <dgm:txLinClrLst/>
-    <dgm:txFillClrLst/>
-    <dgm:txEffectClrLst/>
-  </dgm:styleLbl>
-  <dgm:styleLbl name="sibTrans1D1">
-    <dgm:fillClrLst meth="repeat">
-      <a:schemeClr val="accent1"/>
-    </dgm:fillClrLst>
-    <dgm:linClrLst meth="repeat">
-      <a:schemeClr val="accent1"/>
-    </dgm:linClrLst>
-    <dgm:effectClrLst/>
-    <dgm:txLinClrLst/>
-    <dgm:txFillClrLst meth="repeat">
-      <a:schemeClr val="tx1"/>
-    </dgm:txFillClrLst>
-    <dgm:txEffectClrLst/>
-  </dgm:styleLbl>
-  <dgm:styleLbl name="callout">
-    <dgm:fillClrLst meth="repeat">
-      <a:schemeClr val="accent1"/>
-    </dgm:fillClrLst>
-    <dgm:linClrLst meth="repeat">
-      <a:schemeClr val="accent1">
-        <a:tint val="50000"/>
-      </a:schemeClr>
-    </dgm:linClrLst>
-    <dgm:effectClrLst/>
-    <dgm:txLinClrLst/>
-    <dgm:txFillClrLst meth="repeat">
-      <a:schemeClr val="tx1"/>
-    </dgm:txFillClrLst>
-    <dgm:txEffectClrLst/>
-  </dgm:styleLbl>
-  <dgm:styleLbl name="asst0">
-    <dgm:fillClrLst meth="repeat">
-      <a:schemeClr val="accent1"/>
-    </dgm:fillClrLst>
-    <dgm:linClrLst meth="repeat">
-      <a:schemeClr val="lt1"/>
-    </dgm:linClrLst>
-    <dgm:effectClrLst/>
-    <dgm:txLinClrLst/>
-    <dgm:txFillClrLst/>
-    <dgm:txEffectClrLst/>
-  </dgm:styleLbl>
-  <dgm:styleLbl name="asst1">
-    <dgm:fillClrLst meth="repeat">
-      <a:schemeClr val="accent1"/>
-    </dgm:fillClrLst>
-    <dgm:linClrLst meth="repeat">
-      <a:schemeClr val="lt1"/>
-    </dgm:linClrLst>
-    <dgm:effectClrLst/>
-    <dgm:txLinClrLst/>
-    <dgm:txFillClrLst/>
-    <dgm:txEffectClrLst/>
-  </dgm:styleLbl>
-  <dgm:styleLbl name="asst2">
-    <dgm:fillClrLst meth="repeat">
-      <a:schemeClr val="accent1"/>
-    </dgm:fillClrLst>
-    <dgm:linClrLst meth="repeat">
-      <a:schemeClr val="lt1"/>
-    </dgm:linClrLst>
-    <dgm:effectClrLst/>
-    <dgm:txLinClrLst/>
-    <dgm:txFillClrLst/>
-    <dgm:txEffectClrLst/>
-  </dgm:styleLbl>
-  <dgm:styleLbl name="asst3">
-    <dgm:fillClrLst meth="repeat">
-      <a:schemeClr val="accent1"/>
-    </dgm:fillClrLst>
-    <dgm:linClrLst meth="repeat">
-      <a:schemeClr val="lt1"/>
-    </dgm:linClrLst>
-    <dgm:effectClrLst/>
-    <dgm:txLinClrLst/>
-    <dgm:txFillClrLst/>
-    <dgm:txEffectClrLst/>
-  </dgm:styleLbl>
-  <dgm:styleLbl name="asst4">
-    <dgm:fillClrLst meth="repeat">
-      <a:schemeClr val="accent1"/>
-    </dgm:fillClrLst>
-    <dgm:linClrLst meth="repeat">
-      <a:schemeClr val="lt1"/>
-    </dgm:linClrLst>
-    <dgm:effectClrLst/>
-    <dgm:txLinClrLst/>
-    <dgm:txFillClrLst/>
-    <dgm:txEffectClrLst/>
-  </dgm:styleLbl>
-  <dgm:styleLbl name="parChTrans2D1">
-    <dgm:fillClrLst meth="repeat">
-      <a:schemeClr val="accent1">
-        <a:tint val="60000"/>
-      </a:schemeClr>
-    </dgm:fillClrLst>
-    <dgm:linClrLst meth="repeat">
-      <a:schemeClr val="accent1">
-        <a:tint val="60000"/>
-      </a:schemeClr>
-    </dgm:linClrLst>
-    <dgm:effectClrLst/>
-    <dgm:txLinClrLst/>
-    <dgm:txFillClrLst meth="repeat">
-      <a:schemeClr val="lt1"/>
-    </dgm:txFillClrLst>
-    <dgm:txEffectClrLst/>
-  </dgm:styleLbl>
-  <dgm:styleLbl name="parChTrans2D2">
-    <dgm:fillClrLst meth="repeat">
-      <a:schemeClr val="accent1"/>
-    </dgm:fillClrLst>
-    <dgm:linClrLst meth="repeat">
-      <a:schemeClr val="accent1"/>
-    </dgm:linClrLst>
-    <dgm:effectClrLst/>
-    <dgm:txLinClrLst/>
-    <dgm:txFillClrLst meth="repeat">
-      <a:schemeClr val="lt1"/>
-    </dgm:txFillClrLst>
-    <dgm:txEffectClrLst/>
-  </dgm:styleLbl>
-  <dgm:styleLbl name="parChTrans2D3">
-    <dgm:fillClrLst meth="repeat">
-      <a:schemeClr val="accent1"/>
-    </dgm:fillClrLst>
-    <dgm:linClrLst meth="repeat">
-      <a:schemeClr val="accent1"/>
-    </dgm:linClrLst>
-    <dgm:effectClrLst/>
-    <dgm:txLinClrLst/>
-    <dgm:txFillClrLst meth="repeat">
-      <a:schemeClr val="lt1"/>
-    </dgm:txFillClrLst>
-    <dgm:txEffectClrLst/>
-  </dgm:styleLbl>
-  <dgm:styleLbl name="parChTrans2D4">
-    <dgm:fillClrLst meth="repeat">
-      <a:schemeClr val="accent1"/>
-    </dgm:fillClrLst>
-    <dgm:linClrLst meth="repeat">
-      <a:schemeClr val="accent1"/>
-    </dgm:linClrLst>
-    <dgm:effectClrLst/>
-    <dgm:txLinClrLst/>
-    <dgm:txFillClrLst meth="repeat">
-      <a:schemeClr val="lt1"/>
-    </dgm:txFillClrLst>
-    <dgm:txEffectClrLst/>
-  </dgm:styleLbl>
-  <dgm:styleLbl name="parChTrans1D1">
-    <dgm:fillClrLst meth="repeat">
-      <a:schemeClr val="accent1"/>
-    </dgm:fillClrLst>
-    <dgm:linClrLst meth="repeat">
-      <a:schemeClr val="accent1">
-        <a:shade val="60000"/>
-      </a:schemeClr>
-    </dgm:linClrLst>
-    <dgm:effectClrLst/>
-    <dgm:txLinClrLst/>
-    <dgm:txFillClrLst meth="repeat">
-      <a:schemeClr val="tx1"/>
-    </dgm:txFillClrLst>
-    <dgm:txEffectClrLst/>
-  </dgm:styleLbl>
-  <dgm:styleLbl name="parChTrans1D2">
-    <dgm:fillClrLst meth="repeat">
-      <a:schemeClr val="accent1"/>
-    </dgm:fillClrLst>
-    <dgm:linClrLst meth="repeat">
-      <a:schemeClr val="accent1">
-        <a:shade val="60000"/>
-      </a:schemeClr>
-    </dgm:linClrLst>
-    <dgm:effectClrLst/>
-    <dgm:txLinClrLst/>
-    <dgm:txFillClrLst meth="repeat">
-      <a:schemeClr val="tx1"/>
-    </dgm:txFillClrLst>
-    <dgm:txEffectClrLst/>
-  </dgm:styleLbl>
-  <dgm:styleLbl name="parChTrans1D3">
-    <dgm:fillClrLst meth="repeat">
-      <a:schemeClr val="accent1"/>
-    </dgm:fillClrLst>
-    <dgm:linClrLst meth="repeat">
-      <a:schemeClr val="accent1">
-        <a:shade val="80000"/>
-      </a:schemeClr>
-    </dgm:linClrLst>
-    <dgm:effectClrLst/>
-    <dgm:txLinClrLst/>
-    <dgm:txFillClrLst meth="repeat">
-      <a:schemeClr val="tx1"/>
-    </dgm:txFillClrLst>
-    <dgm:txEffectClrLst/>
-  </dgm:styleLbl>
-  <dgm:styleLbl name="parChTrans1D4">
-    <dgm:fillClrLst meth="repeat">
-      <a:schemeClr val="accent1"/>
-    </dgm:fillClrLst>
-    <dgm:linClrLst meth="repeat">
-      <a:schemeClr val="accent1">
-        <a:shade val="80000"/>
-      </a:schemeClr>
-    </dgm:linClrLst>
-    <dgm:effectClrLst/>
-    <dgm:txLinClrLst/>
-    <dgm:txFillClrLst meth="repeat">
-      <a:schemeClr val="tx1"/>
-    </dgm:txFillClrLst>
-    <dgm:txEffectClrLst/>
-  </dgm:styleLbl>
-  <dgm:styleLbl name="fgAcc1">
-    <dgm:fillClrLst meth="repeat">
-      <a:schemeClr val="lt1">
-        <a:alpha val="90000"/>
-      </a:schemeClr>
-    </dgm:fillClrLst>
-    <dgm:linClrLst meth="repeat">
-      <a:schemeClr val="accent1"/>
-    </dgm:linClrLst>
-    <dgm:effectClrLst/>
-    <dgm:txLinClrLst/>
-    <dgm:txFillClrLst meth="repeat">
-      <a:schemeClr val="dk1"/>
-    </dgm:txFillClrLst>
-    <dgm:txEffectClrLst/>
-  </dgm:styleLbl>
-  <dgm:styleLbl name="conFgAcc1">
-    <dgm:fillClrLst meth="repeat">
-      <a:schemeClr val="lt1">
-        <a:alpha val="90000"/>
-      </a:schemeClr>
-    </dgm:fillClrLst>
-    <dgm:linClrLst meth="repeat">
-      <a:schemeClr val="accent1"/>
-    </dgm:linClrLst>
-    <dgm:effectClrLst/>
-    <dgm:txLinClrLst/>
-    <dgm:txFillClrLst meth="repeat">
-      <a:schemeClr val="dk1"/>
-    </dgm:txFillClrLst>
-    <dgm:txEffectClrLst/>
-  </dgm:styleLbl>
-  <dgm:styleLbl name="alignAcc1">
-    <dgm:fillClrLst meth="repeat">
-      <a:schemeClr val="lt1">
-        <a:alpha val="90000"/>
-      </a:schemeClr>
-    </dgm:fillClrLst>
-    <dgm:linClrLst meth="repeat">
-      <a:schemeClr val="accent1"/>
-    </dgm:linClrLst>
-    <dgm:effectClrLst/>
-    <dgm:txLinClrLst/>
-    <dgm:txFillClrLst meth="repeat">
-      <a:schemeClr val="dk1"/>
-    </dgm:txFillClrLst>
-    <dgm:txEffectClrLst/>
-  </dgm:styleLbl>
-  <dgm:styleLbl name="trAlignAcc1">
-    <dgm:fillClrLst meth="repeat">
-      <a:schemeClr val="lt1">
-        <a:alpha val="40000"/>
-      </a:schemeClr>
-    </dgm:fillClrLst>
-    <dgm:linClrLst meth="repeat">
-      <a:schemeClr val="accent1"/>
-    </dgm:linClrLst>
-    <dgm:effectClrLst/>
-    <dgm:txLinClrLst/>
-    <dgm:txFillClrLst meth="repeat">
-      <a:schemeClr val="dk1"/>
-    </dgm:txFillClrLst>
-    <dgm:txEffectClrLst/>
-  </dgm:styleLbl>
-  <dgm:styleLbl name="bgAcc1">
-    <dgm:fillClrLst meth="repeat">
-      <a:schemeClr val="lt1">
-        <a:alpha val="90000"/>
-      </a:schemeClr>
-    </dgm:fillClrLst>
-    <dgm:linClrLst meth="repeat">
-      <a:schemeClr val="accent1"/>
-    </dgm:linClrLst>
-    <dgm:effectClrLst/>
-    <dgm:txLinClrLst/>
-    <dgm:txFillClrLst meth="repeat">
-      <a:schemeClr val="dk1"/>
-    </dgm:txFillClrLst>
-    <dgm:txEffectClrLst/>
-  </dgm:styleLbl>
-  <dgm:styleLbl name="solidFgAcc1">
-    <dgm:fillClrLst meth="repeat">
-      <a:schemeClr val="lt1"/>
-    </dgm:fillClrLst>
-    <dgm:linClrLst meth="repeat">
-      <a:schemeClr val="accent1"/>
-    </dgm:linClrLst>
-    <dgm:effectClrLst/>
-    <dgm:txLinClrLst/>
-    <dgm:txFillClrLst meth="repeat">
-      <a:schemeClr val="dk1"/>
-    </dgm:txFillClrLst>
-    <dgm:txEffectClrLst/>
-  </dgm:styleLbl>
-  <dgm:styleLbl name="solidAlignAcc1">
-    <dgm:fillClrLst meth="repeat">
-      <a:schemeClr val="lt1"/>
-    </dgm:fillClrLst>
-    <dgm:linClrLst meth="repeat">
-      <a:schemeClr val="accent1"/>
-    </dgm:linClrLst>
-    <dgm:effectClrLst/>
-    <dgm:txLinClrLst/>
-    <dgm:txFillClrLst meth="repeat">
-      <a:schemeClr val="dk1"/>
-    </dgm:txFillClrLst>
-    <dgm:txEffectClrLst/>
-  </dgm:styleLbl>
-  <dgm:styleLbl name="solidBgAcc1">
-    <dgm:fillClrLst meth="repeat">
-      <a:schemeClr val="lt1"/>
-    </dgm:fillClrLst>
-    <dgm:linClrLst meth="repeat">
-      <a:schemeClr val="accent1"/>
-    </dgm:linClrLst>
-    <dgm:effectClrLst/>
-    <dgm:txLinClrLst/>
-    <dgm:txFillClrLst meth="repeat">
-      <a:schemeClr val="dk1"/>
-    </dgm:txFillClrLst>
-    <dgm:txEffectClrLst/>
-  </dgm:styleLbl>
-  <dgm:styleLbl name="fgAccFollowNode1">
-    <dgm:fillClrLst meth="repeat">
-      <a:schemeClr val="accent1">
-        <a:alpha val="90000"/>
-        <a:tint val="40000"/>
-      </a:schemeClr>
-    </dgm:fillClrLst>
-    <dgm:linClrLst meth="repeat">
-      <a:schemeClr val="accent1">
-        <a:alpha val="90000"/>
-        <a:tint val="40000"/>
-      </a:schemeClr>
-    </dgm:linClrLst>
-    <dgm:effectClrLst/>
-    <dgm:txLinClrLst/>
-    <dgm:txFillClrLst meth="repeat">
-      <a:schemeClr val="dk1"/>
-    </dgm:txFillClrLst>
-    <dgm:txEffectClrLst/>
-  </dgm:styleLbl>
-  <dgm:styleLbl name="alignAccFollowNode1">
-    <dgm:fillClrLst meth="repeat">
-      <a:schemeClr val="accent1">
-        <a:alpha val="90000"/>
-        <a:tint val="40000"/>
-      </a:schemeClr>
-    </dgm:fillClrLst>
-    <dgm:linClrLst meth="repeat">
-      <a:schemeClr val="accent1">
-        <a:alpha val="90000"/>
-        <a:tint val="40000"/>
-      </a:schemeClr>
-    </dgm:linClrLst>
-    <dgm:effectClrLst/>
-    <dgm:txLinClrLst/>
-    <dgm:txFillClrLst meth="repeat">
-      <a:schemeClr val="dk1"/>
-    </dgm:txFillClrLst>
-    <dgm:txEffectClrLst/>
-  </dgm:styleLbl>
-  <dgm:styleLbl name="bgAccFollowNode1">
-    <dgm:fillClrLst meth="repeat">
-      <a:schemeClr val="accent1">
-        <a:alpha val="90000"/>
-        <a:tint val="40000"/>
-      </a:schemeClr>
-    </dgm:fillClrLst>
-    <dgm:linClrLst meth="repeat">
-      <a:schemeClr val="accent1">
-        <a:alpha val="90000"/>
-        <a:tint val="40000"/>
-      </a:schemeClr>
-    </dgm:linClrLst>
-    <dgm:effectClrLst/>
-    <dgm:txLinClrLst/>
-    <dgm:txFillClrLst meth="repeat">
-      <a:schemeClr val="dk1"/>
-    </dgm:txFillClrLst>
-    <dgm:txEffectClrLst/>
-  </dgm:styleLbl>
-  <dgm:styleLbl name="fgAcc0">
-    <dgm:fillClrLst meth="repeat">
-      <a:schemeClr val="lt1">
-        <a:alpha val="90000"/>
-      </a:schemeClr>
-    </dgm:fillClrLst>
-    <dgm:linClrLst meth="repeat">
-      <a:schemeClr val="accent1"/>
-    </dgm:linClrLst>
-    <dgm:effectClrLst/>
-    <dgm:txLinClrLst/>
-    <dgm:txFillClrLst meth="repeat">
-      <a:schemeClr val="dk1"/>
-    </dgm:txFillClrLst>
-    <dgm:txEffectClrLst/>
-  </dgm:styleLbl>
-  <dgm:styleLbl name="fgAcc2">
-    <dgm:fillClrLst meth="repeat">
-      <a:schemeClr val="lt1">
-        <a:alpha val="90000"/>
-      </a:schemeClr>
-    </dgm:fillClrLst>
-    <dgm:linClrLst meth="repeat">
-      <a:schemeClr val="accent1"/>
-    </dgm:linClrLst>
-    <dgm:effectClrLst/>
-    <dgm:txLinClrLst/>
-    <dgm:txFillClrLst meth="repeat">
-      <a:schemeClr val="dk1"/>
-    </dgm:txFillClrLst>
-    <dgm:txEffectClrLst/>
-  </dgm:styleLbl>
-  <dgm:styleLbl name="fgAcc3">
-    <dgm:fillClrLst meth="repeat">
-      <a:schemeClr val="lt1">
-        <a:alpha val="90000"/>
-      </a:schemeClr>
-    </dgm:fillClrLst>
-    <dgm:linClrLst meth="repeat">
-      <a:schemeClr val="accent1"/>
-    </dgm:linClrLst>
-    <dgm:effectClrLst/>
-    <dgm:txLinClrLst/>
-    <dgm:txFillClrLst meth="repeat">
-      <a:schemeClr val="dk1"/>
-    </dgm:txFillClrLst>
-    <dgm:txEffectClrLst/>
-  </dgm:styleLbl>
-  <dgm:styleLbl name="fgAcc4">
-    <dgm:fillClrLst meth="repeat">
-      <a:schemeClr val="lt1">
-        <a:alpha val="90000"/>
-      </a:schemeClr>
-    </dgm:fillClrLst>
-    <dgm:linClrLst meth="repeat">
-      <a:schemeClr val="accent1"/>
-    </dgm:linClrLst>
-    <dgm:effectClrLst/>
-    <dgm:txLinClrLst/>
-    <dgm:txFillClrLst meth="repeat">
-      <a:schemeClr val="dk1"/>
-    </dgm:txFillClrLst>
-    <dgm:txEffectClrLst/>
-  </dgm:styleLbl>
-  <dgm:styleLbl name="bgShp">
-    <dgm:fillClrLst meth="repeat">
-      <a:schemeClr val="accent1">
-        <a:tint val="40000"/>
-      </a:schemeClr>
-    </dgm:fillClrLst>
-    <dgm:linClrLst meth="repeat">
-      <a:schemeClr val="accent1"/>
-    </dgm:linClrLst>
-    <dgm:effectClrLst/>
-    <dgm:txLinClrLst/>
-    <dgm:txFillClrLst meth="repeat">
-      <a:schemeClr val="dk1"/>
-    </dgm:txFillClrLst>
-    <dgm:txEffectClrLst/>
-  </dgm:styleLbl>
-  <dgm:styleLbl name="dkBgShp">
-    <dgm:fillClrLst meth="repeat">
-      <a:schemeClr val="accent1">
-        <a:shade val="80000"/>
-      </a:schemeClr>
-    </dgm:fillClrLst>
-    <dgm:linClrLst meth="repeat">
-      <a:schemeClr val="accent1"/>
-    </dgm:linClrLst>
-    <dgm:effectClrLst/>
-    <dgm:txLinClrLst/>
-    <dgm:txFillClrLst meth="repeat">
-      <a:schemeClr val="lt1"/>
-    </dgm:txFillClrLst>
-    <dgm:txEffectClrLst/>
-  </dgm:styleLbl>
-  <dgm:styleLbl name="trBgShp">
-    <dgm:fillClrLst meth="repeat">
-      <a:schemeClr val="accent1">
-        <a:tint val="50000"/>
-        <a:alpha val="40000"/>
-      </a:schemeClr>
-    </dgm:fillClrLst>
-    <dgm:linClrLst meth="repeat">
-      <a:schemeClr val="accent1"/>
-    </dgm:linClrLst>
-    <dgm:effectClrLst/>
-    <dgm:txLinClrLst/>
-    <dgm:txFillClrLst meth="repeat">
-      <a:schemeClr val="lt1"/>
-    </dgm:txFillClrLst>
-    <dgm:txEffectClrLst/>
-  </dgm:styleLbl>
-  <dgm:styleLbl name="fgShp">
-    <dgm:fillClrLst meth="repeat">
-      <a:schemeClr val="accent1">
-        <a:tint val="60000"/>
-      </a:schemeClr>
-    </dgm:fillClrLst>
-    <dgm:linClrLst meth="repeat">
-      <a:schemeClr val="lt1"/>
-    </dgm:linClrLst>
-    <dgm:effectClrLst/>
-    <dgm:txLinClrLst/>
-    <dgm:txFillClrLst meth="repeat">
-      <a:schemeClr val="dk1"/>
-    </dgm:txFillClrLst>
-    <dgm:txEffectClrLst/>
-  </dgm:styleLbl>
-  <dgm:styleLbl name="revTx">
-    <dgm:fillClrLst meth="repeat">
-      <a:schemeClr val="lt1">
-        <a:alpha val="0"/>
-      </a:schemeClr>
-    </dgm:fillClrLst>
-    <dgm:linClrLst meth="repeat">
-      <a:schemeClr val="dk1">
-        <a:alpha val="0"/>
-      </a:schemeClr>
-    </dgm:linClrLst>
-    <dgm:effectClrLst/>
-    <dgm:txLinClrLst/>
-    <dgm:txFillClrLst meth="repeat">
-      <a:schemeClr val="tx1"/>
-    </dgm:txFillClrLst>
-    <dgm:txEffectClrLst/>
-  </dgm:styleLbl>
-</dgm:colorsDef>
-</file>
-
-<file path=ppt/diagrams/data1.xml><?xml version="1.0" encoding="utf-8"?>
-<dgm:dataModel xmlns:dgm="http://schemas.openxmlformats.org/drawingml/2006/diagram" xmlns:a="http://schemas.openxmlformats.org/drawingml/2006/main">
-  <dgm:ptLst>
-    <dgm:pt modelId="{75948F05-92E5-4253-992A-06FF261A5717}" type="doc">
-      <dgm:prSet loTypeId="urn:microsoft.com/office/officeart/2005/8/layout/cycle6" loCatId="relationship" qsTypeId="urn:microsoft.com/office/officeart/2005/8/quickstyle/simple1" qsCatId="simple" csTypeId="urn:microsoft.com/office/officeart/2005/8/colors/accent1_2" csCatId="accent1" phldr="1"/>
-      <dgm:spPr/>
-      <dgm:t>
-        <a:bodyPr/>
-        <a:lstStyle/>
-        <a:p>
-          <a:endParaRPr lang="en-US"/>
-        </a:p>
-      </dgm:t>
-    </dgm:pt>
-    <dgm:pt modelId="{7ACCE2D8-B3CE-408B-95E3-0634076C0723}">
-      <dgm:prSet phldrT="[Text]"/>
-      <dgm:spPr/>
-      <dgm:t>
-        <a:bodyPr/>
-        <a:lstStyle/>
-        <a:p>
-          <a:r>
-            <a:rPr lang="en-US" dirty="0" smtClean="0"/>
-            <a:t>C++ </a:t>
-          </a:r>
-          <a:br>
-            <a:rPr lang="en-US" dirty="0" smtClean="0"/>
-          </a:br>
-          <a:r>
-            <a:rPr lang="en-US" dirty="0" smtClean="0"/>
-            <a:t>Users</a:t>
-          </a:r>
-          <a:endParaRPr lang="en-US" dirty="0"/>
-        </a:p>
-      </dgm:t>
-    </dgm:pt>
-    <dgm:pt modelId="{5FFDEB06-0D48-438C-A4C8-5D9BB860DDAD}" type="parTrans" cxnId="{08BE1179-F435-4478-B784-38B5FAD27F79}">
-      <dgm:prSet/>
-      <dgm:spPr/>
-      <dgm:t>
-        <a:bodyPr/>
-        <a:lstStyle/>
-        <a:p>
-          <a:endParaRPr lang="en-US"/>
-        </a:p>
-      </dgm:t>
-    </dgm:pt>
-    <dgm:pt modelId="{DD3D3B28-3A46-402F-867F-AEDFD0C7818E}" type="sibTrans" cxnId="{08BE1179-F435-4478-B784-38B5FAD27F79}">
-      <dgm:prSet/>
-      <dgm:spPr/>
-      <dgm:t>
-        <a:bodyPr/>
-        <a:lstStyle/>
-        <a:p>
-          <a:endParaRPr lang="en-US"/>
-        </a:p>
-      </dgm:t>
-    </dgm:pt>
-    <dgm:pt modelId="{056F86CF-2D6D-4F48-A8EB-1D043ED22708}">
-      <dgm:prSet phldrT="[Text]"/>
-      <dgm:spPr>
-        <a:solidFill>
-          <a:schemeClr val="accent2">
-            <a:lumMod val="50000"/>
-          </a:schemeClr>
-        </a:solidFill>
-      </dgm:spPr>
-      <dgm:t>
-        <a:bodyPr/>
-        <a:lstStyle/>
-        <a:p>
-          <a:r>
-            <a:rPr lang="en-US" dirty="0" smtClean="0"/>
-            <a:t>Python Users</a:t>
-          </a:r>
-          <a:endParaRPr lang="en-US" dirty="0"/>
-        </a:p>
-      </dgm:t>
-    </dgm:pt>
-    <dgm:pt modelId="{17BB8C9E-5656-4460-9ACA-FA93501FDFE5}" type="parTrans" cxnId="{B886D07E-4DB4-4D05-A06A-B4DFE71291F8}">
-      <dgm:prSet/>
-      <dgm:spPr/>
-      <dgm:t>
-        <a:bodyPr/>
-        <a:lstStyle/>
-        <a:p>
-          <a:endParaRPr lang="en-US"/>
-        </a:p>
-      </dgm:t>
-    </dgm:pt>
-    <dgm:pt modelId="{47FAD5BA-3FDC-4B5D-8055-E6C688CC39A4}" type="sibTrans" cxnId="{B886D07E-4DB4-4D05-A06A-B4DFE71291F8}">
-      <dgm:prSet/>
-      <dgm:spPr/>
-      <dgm:t>
-        <a:bodyPr/>
-        <a:lstStyle/>
-        <a:p>
-          <a:endParaRPr lang="en-US"/>
-        </a:p>
-      </dgm:t>
-    </dgm:pt>
-    <dgm:pt modelId="{7F00DB3E-8C50-420C-B589-BDFF103374A8}">
-      <dgm:prSet phldrT="[Text]"/>
-      <dgm:spPr>
-        <a:solidFill>
-          <a:schemeClr val="tx1">
-            <a:lumMod val="95000"/>
-            <a:lumOff val="5000"/>
-          </a:schemeClr>
-        </a:solidFill>
-      </dgm:spPr>
-      <dgm:t>
-        <a:bodyPr/>
-        <a:lstStyle/>
-        <a:p>
-          <a:r>
-            <a:rPr lang="en-US" dirty="0" smtClean="0"/>
-            <a:t>&gt; Command line tools _</a:t>
-          </a:r>
-          <a:endParaRPr lang="en-US" dirty="0"/>
-        </a:p>
-      </dgm:t>
-    </dgm:pt>
-    <dgm:pt modelId="{AD4967C1-9E3C-4E9A-924E-D562A532CDF1}" type="parTrans" cxnId="{86DEC147-00DB-4FCF-B0E5-EB827B74DDE1}">
-      <dgm:prSet/>
-      <dgm:spPr/>
-      <dgm:t>
-        <a:bodyPr/>
-        <a:lstStyle/>
-        <a:p>
-          <a:endParaRPr lang="en-US"/>
-        </a:p>
-      </dgm:t>
-    </dgm:pt>
-    <dgm:pt modelId="{E66B73F0-87A4-4D6E-A0ED-F026A87F3C95}" type="sibTrans" cxnId="{86DEC147-00DB-4FCF-B0E5-EB827B74DDE1}">
-      <dgm:prSet/>
-      <dgm:spPr/>
-      <dgm:t>
-        <a:bodyPr/>
-        <a:lstStyle/>
-        <a:p>
-          <a:endParaRPr lang="en-US"/>
-        </a:p>
-      </dgm:t>
-    </dgm:pt>
-    <dgm:pt modelId="{308FBE6F-42B6-4F91-91F7-586D892877A2}">
-      <dgm:prSet phldrT="[Text]"/>
-      <dgm:spPr>
-        <a:solidFill>
-          <a:schemeClr val="bg1">
-            <a:lumMod val="95000"/>
-          </a:schemeClr>
-        </a:solidFill>
-        <a:ln>
-          <a:solidFill>
-            <a:schemeClr val="tx2">
-              <a:lumMod val="50000"/>
-            </a:schemeClr>
-          </a:solidFill>
-        </a:ln>
-      </dgm:spPr>
-      <dgm:t>
-        <a:bodyPr/>
-        <a:lstStyle/>
-        <a:p>
-          <a:r>
-            <a:rPr lang="en-US" dirty="0" smtClean="0">
-              <a:solidFill>
-                <a:srgbClr val="002060"/>
-              </a:solidFill>
-            </a:rPr>
-            <a:t>WEB</a:t>
-          </a:r>
-          <a:endParaRPr lang="en-US" dirty="0">
-            <a:solidFill>
-              <a:srgbClr val="002060"/>
-            </a:solidFill>
-          </a:endParaRPr>
-        </a:p>
-      </dgm:t>
-    </dgm:pt>
-    <dgm:pt modelId="{48BE1C05-CA59-4F2C-8CF6-D80409954729}" type="parTrans" cxnId="{D5C2B671-85AE-478F-BADE-AA3437044451}">
-      <dgm:prSet/>
-      <dgm:spPr/>
-      <dgm:t>
-        <a:bodyPr/>
-        <a:lstStyle/>
-        <a:p>
-          <a:endParaRPr lang="en-US"/>
-        </a:p>
-      </dgm:t>
-    </dgm:pt>
-    <dgm:pt modelId="{BA760EED-47D0-4566-998C-31209DF718A6}" type="sibTrans" cxnId="{D5C2B671-85AE-478F-BADE-AA3437044451}">
-      <dgm:prSet/>
-      <dgm:spPr/>
-      <dgm:t>
-        <a:bodyPr/>
-        <a:lstStyle/>
-        <a:p>
-          <a:endParaRPr lang="en-US"/>
-        </a:p>
-      </dgm:t>
-    </dgm:pt>
-    <dgm:pt modelId="{887C581E-9108-4FDB-8A6F-7FEDF656BFA3}">
-      <dgm:prSet phldrT="[Text]"/>
-      <dgm:spPr/>
-      <dgm:t>
-        <a:bodyPr/>
-        <a:lstStyle/>
-        <a:p>
-          <a:r>
-            <a:rPr lang="en-US" dirty="0" smtClean="0">
-              <a:solidFill>
-                <a:srgbClr val="FFC000"/>
-              </a:solidFill>
-            </a:rPr>
-            <a:t>JANA</a:t>
-          </a:r>
-          <a:r>
-            <a:rPr lang="en-US" dirty="0" smtClean="0"/>
-            <a:t> Users</a:t>
-          </a:r>
-          <a:endParaRPr lang="en-US" dirty="0"/>
-        </a:p>
-      </dgm:t>
-    </dgm:pt>
-    <dgm:pt modelId="{513A3874-7A32-4FCF-B154-36905D4DE702}" type="parTrans" cxnId="{AEF3E594-6565-468C-9247-453BAFE5C655}">
-      <dgm:prSet/>
-      <dgm:spPr/>
-      <dgm:t>
-        <a:bodyPr/>
-        <a:lstStyle/>
-        <a:p>
-          <a:endParaRPr lang="en-US"/>
-        </a:p>
-      </dgm:t>
-    </dgm:pt>
-    <dgm:pt modelId="{9D2E7D16-96C4-4E74-975F-3266BF0592F9}" type="sibTrans" cxnId="{AEF3E594-6565-468C-9247-453BAFE5C655}">
-      <dgm:prSet/>
-      <dgm:spPr/>
-      <dgm:t>
-        <a:bodyPr/>
-        <a:lstStyle/>
-        <a:p>
-          <a:endParaRPr lang="en-US"/>
-        </a:p>
-      </dgm:t>
-    </dgm:pt>
-    <dgm:pt modelId="{797B2806-2E36-408B-8403-02DF1DE64CBC}" type="pres">
-      <dgm:prSet presAssocID="{75948F05-92E5-4253-992A-06FF261A5717}" presName="cycle" presStyleCnt="0">
-        <dgm:presLayoutVars>
-          <dgm:dir/>
-          <dgm:resizeHandles val="exact"/>
-        </dgm:presLayoutVars>
-      </dgm:prSet>
-      <dgm:spPr/>
-      <dgm:t>
-        <a:bodyPr/>
-        <a:lstStyle/>
-        <a:p>
-          <a:endParaRPr lang="en-US"/>
-        </a:p>
-      </dgm:t>
-    </dgm:pt>
-    <dgm:pt modelId="{03114756-6B9C-4437-97E4-ECD30437BA47}" type="pres">
-      <dgm:prSet presAssocID="{7ACCE2D8-B3CE-408B-95E3-0634076C0723}" presName="node" presStyleLbl="node1" presStyleIdx="0" presStyleCnt="5">
-        <dgm:presLayoutVars>
-          <dgm:bulletEnabled val="1"/>
-        </dgm:presLayoutVars>
-      </dgm:prSet>
-      <dgm:spPr/>
-      <dgm:t>
-        <a:bodyPr/>
-        <a:lstStyle/>
-        <a:p>
-          <a:endParaRPr lang="en-US"/>
-        </a:p>
-      </dgm:t>
-    </dgm:pt>
-    <dgm:pt modelId="{B9E229F2-D6AB-42D9-A414-9237AA82CF2D}" type="pres">
-      <dgm:prSet presAssocID="{7ACCE2D8-B3CE-408B-95E3-0634076C0723}" presName="spNode" presStyleCnt="0"/>
-      <dgm:spPr/>
-    </dgm:pt>
-    <dgm:pt modelId="{F51C6200-BE3C-4095-BFF1-E6E700770435}" type="pres">
-      <dgm:prSet presAssocID="{DD3D3B28-3A46-402F-867F-AEDFD0C7818E}" presName="sibTrans" presStyleLbl="sibTrans1D1" presStyleIdx="0" presStyleCnt="5"/>
-      <dgm:spPr/>
-      <dgm:t>
-        <a:bodyPr/>
-        <a:lstStyle/>
-        <a:p>
-          <a:endParaRPr lang="en-US"/>
-        </a:p>
-      </dgm:t>
-    </dgm:pt>
-    <dgm:pt modelId="{894A3FCC-19B6-4124-994F-24A5DF8A45E8}" type="pres">
-      <dgm:prSet presAssocID="{056F86CF-2D6D-4F48-A8EB-1D043ED22708}" presName="node" presStyleLbl="node1" presStyleIdx="1" presStyleCnt="5">
-        <dgm:presLayoutVars>
-          <dgm:bulletEnabled val="1"/>
-        </dgm:presLayoutVars>
-      </dgm:prSet>
-      <dgm:spPr/>
-      <dgm:t>
-        <a:bodyPr/>
-        <a:lstStyle/>
-        <a:p>
-          <a:endParaRPr lang="en-US"/>
-        </a:p>
-      </dgm:t>
-    </dgm:pt>
-    <dgm:pt modelId="{CF0A2175-85AD-42CA-ABD6-CEF8CD5EB9FB}" type="pres">
-      <dgm:prSet presAssocID="{056F86CF-2D6D-4F48-A8EB-1D043ED22708}" presName="spNode" presStyleCnt="0"/>
-      <dgm:spPr/>
-    </dgm:pt>
-    <dgm:pt modelId="{6E75E371-E4D1-4969-B379-C2576D3806CF}" type="pres">
-      <dgm:prSet presAssocID="{47FAD5BA-3FDC-4B5D-8055-E6C688CC39A4}" presName="sibTrans" presStyleLbl="sibTrans1D1" presStyleIdx="1" presStyleCnt="5"/>
-      <dgm:spPr/>
-      <dgm:t>
-        <a:bodyPr/>
-        <a:lstStyle/>
-        <a:p>
-          <a:endParaRPr lang="en-US"/>
-        </a:p>
-      </dgm:t>
-    </dgm:pt>
-    <dgm:pt modelId="{3845DAED-7F6D-4036-AB18-EA402D322357}" type="pres">
-      <dgm:prSet presAssocID="{7F00DB3E-8C50-420C-B589-BDFF103374A8}" presName="node" presStyleLbl="node1" presStyleIdx="2" presStyleCnt="5">
-        <dgm:presLayoutVars>
-          <dgm:bulletEnabled val="1"/>
-        </dgm:presLayoutVars>
-      </dgm:prSet>
-      <dgm:spPr/>
-      <dgm:t>
-        <a:bodyPr/>
-        <a:lstStyle/>
-        <a:p>
-          <a:endParaRPr lang="en-US"/>
-        </a:p>
-      </dgm:t>
-    </dgm:pt>
-    <dgm:pt modelId="{AD1D7AD6-6927-490E-B84F-8FBCA1BD34B1}" type="pres">
-      <dgm:prSet presAssocID="{7F00DB3E-8C50-420C-B589-BDFF103374A8}" presName="spNode" presStyleCnt="0"/>
-      <dgm:spPr/>
-    </dgm:pt>
-    <dgm:pt modelId="{5DE254B9-CB2A-4376-AC66-3597B743C647}" type="pres">
-      <dgm:prSet presAssocID="{E66B73F0-87A4-4D6E-A0ED-F026A87F3C95}" presName="sibTrans" presStyleLbl="sibTrans1D1" presStyleIdx="2" presStyleCnt="5"/>
-      <dgm:spPr/>
-      <dgm:t>
-        <a:bodyPr/>
-        <a:lstStyle/>
-        <a:p>
-          <a:endParaRPr lang="en-US"/>
-        </a:p>
-      </dgm:t>
-    </dgm:pt>
-    <dgm:pt modelId="{165D8971-9998-415F-BF3F-8ED04E1F3F50}" type="pres">
-      <dgm:prSet presAssocID="{308FBE6F-42B6-4F91-91F7-586D892877A2}" presName="node" presStyleLbl="node1" presStyleIdx="3" presStyleCnt="5">
-        <dgm:presLayoutVars>
-          <dgm:bulletEnabled val="1"/>
-        </dgm:presLayoutVars>
-      </dgm:prSet>
-      <dgm:spPr/>
-      <dgm:t>
-        <a:bodyPr/>
-        <a:lstStyle/>
-        <a:p>
-          <a:endParaRPr lang="en-US"/>
-        </a:p>
-      </dgm:t>
-    </dgm:pt>
-    <dgm:pt modelId="{B9973201-EA46-4CD1-9154-9A7D015EFD4E}" type="pres">
-      <dgm:prSet presAssocID="{308FBE6F-42B6-4F91-91F7-586D892877A2}" presName="spNode" presStyleCnt="0"/>
-      <dgm:spPr/>
-    </dgm:pt>
-    <dgm:pt modelId="{00DAD2C2-E67B-4BEE-9F83-A6B3635337F1}" type="pres">
-      <dgm:prSet presAssocID="{BA760EED-47D0-4566-998C-31209DF718A6}" presName="sibTrans" presStyleLbl="sibTrans1D1" presStyleIdx="3" presStyleCnt="5"/>
-      <dgm:spPr/>
-      <dgm:t>
-        <a:bodyPr/>
-        <a:lstStyle/>
-        <a:p>
-          <a:endParaRPr lang="en-US"/>
-        </a:p>
-      </dgm:t>
-    </dgm:pt>
-    <dgm:pt modelId="{AB7C5891-7648-4AE0-8EA1-67913D29E964}" type="pres">
-      <dgm:prSet presAssocID="{887C581E-9108-4FDB-8A6F-7FEDF656BFA3}" presName="node" presStyleLbl="node1" presStyleIdx="4" presStyleCnt="5">
-        <dgm:presLayoutVars>
-          <dgm:bulletEnabled val="1"/>
-        </dgm:presLayoutVars>
-      </dgm:prSet>
-      <dgm:spPr/>
-      <dgm:t>
-        <a:bodyPr/>
-        <a:lstStyle/>
-        <a:p>
-          <a:endParaRPr lang="en-US"/>
-        </a:p>
-      </dgm:t>
-    </dgm:pt>
-    <dgm:pt modelId="{E35A1831-B33E-4F70-9816-0E4FCCD52C0A}" type="pres">
-      <dgm:prSet presAssocID="{887C581E-9108-4FDB-8A6F-7FEDF656BFA3}" presName="spNode" presStyleCnt="0"/>
-      <dgm:spPr/>
-    </dgm:pt>
-    <dgm:pt modelId="{B653A5E8-7742-48B0-BCE8-8F119E1377D4}" type="pres">
-      <dgm:prSet presAssocID="{9D2E7D16-96C4-4E74-975F-3266BF0592F9}" presName="sibTrans" presStyleLbl="sibTrans1D1" presStyleIdx="4" presStyleCnt="5"/>
-      <dgm:spPr/>
-      <dgm:t>
-        <a:bodyPr/>
-        <a:lstStyle/>
-        <a:p>
-          <a:endParaRPr lang="en-US"/>
-        </a:p>
-      </dgm:t>
-    </dgm:pt>
-  </dgm:ptLst>
-  <dgm:cxnLst>
-    <dgm:cxn modelId="{AEF3E594-6565-468C-9247-453BAFE5C655}" srcId="{75948F05-92E5-4253-992A-06FF261A5717}" destId="{887C581E-9108-4FDB-8A6F-7FEDF656BFA3}" srcOrd="4" destOrd="0" parTransId="{513A3874-7A32-4FCF-B154-36905D4DE702}" sibTransId="{9D2E7D16-96C4-4E74-975F-3266BF0592F9}"/>
-    <dgm:cxn modelId="{9FCFEE12-CC12-482A-9E1B-90543A5E8996}" type="presOf" srcId="{DD3D3B28-3A46-402F-867F-AEDFD0C7818E}" destId="{F51C6200-BE3C-4095-BFF1-E6E700770435}" srcOrd="0" destOrd="0" presId="urn:microsoft.com/office/officeart/2005/8/layout/cycle6"/>
-    <dgm:cxn modelId="{334A745A-AD71-4BEA-A40C-06D100AE32C9}" type="presOf" srcId="{47FAD5BA-3FDC-4B5D-8055-E6C688CC39A4}" destId="{6E75E371-E4D1-4969-B379-C2576D3806CF}" srcOrd="0" destOrd="0" presId="urn:microsoft.com/office/officeart/2005/8/layout/cycle6"/>
-    <dgm:cxn modelId="{08BE1179-F435-4478-B784-38B5FAD27F79}" srcId="{75948F05-92E5-4253-992A-06FF261A5717}" destId="{7ACCE2D8-B3CE-408B-95E3-0634076C0723}" srcOrd="0" destOrd="0" parTransId="{5FFDEB06-0D48-438C-A4C8-5D9BB860DDAD}" sibTransId="{DD3D3B28-3A46-402F-867F-AEDFD0C7818E}"/>
-    <dgm:cxn modelId="{1026C072-C099-4487-AEFC-36D5ECB2B1BE}" type="presOf" srcId="{887C581E-9108-4FDB-8A6F-7FEDF656BFA3}" destId="{AB7C5891-7648-4AE0-8EA1-67913D29E964}" srcOrd="0" destOrd="0" presId="urn:microsoft.com/office/officeart/2005/8/layout/cycle6"/>
-    <dgm:cxn modelId="{5AC603F7-9861-47E2-A758-125AF94D15F1}" type="presOf" srcId="{056F86CF-2D6D-4F48-A8EB-1D043ED22708}" destId="{894A3FCC-19B6-4124-994F-24A5DF8A45E8}" srcOrd="0" destOrd="0" presId="urn:microsoft.com/office/officeart/2005/8/layout/cycle6"/>
-    <dgm:cxn modelId="{B2E1E4B0-32C9-4671-9F7D-EF8EFA33FE31}" type="presOf" srcId="{308FBE6F-42B6-4F91-91F7-586D892877A2}" destId="{165D8971-9998-415F-BF3F-8ED04E1F3F50}" srcOrd="0" destOrd="0" presId="urn:microsoft.com/office/officeart/2005/8/layout/cycle6"/>
-    <dgm:cxn modelId="{141FA3A3-3F2A-43E8-AEE6-B9C9C6366518}" type="presOf" srcId="{9D2E7D16-96C4-4E74-975F-3266BF0592F9}" destId="{B653A5E8-7742-48B0-BCE8-8F119E1377D4}" srcOrd="0" destOrd="0" presId="urn:microsoft.com/office/officeart/2005/8/layout/cycle6"/>
-    <dgm:cxn modelId="{961F7627-3E7B-43A7-8AFE-3DDFF9BA8D6C}" type="presOf" srcId="{75948F05-92E5-4253-992A-06FF261A5717}" destId="{797B2806-2E36-408B-8403-02DF1DE64CBC}" srcOrd="0" destOrd="0" presId="urn:microsoft.com/office/officeart/2005/8/layout/cycle6"/>
-    <dgm:cxn modelId="{86DEC147-00DB-4FCF-B0E5-EB827B74DDE1}" srcId="{75948F05-92E5-4253-992A-06FF261A5717}" destId="{7F00DB3E-8C50-420C-B589-BDFF103374A8}" srcOrd="2" destOrd="0" parTransId="{AD4967C1-9E3C-4E9A-924E-D562A532CDF1}" sibTransId="{E66B73F0-87A4-4D6E-A0ED-F026A87F3C95}"/>
-    <dgm:cxn modelId="{B292F6E7-62C5-4464-830E-7BB0FAAD504A}" type="presOf" srcId="{BA760EED-47D0-4566-998C-31209DF718A6}" destId="{00DAD2C2-E67B-4BEE-9F83-A6B3635337F1}" srcOrd="0" destOrd="0" presId="urn:microsoft.com/office/officeart/2005/8/layout/cycle6"/>
-    <dgm:cxn modelId="{B886D07E-4DB4-4D05-A06A-B4DFE71291F8}" srcId="{75948F05-92E5-4253-992A-06FF261A5717}" destId="{056F86CF-2D6D-4F48-A8EB-1D043ED22708}" srcOrd="1" destOrd="0" parTransId="{17BB8C9E-5656-4460-9ACA-FA93501FDFE5}" sibTransId="{47FAD5BA-3FDC-4B5D-8055-E6C688CC39A4}"/>
-    <dgm:cxn modelId="{D5C2B671-85AE-478F-BADE-AA3437044451}" srcId="{75948F05-92E5-4253-992A-06FF261A5717}" destId="{308FBE6F-42B6-4F91-91F7-586D892877A2}" srcOrd="3" destOrd="0" parTransId="{48BE1C05-CA59-4F2C-8CF6-D80409954729}" sibTransId="{BA760EED-47D0-4566-998C-31209DF718A6}"/>
-    <dgm:cxn modelId="{E02AE789-AD8F-4D89-B7C1-5885925E8BBE}" type="presOf" srcId="{E66B73F0-87A4-4D6E-A0ED-F026A87F3C95}" destId="{5DE254B9-CB2A-4376-AC66-3597B743C647}" srcOrd="0" destOrd="0" presId="urn:microsoft.com/office/officeart/2005/8/layout/cycle6"/>
-    <dgm:cxn modelId="{FE1E830C-2334-4AB6-B8CB-C25501342CE2}" type="presOf" srcId="{7F00DB3E-8C50-420C-B589-BDFF103374A8}" destId="{3845DAED-7F6D-4036-AB18-EA402D322357}" srcOrd="0" destOrd="0" presId="urn:microsoft.com/office/officeart/2005/8/layout/cycle6"/>
-    <dgm:cxn modelId="{A2AC50F4-296B-4146-BFA0-77FAAF5CA8D0}" type="presOf" srcId="{7ACCE2D8-B3CE-408B-95E3-0634076C0723}" destId="{03114756-6B9C-4437-97E4-ECD30437BA47}" srcOrd="0" destOrd="0" presId="urn:microsoft.com/office/officeart/2005/8/layout/cycle6"/>
-    <dgm:cxn modelId="{C38860D8-D231-497F-A62E-4922161DB9C0}" type="presParOf" srcId="{797B2806-2E36-408B-8403-02DF1DE64CBC}" destId="{03114756-6B9C-4437-97E4-ECD30437BA47}" srcOrd="0" destOrd="0" presId="urn:microsoft.com/office/officeart/2005/8/layout/cycle6"/>
-    <dgm:cxn modelId="{446DE86B-FEEA-4C05-BF40-232AD7690589}" type="presParOf" srcId="{797B2806-2E36-408B-8403-02DF1DE64CBC}" destId="{B9E229F2-D6AB-42D9-A414-9237AA82CF2D}" srcOrd="1" destOrd="0" presId="urn:microsoft.com/office/officeart/2005/8/layout/cycle6"/>
-    <dgm:cxn modelId="{9D0254BA-41C4-4895-9DB7-AF47E6F722DB}" type="presParOf" srcId="{797B2806-2E36-408B-8403-02DF1DE64CBC}" destId="{F51C6200-BE3C-4095-BFF1-E6E700770435}" srcOrd="2" destOrd="0" presId="urn:microsoft.com/office/officeart/2005/8/layout/cycle6"/>
-    <dgm:cxn modelId="{D41976AC-2831-4F49-85B5-EF21876DB9B4}" type="presParOf" srcId="{797B2806-2E36-408B-8403-02DF1DE64CBC}" destId="{894A3FCC-19B6-4124-994F-24A5DF8A45E8}" srcOrd="3" destOrd="0" presId="urn:microsoft.com/office/officeart/2005/8/layout/cycle6"/>
-    <dgm:cxn modelId="{EF0166F3-8D87-4276-9132-C697273F8D78}" type="presParOf" srcId="{797B2806-2E36-408B-8403-02DF1DE64CBC}" destId="{CF0A2175-85AD-42CA-ABD6-CEF8CD5EB9FB}" srcOrd="4" destOrd="0" presId="urn:microsoft.com/office/officeart/2005/8/layout/cycle6"/>
-    <dgm:cxn modelId="{5118A5FB-97F1-44C9-8591-75DFA609D8FF}" type="presParOf" srcId="{797B2806-2E36-408B-8403-02DF1DE64CBC}" destId="{6E75E371-E4D1-4969-B379-C2576D3806CF}" srcOrd="5" destOrd="0" presId="urn:microsoft.com/office/officeart/2005/8/layout/cycle6"/>
-    <dgm:cxn modelId="{51165926-BA28-4514-B274-1EAE199CC873}" type="presParOf" srcId="{797B2806-2E36-408B-8403-02DF1DE64CBC}" destId="{3845DAED-7F6D-4036-AB18-EA402D322357}" srcOrd="6" destOrd="0" presId="urn:microsoft.com/office/officeart/2005/8/layout/cycle6"/>
-    <dgm:cxn modelId="{95CC7BC9-11FA-466A-97E0-73F80AD32BF4}" type="presParOf" srcId="{797B2806-2E36-408B-8403-02DF1DE64CBC}" destId="{AD1D7AD6-6927-490E-B84F-8FBCA1BD34B1}" srcOrd="7" destOrd="0" presId="urn:microsoft.com/office/officeart/2005/8/layout/cycle6"/>
-    <dgm:cxn modelId="{E29DB71B-2AF3-4AE3-9435-55B8C016B20C}" type="presParOf" srcId="{797B2806-2E36-408B-8403-02DF1DE64CBC}" destId="{5DE254B9-CB2A-4376-AC66-3597B743C647}" srcOrd="8" destOrd="0" presId="urn:microsoft.com/office/officeart/2005/8/layout/cycle6"/>
-    <dgm:cxn modelId="{66E47946-87D6-4C68-91B0-38172CF00656}" type="presParOf" srcId="{797B2806-2E36-408B-8403-02DF1DE64CBC}" destId="{165D8971-9998-415F-BF3F-8ED04E1F3F50}" srcOrd="9" destOrd="0" presId="urn:microsoft.com/office/officeart/2005/8/layout/cycle6"/>
-    <dgm:cxn modelId="{868C5C91-93FB-459C-9DA4-1F52655B02C8}" type="presParOf" srcId="{797B2806-2E36-408B-8403-02DF1DE64CBC}" destId="{B9973201-EA46-4CD1-9154-9A7D015EFD4E}" srcOrd="10" destOrd="0" presId="urn:microsoft.com/office/officeart/2005/8/layout/cycle6"/>
-    <dgm:cxn modelId="{D1288BC2-9B67-4DE8-85F9-64B62B1251B7}" type="presParOf" srcId="{797B2806-2E36-408B-8403-02DF1DE64CBC}" destId="{00DAD2C2-E67B-4BEE-9F83-A6B3635337F1}" srcOrd="11" destOrd="0" presId="urn:microsoft.com/office/officeart/2005/8/layout/cycle6"/>
-    <dgm:cxn modelId="{45729AEA-1B65-4DAF-91C1-3C6ED7151C49}" type="presParOf" srcId="{797B2806-2E36-408B-8403-02DF1DE64CBC}" destId="{AB7C5891-7648-4AE0-8EA1-67913D29E964}" srcOrd="12" destOrd="0" presId="urn:microsoft.com/office/officeart/2005/8/layout/cycle6"/>
-    <dgm:cxn modelId="{992155ED-3BA0-4748-98BB-6A8DA2FC8FC8}" type="presParOf" srcId="{797B2806-2E36-408B-8403-02DF1DE64CBC}" destId="{E35A1831-B33E-4F70-9816-0E4FCCD52C0A}" srcOrd="13" destOrd="0" presId="urn:microsoft.com/office/officeart/2005/8/layout/cycle6"/>
-    <dgm:cxn modelId="{68E7330B-64BC-4F12-BEFE-19DBDA877532}" type="presParOf" srcId="{797B2806-2E36-408B-8403-02DF1DE64CBC}" destId="{B653A5E8-7742-48B0-BCE8-8F119E1377D4}" srcOrd="14" destOrd="0" presId="urn:microsoft.com/office/officeart/2005/8/layout/cycle6"/>
-  </dgm:cxnLst>
-  <dgm:bg/>
-  <dgm:whole/>
-  <dgm:extLst>
-    <a:ext uri="http://schemas.microsoft.com/office/drawing/2008/diagram">
-      <dsp:dataModelExt xmlns:dsp="http://schemas.microsoft.com/office/drawing/2008/diagram" relId="rId6" minVer="http://schemas.openxmlformats.org/drawingml/2006/diagram"/>
-    </a:ext>
-  </dgm:extLst>
-</dgm:dataModel>
-</file>
-
-<file path=ppt/diagrams/drawing1.xml><?xml version="1.0" encoding="utf-8"?>
-<dsp:drawing xmlns:dgm="http://schemas.openxmlformats.org/drawingml/2006/diagram" xmlns:dsp="http://schemas.microsoft.com/office/drawing/2008/diagram" xmlns:a="http://schemas.openxmlformats.org/drawingml/2006/main">
-  <dsp:spTree>
-    <dsp:nvGrpSpPr>
-      <dsp:cNvPr id="0" name=""/>
-      <dsp:cNvGrpSpPr/>
-    </dsp:nvGrpSpPr>
-    <dsp:grpSpPr/>
-    <dsp:sp modelId="{03114756-6B9C-4437-97E4-ECD30437BA47}">
-      <dsp:nvSpPr>
-        <dsp:cNvPr id="0" name=""/>
-        <dsp:cNvSpPr/>
-      </dsp:nvSpPr>
-      <dsp:spPr>
-        <a:xfrm>
-          <a:off x="2380505" y="2370"/>
-          <a:ext cx="1334988" cy="867742"/>
-        </a:xfrm>
-        <a:prstGeom prst="roundRect">
-          <a:avLst/>
-        </a:prstGeom>
-        <a:solidFill>
-          <a:schemeClr val="accent1">
-            <a:hueOff val="0"/>
-            <a:satOff val="0"/>
-            <a:lumOff val="0"/>
-            <a:alphaOff val="0"/>
-          </a:schemeClr>
-        </a:solidFill>
-        <a:ln w="19050" cap="flat" cmpd="sng" algn="ctr">
-          <a:solidFill>
-            <a:schemeClr val="lt1">
-              <a:hueOff val="0"/>
-              <a:satOff val="0"/>
-              <a:lumOff val="0"/>
-              <a:alphaOff val="0"/>
-            </a:schemeClr>
-          </a:solidFill>
-          <a:prstDash val="solid"/>
-        </a:ln>
-        <a:effectLst/>
-      </dsp:spPr>
-      <dsp:style>
-        <a:lnRef idx="2">
-          <a:scrgbClr r="0" g="0" b="0"/>
-        </a:lnRef>
-        <a:fillRef idx="1">
-          <a:scrgbClr r="0" g="0" b="0"/>
-        </a:fillRef>
-        <a:effectRef idx="0">
-          <a:scrgbClr r="0" g="0" b="0"/>
-        </a:effectRef>
-        <a:fontRef idx="minor">
-          <a:schemeClr val="lt1"/>
-        </a:fontRef>
-      </dsp:style>
-      <dsp:txBody>
-        <a:bodyPr spcFirstLastPara="0" vert="horz" wrap="square" lIns="64770" tIns="64770" rIns="64770" bIns="64770" numCol="1" spcCol="1270" anchor="ctr" anchorCtr="0">
-          <a:noAutofit/>
-        </a:bodyPr>
-        <a:lstStyle/>
-        <a:p>
-          <a:pPr lvl="0" algn="ctr" defTabSz="755650">
-            <a:lnSpc>
-              <a:spcPct val="90000"/>
-            </a:lnSpc>
-            <a:spcBef>
-              <a:spcPct val="0"/>
-            </a:spcBef>
-            <a:spcAft>
-              <a:spcPct val="35000"/>
-            </a:spcAft>
-          </a:pPr>
-          <a:r>
-            <a:rPr lang="en-US" sz="1700" kern="1200" dirty="0" smtClean="0"/>
-            <a:t>C++ </a:t>
-          </a:r>
-          <a:br>
-            <a:rPr lang="en-US" sz="1700" kern="1200" dirty="0" smtClean="0"/>
-          </a:br>
-          <a:r>
-            <a:rPr lang="en-US" sz="1700" kern="1200" dirty="0" smtClean="0"/>
-            <a:t>Users</a:t>
-          </a:r>
-          <a:endParaRPr lang="en-US" sz="1700" kern="1200" dirty="0"/>
-        </a:p>
-      </dsp:txBody>
-      <dsp:txXfrm>
-        <a:off x="2422865" y="44730"/>
-        <a:ext cx="1250268" cy="783022"/>
-      </dsp:txXfrm>
-    </dsp:sp>
-    <dsp:sp modelId="{F51C6200-BE3C-4095-BFF1-E6E700770435}">
-      <dsp:nvSpPr>
-        <dsp:cNvPr id="0" name=""/>
-        <dsp:cNvSpPr/>
-      </dsp:nvSpPr>
-      <dsp:spPr>
-        <a:xfrm>
-          <a:off x="1315405" y="436241"/>
-          <a:ext cx="3465188" cy="3465188"/>
-        </a:xfrm>
-        <a:custGeom>
-          <a:avLst/>
-          <a:gdLst/>
-          <a:ahLst/>
-          <a:cxnLst/>
-          <a:rect l="0" t="0" r="0" b="0"/>
-          <a:pathLst>
-            <a:path>
-              <a:moveTo>
-                <a:pt x="2409246" y="137594"/>
-              </a:moveTo>
-              <a:arcTo wR="1732594" hR="1732594" stAng="17579295" swAng="1959991"/>
-            </a:path>
-          </a:pathLst>
-        </a:custGeom>
-        <a:noFill/>
-        <a:ln w="9525" cap="flat" cmpd="sng" algn="ctr">
-          <a:solidFill>
-            <a:schemeClr val="accent1">
-              <a:hueOff val="0"/>
-              <a:satOff val="0"/>
-              <a:lumOff val="0"/>
-              <a:alphaOff val="0"/>
-            </a:schemeClr>
-          </a:solidFill>
-          <a:prstDash val="solid"/>
-        </a:ln>
-        <a:effectLst/>
-      </dsp:spPr>
-      <dsp:style>
-        <a:lnRef idx="1">
-          <a:scrgbClr r="0" g="0" b="0"/>
-        </a:lnRef>
-        <a:fillRef idx="0">
-          <a:scrgbClr r="0" g="0" b="0"/>
-        </a:fillRef>
-        <a:effectRef idx="0">
-          <a:scrgbClr r="0" g="0" b="0"/>
-        </a:effectRef>
-        <a:fontRef idx="minor"/>
-      </dsp:style>
-    </dsp:sp>
-    <dsp:sp modelId="{894A3FCC-19B6-4124-994F-24A5DF8A45E8}">
-      <dsp:nvSpPr>
-        <dsp:cNvPr id="0" name=""/>
-        <dsp:cNvSpPr/>
-      </dsp:nvSpPr>
-      <dsp:spPr>
-        <a:xfrm>
-          <a:off x="4028301" y="1199563"/>
-          <a:ext cx="1334988" cy="867742"/>
-        </a:xfrm>
-        <a:prstGeom prst="roundRect">
-          <a:avLst/>
-        </a:prstGeom>
-        <a:solidFill>
-          <a:schemeClr val="accent2">
-            <a:lumMod val="50000"/>
-          </a:schemeClr>
-        </a:solidFill>
-        <a:ln w="19050" cap="flat" cmpd="sng" algn="ctr">
-          <a:solidFill>
-            <a:schemeClr val="lt1">
-              <a:hueOff val="0"/>
-              <a:satOff val="0"/>
-              <a:lumOff val="0"/>
-              <a:alphaOff val="0"/>
-            </a:schemeClr>
-          </a:solidFill>
-          <a:prstDash val="solid"/>
-        </a:ln>
-        <a:effectLst/>
-      </dsp:spPr>
-      <dsp:style>
-        <a:lnRef idx="2">
-          <a:scrgbClr r="0" g="0" b="0"/>
-        </a:lnRef>
-        <a:fillRef idx="1">
-          <a:scrgbClr r="0" g="0" b="0"/>
-        </a:fillRef>
-        <a:effectRef idx="0">
-          <a:scrgbClr r="0" g="0" b="0"/>
-        </a:effectRef>
-        <a:fontRef idx="minor">
-          <a:schemeClr val="lt1"/>
-        </a:fontRef>
-      </dsp:style>
-      <dsp:txBody>
-        <a:bodyPr spcFirstLastPara="0" vert="horz" wrap="square" lIns="64770" tIns="64770" rIns="64770" bIns="64770" numCol="1" spcCol="1270" anchor="ctr" anchorCtr="0">
-          <a:noAutofit/>
-        </a:bodyPr>
-        <a:lstStyle/>
-        <a:p>
-          <a:pPr lvl="0" algn="ctr" defTabSz="755650">
-            <a:lnSpc>
-              <a:spcPct val="90000"/>
-            </a:lnSpc>
-            <a:spcBef>
-              <a:spcPct val="0"/>
-            </a:spcBef>
-            <a:spcAft>
-              <a:spcPct val="35000"/>
-            </a:spcAft>
-          </a:pPr>
-          <a:r>
-            <a:rPr lang="en-US" sz="1700" kern="1200" dirty="0" smtClean="0"/>
-            <a:t>Python Users</a:t>
-          </a:r>
-          <a:endParaRPr lang="en-US" sz="1700" kern="1200" dirty="0"/>
-        </a:p>
-      </dsp:txBody>
-      <dsp:txXfrm>
-        <a:off x="4070661" y="1241923"/>
-        <a:ext cx="1250268" cy="783022"/>
-      </dsp:txXfrm>
-    </dsp:sp>
-    <dsp:sp modelId="{6E75E371-E4D1-4969-B379-C2576D3806CF}">
-      <dsp:nvSpPr>
-        <dsp:cNvPr id="0" name=""/>
-        <dsp:cNvSpPr/>
-      </dsp:nvSpPr>
-      <dsp:spPr>
-        <a:xfrm>
-          <a:off x="1315405" y="436241"/>
-          <a:ext cx="3465188" cy="3465188"/>
-        </a:xfrm>
-        <a:custGeom>
-          <a:avLst/>
-          <a:gdLst/>
-          <a:ahLst/>
-          <a:cxnLst/>
-          <a:rect l="0" t="0" r="0" b="0"/>
-          <a:pathLst>
-            <a:path>
-              <a:moveTo>
-                <a:pt x="3462825" y="1642133"/>
-              </a:moveTo>
-              <a:arcTo wR="1732594" hR="1732594" stAng="21420430" swAng="2195114"/>
-            </a:path>
-          </a:pathLst>
-        </a:custGeom>
-        <a:noFill/>
-        <a:ln w="9525" cap="flat" cmpd="sng" algn="ctr">
-          <a:solidFill>
-            <a:schemeClr val="accent1">
-              <a:hueOff val="0"/>
-              <a:satOff val="0"/>
-              <a:lumOff val="0"/>
-              <a:alphaOff val="0"/>
-            </a:schemeClr>
-          </a:solidFill>
-          <a:prstDash val="solid"/>
-        </a:ln>
-        <a:effectLst/>
-      </dsp:spPr>
-      <dsp:style>
-        <a:lnRef idx="1">
-          <a:scrgbClr r="0" g="0" b="0"/>
-        </a:lnRef>
-        <a:fillRef idx="0">
-          <a:scrgbClr r="0" g="0" b="0"/>
-        </a:fillRef>
-        <a:effectRef idx="0">
-          <a:scrgbClr r="0" g="0" b="0"/>
-        </a:effectRef>
-        <a:fontRef idx="minor"/>
-      </dsp:style>
-    </dsp:sp>
-    <dsp:sp modelId="{3845DAED-7F6D-4036-AB18-EA402D322357}">
-      <dsp:nvSpPr>
-        <dsp:cNvPr id="0" name=""/>
-        <dsp:cNvSpPr/>
-      </dsp:nvSpPr>
-      <dsp:spPr>
-        <a:xfrm>
-          <a:off x="3398899" y="3136663"/>
-          <a:ext cx="1334988" cy="867742"/>
-        </a:xfrm>
-        <a:prstGeom prst="roundRect">
-          <a:avLst/>
-        </a:prstGeom>
-        <a:solidFill>
-          <a:schemeClr val="tx1">
-            <a:lumMod val="95000"/>
-            <a:lumOff val="5000"/>
-          </a:schemeClr>
-        </a:solidFill>
-        <a:ln w="19050" cap="flat" cmpd="sng" algn="ctr">
-          <a:solidFill>
-            <a:schemeClr val="lt1">
-              <a:hueOff val="0"/>
-              <a:satOff val="0"/>
-              <a:lumOff val="0"/>
-              <a:alphaOff val="0"/>
-            </a:schemeClr>
-          </a:solidFill>
-          <a:prstDash val="solid"/>
-        </a:ln>
-        <a:effectLst/>
-      </dsp:spPr>
-      <dsp:style>
-        <a:lnRef idx="2">
-          <a:scrgbClr r="0" g="0" b="0"/>
-        </a:lnRef>
-        <a:fillRef idx="1">
-          <a:scrgbClr r="0" g="0" b="0"/>
-        </a:fillRef>
-        <a:effectRef idx="0">
-          <a:scrgbClr r="0" g="0" b="0"/>
-        </a:effectRef>
-        <a:fontRef idx="minor">
-          <a:schemeClr val="lt1"/>
-        </a:fontRef>
-      </dsp:style>
-      <dsp:txBody>
-        <a:bodyPr spcFirstLastPara="0" vert="horz" wrap="square" lIns="64770" tIns="64770" rIns="64770" bIns="64770" numCol="1" spcCol="1270" anchor="ctr" anchorCtr="0">
-          <a:noAutofit/>
-        </a:bodyPr>
-        <a:lstStyle/>
-        <a:p>
-          <a:pPr lvl="0" algn="ctr" defTabSz="755650">
-            <a:lnSpc>
-              <a:spcPct val="90000"/>
-            </a:lnSpc>
-            <a:spcBef>
-              <a:spcPct val="0"/>
-            </a:spcBef>
-            <a:spcAft>
-              <a:spcPct val="35000"/>
-            </a:spcAft>
-          </a:pPr>
-          <a:r>
-            <a:rPr lang="en-US" sz="1700" kern="1200" dirty="0" smtClean="0"/>
-            <a:t>&gt; Command line tools _</a:t>
-          </a:r>
-          <a:endParaRPr lang="en-US" sz="1700" kern="1200" dirty="0"/>
-        </a:p>
-      </dsp:txBody>
-      <dsp:txXfrm>
-        <a:off x="3441259" y="3179023"/>
-        <a:ext cx="1250268" cy="783022"/>
-      </dsp:txXfrm>
-    </dsp:sp>
-    <dsp:sp modelId="{5DE254B9-CB2A-4376-AC66-3597B743C647}">
-      <dsp:nvSpPr>
-        <dsp:cNvPr id="0" name=""/>
-        <dsp:cNvSpPr/>
-      </dsp:nvSpPr>
-      <dsp:spPr>
-        <a:xfrm>
-          <a:off x="1315405" y="436241"/>
-          <a:ext cx="3465188" cy="3465188"/>
-        </a:xfrm>
-        <a:custGeom>
-          <a:avLst/>
-          <a:gdLst/>
-          <a:ahLst/>
-          <a:cxnLst/>
-          <a:rect l="0" t="0" r="0" b="0"/>
-          <a:pathLst>
-            <a:path>
-              <a:moveTo>
-                <a:pt x="2076618" y="3430690"/>
-              </a:moveTo>
-              <a:arcTo wR="1732594" hR="1732594" stAng="4712834" swAng="1374332"/>
-            </a:path>
-          </a:pathLst>
-        </a:custGeom>
-        <a:noFill/>
-        <a:ln w="9525" cap="flat" cmpd="sng" algn="ctr">
-          <a:solidFill>
-            <a:schemeClr val="accent1">
-              <a:hueOff val="0"/>
-              <a:satOff val="0"/>
-              <a:lumOff val="0"/>
-              <a:alphaOff val="0"/>
-            </a:schemeClr>
-          </a:solidFill>
-          <a:prstDash val="solid"/>
-        </a:ln>
-        <a:effectLst/>
-      </dsp:spPr>
-      <dsp:style>
-        <a:lnRef idx="1">
-          <a:scrgbClr r="0" g="0" b="0"/>
-        </a:lnRef>
-        <a:fillRef idx="0">
-          <a:scrgbClr r="0" g="0" b="0"/>
-        </a:fillRef>
-        <a:effectRef idx="0">
-          <a:scrgbClr r="0" g="0" b="0"/>
-        </a:effectRef>
-        <a:fontRef idx="minor"/>
-      </dsp:style>
-    </dsp:sp>
-    <dsp:sp modelId="{165D8971-9998-415F-BF3F-8ED04E1F3F50}">
-      <dsp:nvSpPr>
-        <dsp:cNvPr id="0" name=""/>
-        <dsp:cNvSpPr/>
-      </dsp:nvSpPr>
-      <dsp:spPr>
-        <a:xfrm>
-          <a:off x="1362112" y="3136663"/>
-          <a:ext cx="1334988" cy="867742"/>
-        </a:xfrm>
-        <a:prstGeom prst="roundRect">
-          <a:avLst/>
-        </a:prstGeom>
-        <a:solidFill>
-          <a:schemeClr val="bg1">
-            <a:lumMod val="95000"/>
-          </a:schemeClr>
-        </a:solidFill>
-        <a:ln w="19050" cap="flat" cmpd="sng" algn="ctr">
-          <a:solidFill>
-            <a:schemeClr val="tx2">
-              <a:lumMod val="50000"/>
-            </a:schemeClr>
-          </a:solidFill>
-          <a:prstDash val="solid"/>
-        </a:ln>
-        <a:effectLst/>
-      </dsp:spPr>
-      <dsp:style>
-        <a:lnRef idx="2">
-          <a:scrgbClr r="0" g="0" b="0"/>
-        </a:lnRef>
-        <a:fillRef idx="1">
-          <a:scrgbClr r="0" g="0" b="0"/>
-        </a:fillRef>
-        <a:effectRef idx="0">
-          <a:scrgbClr r="0" g="0" b="0"/>
-        </a:effectRef>
-        <a:fontRef idx="minor">
-          <a:schemeClr val="lt1"/>
-        </a:fontRef>
-      </dsp:style>
-      <dsp:txBody>
-        <a:bodyPr spcFirstLastPara="0" vert="horz" wrap="square" lIns="64770" tIns="64770" rIns="64770" bIns="64770" numCol="1" spcCol="1270" anchor="ctr" anchorCtr="0">
-          <a:noAutofit/>
-        </a:bodyPr>
-        <a:lstStyle/>
-        <a:p>
-          <a:pPr lvl="0" algn="ctr" defTabSz="755650">
-            <a:lnSpc>
-              <a:spcPct val="90000"/>
-            </a:lnSpc>
-            <a:spcBef>
-              <a:spcPct val="0"/>
-            </a:spcBef>
-            <a:spcAft>
-              <a:spcPct val="35000"/>
-            </a:spcAft>
-          </a:pPr>
-          <a:r>
-            <a:rPr lang="en-US" sz="1700" kern="1200" dirty="0" smtClean="0">
-              <a:solidFill>
-                <a:srgbClr val="002060"/>
-              </a:solidFill>
-            </a:rPr>
-            <a:t>WEB</a:t>
-          </a:r>
-          <a:endParaRPr lang="en-US" sz="1700" kern="1200" dirty="0">
-            <a:solidFill>
-              <a:srgbClr val="002060"/>
-            </a:solidFill>
-          </a:endParaRPr>
-        </a:p>
-      </dsp:txBody>
-      <dsp:txXfrm>
-        <a:off x="1404472" y="3179023"/>
-        <a:ext cx="1250268" cy="783022"/>
-      </dsp:txXfrm>
-    </dsp:sp>
-    <dsp:sp modelId="{00DAD2C2-E67B-4BEE-9F83-A6B3635337F1}">
-      <dsp:nvSpPr>
-        <dsp:cNvPr id="0" name=""/>
-        <dsp:cNvSpPr/>
-      </dsp:nvSpPr>
-      <dsp:spPr>
-        <a:xfrm>
-          <a:off x="1315405" y="436241"/>
-          <a:ext cx="3465188" cy="3465188"/>
-        </a:xfrm>
-        <a:custGeom>
-          <a:avLst/>
-          <a:gdLst/>
-          <a:ahLst/>
-          <a:cxnLst/>
-          <a:rect l="0" t="0" r="0" b="0"/>
-          <a:pathLst>
-            <a:path>
-              <a:moveTo>
-                <a:pt x="289352" y="2691206"/>
-              </a:moveTo>
-              <a:arcTo wR="1732594" hR="1732594" stAng="8784456" swAng="2195114"/>
-            </a:path>
-          </a:pathLst>
-        </a:custGeom>
-        <a:noFill/>
-        <a:ln w="9525" cap="flat" cmpd="sng" algn="ctr">
-          <a:solidFill>
-            <a:schemeClr val="accent1">
-              <a:hueOff val="0"/>
-              <a:satOff val="0"/>
-              <a:lumOff val="0"/>
-              <a:alphaOff val="0"/>
-            </a:schemeClr>
-          </a:solidFill>
-          <a:prstDash val="solid"/>
-        </a:ln>
-        <a:effectLst/>
-      </dsp:spPr>
-      <dsp:style>
-        <a:lnRef idx="1">
-          <a:scrgbClr r="0" g="0" b="0"/>
-        </a:lnRef>
-        <a:fillRef idx="0">
-          <a:scrgbClr r="0" g="0" b="0"/>
-        </a:fillRef>
-        <a:effectRef idx="0">
-          <a:scrgbClr r="0" g="0" b="0"/>
-        </a:effectRef>
-        <a:fontRef idx="minor"/>
-      </dsp:style>
-    </dsp:sp>
-    <dsp:sp modelId="{AB7C5891-7648-4AE0-8EA1-67913D29E964}">
-      <dsp:nvSpPr>
-        <dsp:cNvPr id="0" name=""/>
-        <dsp:cNvSpPr/>
-      </dsp:nvSpPr>
-      <dsp:spPr>
-        <a:xfrm>
-          <a:off x="732710" y="1199563"/>
-          <a:ext cx="1334988" cy="867742"/>
-        </a:xfrm>
-        <a:prstGeom prst="roundRect">
-          <a:avLst/>
-        </a:prstGeom>
-        <a:solidFill>
-          <a:schemeClr val="accent1">
-            <a:hueOff val="0"/>
-            <a:satOff val="0"/>
-            <a:lumOff val="0"/>
-            <a:alphaOff val="0"/>
-          </a:schemeClr>
-        </a:solidFill>
-        <a:ln w="19050" cap="flat" cmpd="sng" algn="ctr">
-          <a:solidFill>
-            <a:schemeClr val="lt1">
-              <a:hueOff val="0"/>
-              <a:satOff val="0"/>
-              <a:lumOff val="0"/>
-              <a:alphaOff val="0"/>
-            </a:schemeClr>
-          </a:solidFill>
-          <a:prstDash val="solid"/>
-        </a:ln>
-        <a:effectLst/>
-      </dsp:spPr>
-      <dsp:style>
-        <a:lnRef idx="2">
-          <a:scrgbClr r="0" g="0" b="0"/>
-        </a:lnRef>
-        <a:fillRef idx="1">
-          <a:scrgbClr r="0" g="0" b="0"/>
-        </a:fillRef>
-        <a:effectRef idx="0">
-          <a:scrgbClr r="0" g="0" b="0"/>
-        </a:effectRef>
-        <a:fontRef idx="minor">
-          <a:schemeClr val="lt1"/>
-        </a:fontRef>
-      </dsp:style>
-      <dsp:txBody>
-        <a:bodyPr spcFirstLastPara="0" vert="horz" wrap="square" lIns="64770" tIns="64770" rIns="64770" bIns="64770" numCol="1" spcCol="1270" anchor="ctr" anchorCtr="0">
-          <a:noAutofit/>
-        </a:bodyPr>
-        <a:lstStyle/>
-        <a:p>
-          <a:pPr lvl="0" algn="ctr" defTabSz="755650">
-            <a:lnSpc>
-              <a:spcPct val="90000"/>
-            </a:lnSpc>
-            <a:spcBef>
-              <a:spcPct val="0"/>
-            </a:spcBef>
-            <a:spcAft>
-              <a:spcPct val="35000"/>
-            </a:spcAft>
-          </a:pPr>
-          <a:r>
-            <a:rPr lang="en-US" sz="1700" kern="1200" dirty="0" smtClean="0">
-              <a:solidFill>
-                <a:srgbClr val="FFC000"/>
-              </a:solidFill>
-            </a:rPr>
-            <a:t>JANA</a:t>
-          </a:r>
-          <a:r>
-            <a:rPr lang="en-US" sz="1700" kern="1200" dirty="0" smtClean="0"/>
-            <a:t> Users</a:t>
-          </a:r>
-          <a:endParaRPr lang="en-US" sz="1700" kern="1200" dirty="0"/>
-        </a:p>
-      </dsp:txBody>
-      <dsp:txXfrm>
-        <a:off x="775070" y="1241923"/>
-        <a:ext cx="1250268" cy="783022"/>
-      </dsp:txXfrm>
-    </dsp:sp>
-    <dsp:sp modelId="{B653A5E8-7742-48B0-BCE8-8F119E1377D4}">
-      <dsp:nvSpPr>
-        <dsp:cNvPr id="0" name=""/>
-        <dsp:cNvSpPr/>
-      </dsp:nvSpPr>
-      <dsp:spPr>
-        <a:xfrm>
-          <a:off x="1315405" y="436241"/>
-          <a:ext cx="3465188" cy="3465188"/>
-        </a:xfrm>
-        <a:custGeom>
-          <a:avLst/>
-          <a:gdLst/>
-          <a:ahLst/>
-          <a:cxnLst/>
-          <a:rect l="0" t="0" r="0" b="0"/>
-          <a:pathLst>
-            <a:path>
-              <a:moveTo>
-                <a:pt x="302072" y="755102"/>
-              </a:moveTo>
-              <a:arcTo wR="1732594" hR="1732594" stAng="12860714" swAng="1959991"/>
-            </a:path>
-          </a:pathLst>
-        </a:custGeom>
-        <a:noFill/>
-        <a:ln w="9525" cap="flat" cmpd="sng" algn="ctr">
-          <a:solidFill>
-            <a:schemeClr val="accent1">
-              <a:hueOff val="0"/>
-              <a:satOff val="0"/>
-              <a:lumOff val="0"/>
-              <a:alphaOff val="0"/>
-            </a:schemeClr>
-          </a:solidFill>
-          <a:prstDash val="solid"/>
-        </a:ln>
-        <a:effectLst/>
-      </dsp:spPr>
-      <dsp:style>
-        <a:lnRef idx="1">
-          <a:scrgbClr r="0" g="0" b="0"/>
-        </a:lnRef>
-        <a:fillRef idx="0">
-          <a:scrgbClr r="0" g="0" b="0"/>
-        </a:fillRef>
-        <a:effectRef idx="0">
-          <a:scrgbClr r="0" g="0" b="0"/>
-        </a:effectRef>
-        <a:fontRef idx="minor"/>
-      </dsp:style>
-    </dsp:sp>
-  </dsp:spTree>
-</dsp:drawing>
-</file>
-
-<file path=ppt/diagrams/layout1.xml><?xml version="1.0" encoding="utf-8"?>
-<dgm:layoutDef xmlns:dgm="http://schemas.openxmlformats.org/drawingml/2006/diagram" xmlns:a="http://schemas.openxmlformats.org/drawingml/2006/main" uniqueId="urn:microsoft.com/office/officeart/2005/8/layout/cycle6">
-  <dgm:title val=""/>
-  <dgm:desc val=""/>
-  <dgm:catLst>
-    <dgm:cat type="cycle" pri="4000"/>
-    <dgm:cat type="relationship" pri="24000"/>
-  </dgm:catLst>
-  <dgm:sampData>
-    <dgm:dataModel>
-      <dgm:ptLst>
-        <dgm:pt modelId="0" type="doc"/>
-        <dgm:pt modelId="1">
-          <dgm:prSet phldr="1"/>
-        </dgm:pt>
-        <dgm:pt modelId="2">
-          <dgm:prSet phldr="1"/>
-        </dgm:pt>
-        <dgm:pt modelId="3">
-          <dgm:prSet phldr="1"/>
-        </dgm:pt>
-        <dgm:pt modelId="4">
-          <dgm:prSet phldr="1"/>
-        </dgm:pt>
-        <dgm:pt modelId="5">
-          <dgm:prSet phldr="1"/>
-        </dgm:pt>
-      </dgm:ptLst>
-      <dgm:cxnLst>
-        <dgm:cxn modelId="6" srcId="0" destId="1" srcOrd="0" destOrd="0"/>
-        <dgm:cxn modelId="7" srcId="0" destId="2" srcOrd="1" destOrd="0"/>
-        <dgm:cxn modelId="8" srcId="0" destId="3" srcOrd="2" destOrd="0"/>
-        <dgm:cxn modelId="9" srcId="0" destId="4" srcOrd="3" destOrd="0"/>
-        <dgm:cxn modelId="10" srcId="0" destId="5" srcOrd="4" destOrd="0"/>
-      </dgm:cxnLst>
-      <dgm:bg/>
-      <dgm:whole/>
-    </dgm:dataModel>
-  </dgm:sampData>
-  <dgm:styleData>
-    <dgm:dataModel>
-      <dgm:ptLst>
-        <dgm:pt modelId="0" type="doc"/>
-        <dgm:pt modelId="1"/>
-        <dgm:pt modelId="2"/>
-        <dgm:pt modelId="3"/>
-      </dgm:ptLst>
-      <dgm:cxnLst>
-        <dgm:cxn modelId="4" srcId="0" destId="1" srcOrd="0" destOrd="0"/>
-        <dgm:cxn modelId="5" srcId="0" destId="2" srcOrd="1" destOrd="0"/>
-        <dgm:cxn modelId="6" srcId="0" destId="3" srcOrd="2" destOrd="0"/>
-      </dgm:cxnLst>
-      <dgm:bg/>
-      <dgm:whole/>
-    </dgm:dataModel>
-  </dgm:styleData>
-  <dgm:clrData>
-    <dgm:dataModel>
-      <dgm:ptLst>
-        <dgm:pt modelId="0" type="doc"/>
-        <dgm:pt modelId="1"/>
-        <dgm:pt modelId="2"/>
-        <dgm:pt modelId="3"/>
-        <dgm:pt modelId="4"/>
-        <dgm:pt modelId="5"/>
-        <dgm:pt modelId="6"/>
-      </dgm:ptLst>
-      <dgm:cxnLst>
-        <dgm:cxn modelId="7" srcId="0" destId="1" srcOrd="0" destOrd="0"/>
-        <dgm:cxn modelId="8" srcId="0" destId="2" srcOrd="1" destOrd="0"/>
-        <dgm:cxn modelId="9" srcId="0" destId="3" srcOrd="2" destOrd="0"/>
-        <dgm:cxn modelId="10" srcId="0" destId="4" srcOrd="3" destOrd="0"/>
-        <dgm:cxn modelId="11" srcId="0" destId="5" srcOrd="4" destOrd="0"/>
-        <dgm:cxn modelId="12" srcId="0" destId="6" srcOrd="5" destOrd="0"/>
-      </dgm:cxnLst>
-      <dgm:bg/>
-      <dgm:whole/>
-    </dgm:dataModel>
-  </dgm:clrData>
-  <dgm:layoutNode name="cycle">
-    <dgm:varLst>
-      <dgm:dir/>
-      <dgm:resizeHandles val="exact"/>
-    </dgm:varLst>
-    <dgm:choose name="Name0">
-      <dgm:if name="Name1" func="var" arg="dir" op="equ" val="norm">
-        <dgm:choose name="Name2">
-          <dgm:if name="Name3" axis="ch" ptType="node" func="cnt" op="gt" val="2">
-            <dgm:alg type="cycle">
-              <dgm:param type="stAng" val="0"/>
-              <dgm:param type="spanAng" val="360"/>
-            </dgm:alg>
-          </dgm:if>
-          <dgm:else name="Name4">
-            <dgm:alg type="cycle">
-              <dgm:param type="stAng" val="-90"/>
-              <dgm:param type="spanAng" val="360"/>
-            </dgm:alg>
-          </dgm:else>
-        </dgm:choose>
-      </dgm:if>
-      <dgm:else name="Name5">
-        <dgm:choose name="Name6">
-          <dgm:if name="Name7" axis="ch" ptType="node" func="cnt" op="gt" val="2">
-            <dgm:alg type="cycle">
-              <dgm:param type="stAng" val="0"/>
-              <dgm:param type="spanAng" val="-360"/>
-            </dgm:alg>
-          </dgm:if>
-          <dgm:else name="Name8">
-            <dgm:alg type="cycle">
-              <dgm:param type="stAng" val="90"/>
-              <dgm:param type="spanAng" val="-360"/>
-            </dgm:alg>
-          </dgm:else>
-        </dgm:choose>
-      </dgm:else>
-    </dgm:choose>
-    <dgm:shape xmlns:r="http://schemas.openxmlformats.org/officeDocument/2006/relationships" r:blip="">
-      <dgm:adjLst/>
-    </dgm:shape>
-    <dgm:presOf/>
-    <dgm:choose name="Name9">
-      <dgm:if name="Name10" func="var" arg="dir" op="equ" val="norm">
-        <dgm:constrLst>
-          <dgm:constr type="w" for="ch" forName="node" refType="w"/>
-          <dgm:constr type="w" for="ch" ptType="sibTrans" refType="w" refFor="ch" refForName="node" op="equ" fact="0.3"/>
-          <dgm:constr type="diam" for="ch" ptType="sibTrans" refType="diam" op="equ"/>
-          <dgm:constr type="sibSp" refType="w" refFor="ch" refForName="node" op="equ" fact="0.15"/>
-          <dgm:constr type="w" for="ch" forName="spNode" refType="sibSp" fact="1.6"/>
-          <dgm:constr type="primFontSz" for="ch" forName="node" op="equ" val="65"/>
-        </dgm:constrLst>
-      </dgm:if>
-      <dgm:else name="Name11">
-        <dgm:constrLst>
-          <dgm:constr type="w" for="ch" forName="node" refType="w"/>
-          <dgm:constr type="w" for="ch" ptType="sibTrans" refType="w" refFor="ch" refForName="node" op="equ" fact="0.3"/>
-          <dgm:constr type="diam" for="ch" ptType="sibTrans" refType="diam" op="equ" fact="-1"/>
-          <dgm:constr type="sibSp" refType="w" refFor="ch" refForName="node" op="equ" fact="0.15"/>
-          <dgm:constr type="w" for="ch" forName="spNode" refType="sibSp" fact="1.6"/>
-          <dgm:constr type="primFontSz" for="ch" forName="node" op="equ" val="65"/>
-        </dgm:constrLst>
-      </dgm:else>
-    </dgm:choose>
-    <dgm:ruleLst/>
-    <dgm:forEach name="Name12" axis="ch" ptType="node">
-      <dgm:layoutNode name="node">
-        <dgm:varLst>
-          <dgm:bulletEnabled val="1"/>
-        </dgm:varLst>
-        <dgm:alg type="tx"/>
-        <dgm:shape xmlns:r="http://schemas.openxmlformats.org/officeDocument/2006/relationships" type="roundRect" r:blip="">
-          <dgm:adjLst/>
-        </dgm:shape>
-        <dgm:presOf axis="desOrSelf" ptType="node"/>
-        <dgm:constrLst>
-          <dgm:constr type="h" refType="w" fact="0.65"/>
-          <dgm:constr type="tMarg" refType="primFontSz" fact="0.3"/>
-          <dgm:constr type="bMarg" refType="primFontSz" fact="0.3"/>
-          <dgm:constr type="lMarg" refType="primFontSz" fact="0.3"/>
-          <dgm:constr type="rMarg" refType="primFontSz" fact="0.3"/>
-        </dgm:constrLst>
-        <dgm:ruleLst>
-          <dgm:rule type="primFontSz" val="5" fact="NaN" max="NaN"/>
-        </dgm:ruleLst>
-      </dgm:layoutNode>
-      <dgm:choose name="Name13">
-        <dgm:if name="Name14" axis="par ch" ptType="doc node" func="cnt" op="gt" val="1">
-          <dgm:layoutNode name="spNode">
-            <dgm:alg type="sp"/>
-            <dgm:shape xmlns:r="http://schemas.openxmlformats.org/officeDocument/2006/relationships" r:blip="">
-              <dgm:adjLst/>
-            </dgm:shape>
-            <dgm:presOf/>
-            <dgm:constrLst>
-              <dgm:constr type="h" refType="w"/>
-            </dgm:constrLst>
-            <dgm:ruleLst/>
-          </dgm:layoutNode>
-          <dgm:forEach name="Name15" axis="followSib" ptType="sibTrans" hideLastTrans="0" cnt="1">
-            <dgm:layoutNode name="sibTrans">
-              <dgm:alg type="conn">
-                <dgm:param type="dim" val="1D"/>
-                <dgm:param type="connRout" val="curve"/>
-                <dgm:param type="begPts" val="radial"/>
-                <dgm:param type="endPts" val="radial"/>
-                <dgm:param type="endSty" val="noArr"/>
-              </dgm:alg>
-              <dgm:shape xmlns:r="http://schemas.openxmlformats.org/officeDocument/2006/relationships" type="conn" r:blip="">
-                <dgm:adjLst/>
-              </dgm:shape>
-              <dgm:presOf axis="self"/>
-              <dgm:constrLst>
-                <dgm:constr type="h" refType="w" fact="0.65"/>
-                <dgm:constr type="connDist"/>
-                <dgm:constr type="begPad" refType="connDist" fact="0.01"/>
-                <dgm:constr type="endPad" refType="connDist" fact="0.01"/>
-              </dgm:constrLst>
-              <dgm:ruleLst/>
-            </dgm:layoutNode>
-          </dgm:forEach>
-        </dgm:if>
-        <dgm:else name="Name16"/>
-      </dgm:choose>
-    </dgm:forEach>
-  </dgm:layoutNode>
-</dgm:layoutDef>
-</file>
-
-<file path=ppt/diagrams/quickStyle1.xml><?xml version="1.0" encoding="utf-8"?>
-<dgm:styleDef xmlns:dgm="http://schemas.openxmlformats.org/drawingml/2006/diagram" xmlns:a="http://schemas.openxmlformats.org/drawingml/2006/main" uniqueId="urn:microsoft.com/office/officeart/2005/8/quickstyle/simple1">
-  <dgm:title val=""/>
-  <dgm:desc val=""/>
-  <dgm:catLst>
-    <dgm:cat type="simple" pri="10100"/>
-  </dgm:catLst>
-  <dgm:scene3d>
-    <a:camera prst="orthographicFront"/>
-    <a:lightRig rig="threePt" dir="t"/>
-  </dgm:scene3d>
-  <dgm:styleLbl name="node0">
-    <dgm:scene3d>
-      <a:camera prst="orthographicFront"/>
-      <a:lightRig rig="threePt" dir="t"/>
-    </dgm:scene3d>
-    <dgm:sp3d/>
-    <dgm:txPr/>
-    <dgm:style>
-      <a:lnRef idx="2">
-        <a:scrgbClr r="0" g="0" b="0"/>
-      </a:lnRef>
-      <a:fillRef idx="1">
-        <a:scrgbClr r="0" g="0" b="0"/>
-      </a:fillRef>
-      <a:effectRef idx="0">
-        <a:scrgbClr r="0" g="0" b="0"/>
-      </a:effectRef>
-      <a:fontRef idx="minor">
-        <a:schemeClr val="lt1"/>
-      </a:fontRef>
-    </dgm:style>
-  </dgm:styleLbl>
-  <dgm:styleLbl name="lnNode1">
-    <dgm:scene3d>
-      <a:camera prst="orthographicFront"/>
-      <a:lightRig rig="threePt" dir="t"/>
-    </dgm:scene3d>
-    <dgm:sp3d/>
-    <dgm:txPr/>
-    <dgm:style>
-      <a:lnRef idx="2">
-        <a:scrgbClr r="0" g="0" b="0"/>
-      </a:lnRef>
-      <a:fillRef idx="1">
-        <a:scrgbClr r="0" g="0" b="0"/>
-      </a:fillRef>
-      <a:effectRef idx="0">
-        <a:scrgbClr r="0" g="0" b="0"/>
-      </a:effectRef>
-      <a:fontRef idx="minor">
-        <a:schemeClr val="lt1"/>
-      </a:fontRef>
-    </dgm:style>
-  </dgm:styleLbl>
-  <dgm:styleLbl name="vennNode1">
-    <dgm:scene3d>
-      <a:camera prst="orthographicFront"/>
-      <a:lightRig rig="threePt" dir="t"/>
-    </dgm:scene3d>
-    <dgm:sp3d/>
-    <dgm:txPr/>
-    <dgm:style>
-      <a:lnRef idx="2">
-        <a:scrgbClr r="0" g="0" b="0"/>
-      </a:lnRef>
-      <a:fillRef idx="1">
-        <a:scrgbClr r="0" g="0" b="0"/>
-      </a:fillRef>
-      <a:effectRef idx="0">
-        <a:scrgbClr r="0" g="0" b="0"/>
-      </a:effectRef>
-      <a:fontRef idx="minor">
-        <a:schemeClr val="tx1"/>
-      </a:fontRef>
-    </dgm:style>
-  </dgm:styleLbl>
-  <dgm:styleLbl name="alignNode1">
-    <dgm:scene3d>
-      <a:camera prst="orthographicFront"/>
-      <a:lightRig rig="threePt" dir="t"/>
-    </dgm:scene3d>
-    <dgm:sp3d/>
-    <dgm:txPr/>
-    <dgm:style>
-      <a:lnRef idx="2">
-        <a:scrgbClr r="0" g="0" b="0"/>
-      </a:lnRef>
-      <a:fillRef idx="1">
-        <a:scrgbClr r="0" g="0" b="0"/>
-      </a:fillRef>
-      <a:effectRef idx="0">
-        <a:scrgbClr r="0" g="0" b="0"/>
-      </a:effectRef>
-      <a:fontRef idx="minor">
-        <a:schemeClr val="lt1"/>
-      </a:fontRef>
-    </dgm:style>
-  </dgm:styleLbl>
-  <dgm:styleLbl name="node1">
-    <dgm:scene3d>
-      <a:camera prst="orthographicFront"/>
-      <a:lightRig rig="threePt" dir="t"/>
-    </dgm:scene3d>
-    <dgm:sp3d/>
-    <dgm:txPr/>
-    <dgm:style>
-      <a:lnRef idx="2">
-        <a:scrgbClr r="0" g="0" b="0"/>
-      </a:lnRef>
-      <a:fillRef idx="1">
-        <a:scrgbClr r="0" g="0" b="0"/>
-      </a:fillRef>
-      <a:effectRef idx="0">
-        <a:scrgbClr r="0" g="0" b="0"/>
-      </a:effectRef>
-      <a:fontRef idx="minor">
-        <a:schemeClr val="lt1"/>
-      </a:fontRef>
-    </dgm:style>
-  </dgm:styleLbl>
-  <dgm:styleLbl name="node2">
-    <dgm:scene3d>
-      <a:camera prst="orthographicFront"/>
-      <a:lightRig rig="threePt" dir="t"/>
-    </dgm:scene3d>
-    <dgm:sp3d/>
-    <dgm:txPr/>
-    <dgm:style>
-      <a:lnRef idx="2">
-        <a:scrgbClr r="0" g="0" b="0"/>
-      </a:lnRef>
-      <a:fillRef idx="1">
-        <a:scrgbClr r="0" g="0" b="0"/>
-      </a:fillRef>
-      <a:effectRef idx="0">
-        <a:scrgbClr r="0" g="0" b="0"/>
-      </a:effectRef>
-      <a:fontRef idx="minor">
-        <a:schemeClr val="lt1"/>
-      </a:fontRef>
-    </dgm:style>
-  </dgm:styleLbl>
-  <dgm:styleLbl name="node3">
-    <dgm:scene3d>
-      <a:camera prst="orthographicFront"/>
-      <a:lightRig rig="threePt" dir="t"/>
-    </dgm:scene3d>
-    <dgm:sp3d/>
-    <dgm:txPr/>
-    <dgm:style>
-      <a:lnRef idx="2">
-        <a:scrgbClr r="0" g="0" b="0"/>
-      </a:lnRef>
-      <a:fillRef idx="1">
-        <a:scrgbClr r="0" g="0" b="0"/>
-      </a:fillRef>
-      <a:effectRef idx="0">
-        <a:scrgbClr r="0" g="0" b="0"/>
-      </a:effectRef>
-      <a:fontRef idx="minor">
-        <a:schemeClr val="lt1"/>
-      </a:fontRef>
-    </dgm:style>
-  </dgm:styleLbl>
-  <dgm:styleLbl name="node4">
-    <dgm:scene3d>
-      <a:camera prst="orthographicFront"/>
-      <a:lightRig rig="threePt" dir="t"/>
-    </dgm:scene3d>
-    <dgm:sp3d/>
-    <dgm:txPr/>
-    <dgm:style>
-      <a:lnRef idx="2">
-        <a:scrgbClr r="0" g="0" b="0"/>
-      </a:lnRef>
-      <a:fillRef idx="1">
-        <a:scrgbClr r="0" g="0" b="0"/>
-      </a:fillRef>
-      <a:effectRef idx="0">
-        <a:scrgbClr r="0" g="0" b="0"/>
-      </a:effectRef>
-      <a:fontRef idx="minor">
-        <a:schemeClr val="lt1"/>
-      </a:fontRef>
-    </dgm:style>
-  </dgm:styleLbl>
-  <dgm:styleLbl name="fgImgPlace1">
-    <dgm:scene3d>
-      <a:camera prst="orthographicFront"/>
-      <a:lightRig rig="threePt" dir="t"/>
-    </dgm:scene3d>
-    <dgm:sp3d/>
-    <dgm:txPr/>
-    <dgm:style>
-      <a:lnRef idx="2">
-        <a:scrgbClr r="0" g="0" b="0"/>
-      </a:lnRef>
-      <a:fillRef idx="1">
-        <a:scrgbClr r="0" g="0" b="0"/>
-      </a:fillRef>
-      <a:effectRef idx="0">
-        <a:scrgbClr r="0" g="0" b="0"/>
-      </a:effectRef>
-      <a:fontRef idx="minor"/>
-    </dgm:style>
-  </dgm:styleLbl>
-  <dgm:styleLbl name="alignImgPlace1">
-    <dgm:scene3d>
-      <a:camera prst="orthographicFront"/>
-      <a:lightRig rig="threePt" dir="t"/>
-    </dgm:scene3d>
-    <dgm:sp3d/>
-    <dgm:txPr/>
-    <dgm:style>
-      <a:lnRef idx="2">
-        <a:scrgbClr r="0" g="0" b="0"/>
-      </a:lnRef>
-      <a:fillRef idx="1">
-        <a:scrgbClr r="0" g="0" b="0"/>
-      </a:fillRef>
-      <a:effectRef idx="0">
-        <a:scrgbClr r="0" g="0" b="0"/>
-      </a:effectRef>
-      <a:fontRef idx="minor"/>
-    </dgm:style>
-  </dgm:styleLbl>
-  <dgm:styleLbl name="bgImgPlace1">
-    <dgm:scene3d>
-      <a:camera prst="orthographicFront"/>
-      <a:lightRig rig="threePt" dir="t"/>
-    </dgm:scene3d>
-    <dgm:sp3d/>
-    <dgm:txPr/>
-    <dgm:style>
-      <a:lnRef idx="2">
-        <a:scrgbClr r="0" g="0" b="0"/>
-      </a:lnRef>
-      <a:fillRef idx="1">
-        <a:scrgbClr r="0" g="0" b="0"/>
-      </a:fillRef>
-      <a:effectRef idx="0">
-        <a:scrgbClr r="0" g="0" b="0"/>
-      </a:effectRef>
-      <a:fontRef idx="minor"/>
-    </dgm:style>
-  </dgm:styleLbl>
-  <dgm:styleLbl name="sibTrans2D1">
-    <dgm:scene3d>
-      <a:camera prst="orthographicFront"/>
-      <a:lightRig rig="threePt" dir="t"/>
-    </dgm:scene3d>
-    <dgm:sp3d/>
-    <dgm:txPr/>
-    <dgm:style>
-      <a:lnRef idx="0">
-        <a:scrgbClr r="0" g="0" b="0"/>
-      </a:lnRef>
-      <a:fillRef idx="1">
-        <a:scrgbClr r="0" g="0" b="0"/>
-      </a:fillRef>
-      <a:effectRef idx="0">
-        <a:scrgbClr r="0" g="0" b="0"/>
-      </a:effectRef>
-      <a:fontRef idx="minor">
-        <a:schemeClr val="lt1"/>
-      </a:fontRef>
-    </dgm:style>
-  </dgm:styleLbl>
-  <dgm:styleLbl name="fgSibTrans2D1">
-    <dgm:scene3d>
-      <a:camera prst="orthographicFront"/>
-      <a:lightRig rig="threePt" dir="t"/>
-    </dgm:scene3d>
-    <dgm:sp3d/>
-    <dgm:txPr/>
-    <dgm:style>
-      <a:lnRef idx="0">
-        <a:scrgbClr r="0" g="0" b="0"/>
-      </a:lnRef>
-      <a:fillRef idx="1">
-        <a:scrgbClr r="0" g="0" b="0"/>
-      </a:fillRef>
-      <a:effectRef idx="0">
-        <a:scrgbClr r="0" g="0" b="0"/>
-      </a:effectRef>
-      <a:fontRef idx="minor">
-        <a:schemeClr val="lt1"/>
-      </a:fontRef>
-    </dgm:style>
-  </dgm:styleLbl>
-  <dgm:styleLbl name="bgSibTrans2D1">
-    <dgm:scene3d>
-      <a:camera prst="orthographicFront"/>
-      <a:lightRig rig="threePt" dir="t"/>
-    </dgm:scene3d>
-    <dgm:sp3d/>
-    <dgm:txPr/>
-    <dgm:style>
-      <a:lnRef idx="0">
-        <a:scrgbClr r="0" g="0" b="0"/>
-      </a:lnRef>
-      <a:fillRef idx="1">
-        <a:scrgbClr r="0" g="0" b="0"/>
-      </a:fillRef>
-      <a:effectRef idx="0">
-        <a:scrgbClr r="0" g="0" b="0"/>
-      </a:effectRef>
-      <a:fontRef idx="minor">
-        <a:schemeClr val="lt1"/>
-      </a:fontRef>
-    </dgm:style>
-  </dgm:styleLbl>
-  <dgm:styleLbl name="sibTrans1D1">
-    <dgm:scene3d>
-      <a:camera prst="orthographicFront"/>
-      <a:lightRig rig="threePt" dir="t"/>
-    </dgm:scene3d>
-    <dgm:sp3d/>
-    <dgm:txPr/>
-    <dgm:style>
-      <a:lnRef idx="1">
-        <a:scrgbClr r="0" g="0" b="0"/>
-      </a:lnRef>
-      <a:fillRef idx="0">
-        <a:scrgbClr r="0" g="0" b="0"/>
-      </a:fillRef>
-      <a:effectRef idx="0">
-        <a:scrgbClr r="0" g="0" b="0"/>
-      </a:effectRef>
-      <a:fontRef idx="minor"/>
-    </dgm:style>
-  </dgm:styleLbl>
-  <dgm:styleLbl name="callout">
-    <dgm:scene3d>
-      <a:camera prst="orthographicFront"/>
-      <a:lightRig rig="threePt" dir="t"/>
-    </dgm:scene3d>
-    <dgm:sp3d/>
-    <dgm:txPr/>
-    <dgm:style>
-      <a:lnRef idx="2">
-        <a:scrgbClr r="0" g="0" b="0"/>
-      </a:lnRef>
-      <a:fillRef idx="1">
-        <a:scrgbClr r="0" g="0" b="0"/>
-      </a:fillRef>
-      <a:effectRef idx="0">
-        <a:scrgbClr r="0" g="0" b="0"/>
-      </a:effectRef>
-      <a:fontRef idx="minor"/>
-    </dgm:style>
-  </dgm:styleLbl>
-  <dgm:styleLbl name="asst0">
-    <dgm:scene3d>
-      <a:camera prst="orthographicFront"/>
-      <a:lightRig rig="threePt" dir="t"/>
-    </dgm:scene3d>
-    <dgm:sp3d/>
-    <dgm:txPr/>
-    <dgm:style>
-      <a:lnRef idx="2">
-        <a:scrgbClr r="0" g="0" b="0"/>
-      </a:lnRef>
-      <a:fillRef idx="1">
-        <a:scrgbClr r="0" g="0" b="0"/>
-      </a:fillRef>
-      <a:effectRef idx="0">
-        <a:scrgbClr r="0" g="0" b="0"/>
-      </a:effectRef>
-      <a:fontRef idx="minor">
-        <a:schemeClr val="lt1"/>
-      </a:fontRef>
-    </dgm:style>
-  </dgm:styleLbl>
-  <dgm:styleLbl name="asst1">
-    <dgm:scene3d>
-      <a:camera prst="orthographicFront"/>
-      <a:lightRig rig="threePt" dir="t"/>
-    </dgm:scene3d>
-    <dgm:sp3d/>
-    <dgm:txPr/>
-    <dgm:style>
-      <a:lnRef idx="2">
-        <a:scrgbClr r="0" g="0" b="0"/>
-      </a:lnRef>
-      <a:fillRef idx="1">
-        <a:scrgbClr r="0" g="0" b="0"/>
-      </a:fillRef>
-      <a:effectRef idx="0">
-        <a:scrgbClr r="0" g="0" b="0"/>
-      </a:effectRef>
-      <a:fontRef idx="minor">
-        <a:schemeClr val="lt1"/>
-      </a:fontRef>
-    </dgm:style>
-  </dgm:styleLbl>
-  <dgm:styleLbl name="asst2">
-    <dgm:scene3d>
-      <a:camera prst="orthographicFront"/>
-      <a:lightRig rig="threePt" dir="t"/>
-    </dgm:scene3d>
-    <dgm:sp3d/>
-    <dgm:txPr/>
-    <dgm:style>
-      <a:lnRef idx="2">
-        <a:scrgbClr r="0" g="0" b="0"/>
-      </a:lnRef>
-      <a:fillRef idx="1">
-        <a:scrgbClr r="0" g="0" b="0"/>
-      </a:fillRef>
-      <a:effectRef idx="0">
-        <a:scrgbClr r="0" g="0" b="0"/>
-      </a:effectRef>
-      <a:fontRef idx="minor">
-        <a:schemeClr val="lt1"/>
-      </a:fontRef>
-    </dgm:style>
-  </dgm:styleLbl>
-  <dgm:styleLbl name="asst3">
-    <dgm:scene3d>
-      <a:camera prst="orthographicFront"/>
-      <a:lightRig rig="threePt" dir="t"/>
-    </dgm:scene3d>
-    <dgm:sp3d/>
-    <dgm:txPr/>
-    <dgm:style>
-      <a:lnRef idx="2">
-        <a:scrgbClr r="0" g="0" b="0"/>
-      </a:lnRef>
-      <a:fillRef idx="1">
-        <a:scrgbClr r="0" g="0" b="0"/>
-      </a:fillRef>
-      <a:effectRef idx="0">
-        <a:scrgbClr r="0" g="0" b="0"/>
-      </a:effectRef>
-      <a:fontRef idx="minor">
-        <a:schemeClr val="lt1"/>
-      </a:fontRef>
-    </dgm:style>
-  </dgm:styleLbl>
-  <dgm:styleLbl name="asst4">
-    <dgm:scene3d>
-      <a:camera prst="orthographicFront"/>
-      <a:lightRig rig="threePt" dir="t"/>
-    </dgm:scene3d>
-    <dgm:sp3d/>
-    <dgm:txPr/>
-    <dgm:style>
-      <a:lnRef idx="2">
-        <a:scrgbClr r="0" g="0" b="0"/>
-      </a:lnRef>
-      <a:fillRef idx="1">
-        <a:scrgbClr r="0" g="0" b="0"/>
-      </a:fillRef>
-      <a:effectRef idx="0">
-        <a:scrgbClr r="0" g="0" b="0"/>
-      </a:effectRef>
-      <a:fontRef idx="minor">
-        <a:schemeClr val="lt1"/>
-      </a:fontRef>
-    </dgm:style>
-  </dgm:styleLbl>
-  <dgm:styleLbl name="parChTrans2D1">
-    <dgm:scene3d>
-      <a:camera prst="orthographicFront"/>
-      <a:lightRig rig="threePt" dir="t"/>
-    </dgm:scene3d>
-    <dgm:sp3d/>
-    <dgm:txPr/>
-    <dgm:style>
-      <a:lnRef idx="2">
-        <a:scrgbClr r="0" g="0" b="0"/>
-      </a:lnRef>
-      <a:fillRef idx="1">
-        <a:scrgbClr r="0" g="0" b="0"/>
-      </a:fillRef>
-      <a:effectRef idx="0">
-        <a:scrgbClr r="0" g="0" b="0"/>
-      </a:effectRef>
-      <a:fontRef idx="minor">
-        <a:schemeClr val="lt1"/>
-      </a:fontRef>
-    </dgm:style>
-  </dgm:styleLbl>
-  <dgm:styleLbl name="parChTrans2D2">
-    <dgm:scene3d>
-      <a:camera prst="orthographicFront"/>
-      <a:lightRig rig="threePt" dir="t"/>
-    </dgm:scene3d>
-    <dgm:sp3d/>
-    <dgm:txPr/>
-    <dgm:style>
-      <a:lnRef idx="2">
-        <a:scrgbClr r="0" g="0" b="0"/>
-      </a:lnRef>
-      <a:fillRef idx="1">
-        <a:scrgbClr r="0" g="0" b="0"/>
-      </a:fillRef>
-      <a:effectRef idx="0">
-        <a:scrgbClr r="0" g="0" b="0"/>
-      </a:effectRef>
-      <a:fontRef idx="minor">
-        <a:schemeClr val="lt1"/>
-      </a:fontRef>
-    </dgm:style>
-  </dgm:styleLbl>
-  <dgm:styleLbl name="parChTrans2D3">
-    <dgm:scene3d>
-      <a:camera prst="orthographicFront"/>
-      <a:lightRig rig="threePt" dir="t"/>
-    </dgm:scene3d>
-    <dgm:sp3d/>
-    <dgm:txPr/>
-    <dgm:style>
-      <a:lnRef idx="2">
-        <a:scrgbClr r="0" g="0" b="0"/>
-      </a:lnRef>
-      <a:fillRef idx="1">
-        <a:scrgbClr r="0" g="0" b="0"/>
-      </a:fillRef>
-      <a:effectRef idx="0">
-        <a:scrgbClr r="0" g="0" b="0"/>
-      </a:effectRef>
-      <a:fontRef idx="minor">
-        <a:schemeClr val="lt1"/>
-      </a:fontRef>
-    </dgm:style>
-  </dgm:styleLbl>
-  <dgm:styleLbl name="parChTrans2D4">
-    <dgm:scene3d>
-      <a:camera prst="orthographicFront"/>
-      <a:lightRig rig="threePt" dir="t"/>
-    </dgm:scene3d>
-    <dgm:sp3d/>
-    <dgm:txPr/>
-    <dgm:style>
-      <a:lnRef idx="2">
-        <a:scrgbClr r="0" g="0" b="0"/>
-      </a:lnRef>
-      <a:fillRef idx="1">
-        <a:scrgbClr r="0" g="0" b="0"/>
-      </a:fillRef>
-      <a:effectRef idx="0">
-        <a:scrgbClr r="0" g="0" b="0"/>
-      </a:effectRef>
-      <a:fontRef idx="minor">
-        <a:schemeClr val="lt1"/>
-      </a:fontRef>
-    </dgm:style>
-  </dgm:styleLbl>
-  <dgm:styleLbl name="parChTrans1D1">
-    <dgm:scene3d>
-      <a:camera prst="orthographicFront"/>
-      <a:lightRig rig="threePt" dir="t"/>
-    </dgm:scene3d>
-    <dgm:sp3d/>
-    <dgm:txPr/>
-    <dgm:style>
-      <a:lnRef idx="2">
-        <a:scrgbClr r="0" g="0" b="0"/>
-      </a:lnRef>
-      <a:fillRef idx="0">
-        <a:scrgbClr r="0" g="0" b="0"/>
-      </a:fillRef>
-      <a:effectRef idx="0">
-        <a:scrgbClr r="0" g="0" b="0"/>
-      </a:effectRef>
-      <a:fontRef idx="minor"/>
-    </dgm:style>
-  </dgm:styleLbl>
-  <dgm:styleLbl name="parChTrans1D2">
-    <dgm:scene3d>
-      <a:camera prst="orthographicFront"/>
-      <a:lightRig rig="threePt" dir="t"/>
-    </dgm:scene3d>
-    <dgm:sp3d/>
-    <dgm:txPr/>
-    <dgm:style>
-      <a:lnRef idx="2">
-        <a:scrgbClr r="0" g="0" b="0"/>
-      </a:lnRef>
-      <a:fillRef idx="0">
-        <a:scrgbClr r="0" g="0" b="0"/>
-      </a:fillRef>
-      <a:effectRef idx="0">
-        <a:scrgbClr r="0" g="0" b="0"/>
-      </a:effectRef>
-      <a:fontRef idx="minor"/>
-    </dgm:style>
-  </dgm:styleLbl>
-  <dgm:styleLbl name="parChTrans1D3">
-    <dgm:scene3d>
-      <a:camera prst="orthographicFront"/>
-      <a:lightRig rig="threePt" dir="t"/>
-    </dgm:scene3d>
-    <dgm:sp3d/>
-    <dgm:txPr/>
-    <dgm:style>
-      <a:lnRef idx="2">
-        <a:scrgbClr r="0" g="0" b="0"/>
-      </a:lnRef>
-      <a:fillRef idx="0">
-        <a:scrgbClr r="0" g="0" b="0"/>
-      </a:fillRef>
-      <a:effectRef idx="0">
-        <a:scrgbClr r="0" g="0" b="0"/>
-      </a:effectRef>
-      <a:fontRef idx="minor"/>
-    </dgm:style>
-  </dgm:styleLbl>
-  <dgm:styleLbl name="parChTrans1D4">
-    <dgm:scene3d>
-      <a:camera prst="orthographicFront"/>
-      <a:lightRig rig="threePt" dir="t"/>
-    </dgm:scene3d>
-    <dgm:sp3d/>
-    <dgm:txPr/>
-    <dgm:style>
-      <a:lnRef idx="2">
-        <a:scrgbClr r="0" g="0" b="0"/>
-      </a:lnRef>
-      <a:fillRef idx="0">
-        <a:scrgbClr r="0" g="0" b="0"/>
-      </a:fillRef>
-      <a:effectRef idx="0">
-        <a:scrgbClr r="0" g="0" b="0"/>
-      </a:effectRef>
-      <a:fontRef idx="minor"/>
-    </dgm:style>
-  </dgm:styleLbl>
-  <dgm:styleLbl name="fgAcc1">
-    <dgm:scene3d>
-      <a:camera prst="orthographicFront"/>
-      <a:lightRig rig="threePt" dir="t"/>
-    </dgm:scene3d>
-    <dgm:sp3d/>
-    <dgm:txPr/>
-    <dgm:style>
-      <a:lnRef idx="2">
-        <a:scrgbClr r="0" g="0" b="0"/>
-      </a:lnRef>
-      <a:fillRef idx="1">
-        <a:scrgbClr r="0" g="0" b="0"/>
-      </a:fillRef>
-      <a:effectRef idx="0">
-        <a:scrgbClr r="0" g="0" b="0"/>
-      </a:effectRef>
-      <a:fontRef idx="minor"/>
-    </dgm:style>
-  </dgm:styleLbl>
-  <dgm:styleLbl name="conFgAcc1">
-    <dgm:scene3d>
-      <a:camera prst="orthographicFront"/>
-      <a:lightRig rig="threePt" dir="t"/>
-    </dgm:scene3d>
-    <dgm:sp3d/>
-    <dgm:txPr/>
-    <dgm:style>
-      <a:lnRef idx="2">
-        <a:scrgbClr r="0" g="0" b="0"/>
-      </a:lnRef>
-      <a:fillRef idx="1">
-        <a:scrgbClr r="0" g="0" b="0"/>
-      </a:fillRef>
-      <a:effectRef idx="0">
-        <a:scrgbClr r="0" g="0" b="0"/>
-      </a:effectRef>
-      <a:fontRef idx="minor"/>
-    </dgm:style>
-  </dgm:styleLbl>
-  <dgm:styleLbl name="alignAcc1">
-    <dgm:scene3d>
-      <a:camera prst="orthographicFront"/>
-      <a:lightRig rig="threePt" dir="t"/>
-    </dgm:scene3d>
-    <dgm:sp3d/>
-    <dgm:txPr/>
-    <dgm:style>
-      <a:lnRef idx="2">
-        <a:scrgbClr r="0" g="0" b="0"/>
-      </a:lnRef>
-      <a:fillRef idx="1">
-        <a:scrgbClr r="0" g="0" b="0"/>
-      </a:fillRef>
-      <a:effectRef idx="0">
-        <a:scrgbClr r="0" g="0" b="0"/>
-      </a:effectRef>
-      <a:fontRef idx="minor"/>
-    </dgm:style>
-  </dgm:styleLbl>
-  <dgm:styleLbl name="trAlignAcc1">
-    <dgm:scene3d>
-      <a:camera prst="orthographicFront"/>
-      <a:lightRig rig="threePt" dir="t"/>
-    </dgm:scene3d>
-    <dgm:sp3d/>
-    <dgm:txPr/>
-    <dgm:style>
-      <a:lnRef idx="1">
-        <a:scrgbClr r="0" g="0" b="0"/>
-      </a:lnRef>
-      <a:fillRef idx="1">
-        <a:scrgbClr r="0" g="0" b="0"/>
-      </a:fillRef>
-      <a:effectRef idx="0">
-        <a:scrgbClr r="0" g="0" b="0"/>
-      </a:effectRef>
-      <a:fontRef idx="minor"/>
-    </dgm:style>
-  </dgm:styleLbl>
-  <dgm:styleLbl name="bgAcc1">
-    <dgm:scene3d>
-      <a:camera prst="orthographicFront"/>
-      <a:lightRig rig="threePt" dir="t"/>
-    </dgm:scene3d>
-    <dgm:sp3d/>
-    <dgm:txPr/>
-    <dgm:style>
-      <a:lnRef idx="2">
-        <a:scrgbClr r="0" g="0" b="0"/>
-      </a:lnRef>
-      <a:fillRef idx="1">
-        <a:scrgbClr r="0" g="0" b="0"/>
-      </a:fillRef>
-      <a:effectRef idx="0">
-        <a:scrgbClr r="0" g="0" b="0"/>
-      </a:effectRef>
-      <a:fontRef idx="minor"/>
-    </dgm:style>
-  </dgm:styleLbl>
-  <dgm:styleLbl name="solidFgAcc1">
-    <dgm:scene3d>
-      <a:camera prst="orthographicFront"/>
-      <a:lightRig rig="threePt" dir="t"/>
-    </dgm:scene3d>
-    <dgm:sp3d/>
-    <dgm:txPr/>
-    <dgm:style>
-      <a:lnRef idx="2">
-        <a:scrgbClr r="0" g="0" b="0"/>
-      </a:lnRef>
-      <a:fillRef idx="1">
-        <a:scrgbClr r="0" g="0" b="0"/>
-      </a:fillRef>
-      <a:effectRef idx="0">
-        <a:scrgbClr r="0" g="0" b="0"/>
-      </a:effectRef>
-      <a:fontRef idx="minor"/>
-    </dgm:style>
-  </dgm:styleLbl>
-  <dgm:styleLbl name="solidAlignAcc1">
-    <dgm:scene3d>
-      <a:camera prst="orthographicFront"/>
-      <a:lightRig rig="threePt" dir="t"/>
-    </dgm:scene3d>
-    <dgm:sp3d/>
-    <dgm:txPr/>
-    <dgm:style>
-      <a:lnRef idx="2">
-        <a:scrgbClr r="0" g="0" b="0"/>
-      </a:lnRef>
-      <a:fillRef idx="1">
-        <a:scrgbClr r="0" g="0" b="0"/>
-      </a:fillRef>
-      <a:effectRef idx="0">
-        <a:scrgbClr r="0" g="0" b="0"/>
-      </a:effectRef>
-      <a:fontRef idx="minor"/>
-    </dgm:style>
-  </dgm:styleLbl>
-  <dgm:styleLbl name="solidBgAcc1">
-    <dgm:scene3d>
-      <a:camera prst="orthographicFront"/>
-      <a:lightRig rig="threePt" dir="t"/>
-    </dgm:scene3d>
-    <dgm:sp3d/>
-    <dgm:txPr/>
-    <dgm:style>
-      <a:lnRef idx="2">
-        <a:scrgbClr r="0" g="0" b="0"/>
-      </a:lnRef>
-      <a:fillRef idx="1">
-        <a:scrgbClr r="0" g="0" b="0"/>
-      </a:fillRef>
-      <a:effectRef idx="0">
-        <a:scrgbClr r="0" g="0" b="0"/>
-      </a:effectRef>
-      <a:fontRef idx="minor"/>
-    </dgm:style>
-  </dgm:styleLbl>
-  <dgm:styleLbl name="fgAccFollowNode1">
-    <dgm:scene3d>
-      <a:camera prst="orthographicFront"/>
-      <a:lightRig rig="threePt" dir="t"/>
-    </dgm:scene3d>
-    <dgm:sp3d/>
-    <dgm:txPr/>
-    <dgm:style>
-      <a:lnRef idx="2">
-        <a:scrgbClr r="0" g="0" b="0"/>
-      </a:lnRef>
-      <a:fillRef idx="1">
-        <a:scrgbClr r="0" g="0" b="0"/>
-      </a:fillRef>
-      <a:effectRef idx="0">
-        <a:scrgbClr r="0" g="0" b="0"/>
-      </a:effectRef>
-      <a:fontRef idx="minor"/>
-    </dgm:style>
-  </dgm:styleLbl>
-  <dgm:styleLbl name="alignAccFollowNode1">
-    <dgm:scene3d>
-      <a:camera prst="orthographicFront"/>
-      <a:lightRig rig="threePt" dir="t"/>
-    </dgm:scene3d>
-    <dgm:sp3d/>
-    <dgm:txPr/>
-    <dgm:style>
-      <a:lnRef idx="2">
-        <a:scrgbClr r="0" g="0" b="0"/>
-      </a:lnRef>
-      <a:fillRef idx="1">
-        <a:scrgbClr r="0" g="0" b="0"/>
-      </a:fillRef>
-      <a:effectRef idx="0">
-        <a:scrgbClr r="0" g="0" b="0"/>
-      </a:effectRef>
-      <a:fontRef idx="minor"/>
-    </dgm:style>
-  </dgm:styleLbl>
-  <dgm:styleLbl name="bgAccFollowNode1">
-    <dgm:scene3d>
-      <a:camera prst="orthographicFront"/>
-      <a:lightRig rig="threePt" dir="t"/>
-    </dgm:scene3d>
-    <dgm:sp3d/>
-    <dgm:txPr/>
-    <dgm:style>
-      <a:lnRef idx="2">
-        <a:scrgbClr r="0" g="0" b="0"/>
-      </a:lnRef>
-      <a:fillRef idx="1">
-        <a:scrgbClr r="0" g="0" b="0"/>
-      </a:fillRef>
-      <a:effectRef idx="0">
-        <a:scrgbClr r="0" g="0" b="0"/>
-      </a:effectRef>
-      <a:fontRef idx="minor"/>
-    </dgm:style>
-  </dgm:styleLbl>
-  <dgm:styleLbl name="fgAcc0">
-    <dgm:scene3d>
-      <a:camera prst="orthographicFront"/>
-      <a:lightRig rig="threePt" dir="t"/>
-    </dgm:scene3d>
-    <dgm:sp3d/>
-    <dgm:txPr/>
-    <dgm:style>
-      <a:lnRef idx="2">
-        <a:scrgbClr r="0" g="0" b="0"/>
-      </a:lnRef>
-      <a:fillRef idx="1">
-        <a:scrgbClr r="0" g="0" b="0"/>
-      </a:fillRef>
-      <a:effectRef idx="0">
-        <a:scrgbClr r="0" g="0" b="0"/>
-      </a:effectRef>
-      <a:fontRef idx="minor"/>
-    </dgm:style>
-  </dgm:styleLbl>
-  <dgm:styleLbl name="fgAcc2">
-    <dgm:scene3d>
-      <a:camera prst="orthographicFront"/>
-      <a:lightRig rig="threePt" dir="t"/>
-    </dgm:scene3d>
-    <dgm:sp3d/>
-    <dgm:txPr/>
-    <dgm:style>
-      <a:lnRef idx="2">
-        <a:scrgbClr r="0" g="0" b="0"/>
-      </a:lnRef>
-      <a:fillRef idx="1">
-        <a:scrgbClr r="0" g="0" b="0"/>
-      </a:fillRef>
-      <a:effectRef idx="0">
-        <a:scrgbClr r="0" g="0" b="0"/>
-      </a:effectRef>
-      <a:fontRef idx="minor"/>
-    </dgm:style>
-  </dgm:styleLbl>
-  <dgm:styleLbl name="fgAcc3">
-    <dgm:scene3d>
-      <a:camera prst="orthographicFront"/>
-      <a:lightRig rig="threePt" dir="t"/>
-    </dgm:scene3d>
-    <dgm:sp3d/>
-    <dgm:txPr/>
-    <dgm:style>
-      <a:lnRef idx="2">
-        <a:scrgbClr r="0" g="0" b="0"/>
-      </a:lnRef>
-      <a:fillRef idx="1">
-        <a:scrgbClr r="0" g="0" b="0"/>
-      </a:fillRef>
-      <a:effectRef idx="0">
-        <a:scrgbClr r="0" g="0" b="0"/>
-      </a:effectRef>
-      <a:fontRef idx="minor"/>
-    </dgm:style>
-  </dgm:styleLbl>
-  <dgm:styleLbl name="fgAcc4">
-    <dgm:scene3d>
-      <a:camera prst="orthographicFront"/>
-      <a:lightRig rig="threePt" dir="t"/>
-    </dgm:scene3d>
-    <dgm:sp3d/>
-    <dgm:txPr/>
-    <dgm:style>
-      <a:lnRef idx="2">
-        <a:scrgbClr r="0" g="0" b="0"/>
-      </a:lnRef>
-      <a:fillRef idx="1">
-        <a:scrgbClr r="0" g="0" b="0"/>
-      </a:fillRef>
-      <a:effectRef idx="0">
-        <a:scrgbClr r="0" g="0" b="0"/>
-      </a:effectRef>
-      <a:fontRef idx="minor"/>
-    </dgm:style>
-  </dgm:styleLbl>
-  <dgm:styleLbl name="bgShp">
-    <dgm:scene3d>
-      <a:camera prst="orthographicFront"/>
-      <a:lightRig rig="threePt" dir="t"/>
-    </dgm:scene3d>
-    <dgm:sp3d/>
-    <dgm:txPr/>
-    <dgm:style>
-      <a:lnRef idx="0">
-        <a:scrgbClr r="0" g="0" b="0"/>
-      </a:lnRef>
-      <a:fillRef idx="1">
-        <a:scrgbClr r="0" g="0" b="0"/>
-      </a:fillRef>
-      <a:effectRef idx="0">
-        <a:scrgbClr r="0" g="0" b="0"/>
-      </a:effectRef>
-      <a:fontRef idx="minor"/>
-    </dgm:style>
-  </dgm:styleLbl>
-  <dgm:styleLbl name="dkBgShp">
-    <dgm:scene3d>
-      <a:camera prst="orthographicFront"/>
-      <a:lightRig rig="threePt" dir="t"/>
-    </dgm:scene3d>
-    <dgm:sp3d/>
-    <dgm:txPr/>
-    <dgm:style>
-      <a:lnRef idx="0">
-        <a:scrgbClr r="0" g="0" b="0"/>
-      </a:lnRef>
-      <a:fillRef idx="1">
-        <a:scrgbClr r="0" g="0" b="0"/>
-      </a:fillRef>
-      <a:effectRef idx="0">
-        <a:scrgbClr r="0" g="0" b="0"/>
-      </a:effectRef>
-      <a:fontRef idx="minor"/>
-    </dgm:style>
-  </dgm:styleLbl>
-  <dgm:styleLbl name="trBgShp">
-    <dgm:scene3d>
-      <a:camera prst="orthographicFront"/>
-      <a:lightRig rig="threePt" dir="t"/>
-    </dgm:scene3d>
-    <dgm:sp3d/>
-    <dgm:txPr/>
-    <dgm:style>
-      <a:lnRef idx="0">
-        <a:scrgbClr r="0" g="0" b="0"/>
-      </a:lnRef>
-      <a:fillRef idx="1">
-        <a:scrgbClr r="0" g="0" b="0"/>
-      </a:fillRef>
-      <a:effectRef idx="0">
-        <a:scrgbClr r="0" g="0" b="0"/>
-      </a:effectRef>
-      <a:fontRef idx="minor"/>
-    </dgm:style>
-  </dgm:styleLbl>
-  <dgm:styleLbl name="fgShp">
-    <dgm:scene3d>
-      <a:camera prst="orthographicFront"/>
-      <a:lightRig rig="threePt" dir="t"/>
-    </dgm:scene3d>
-    <dgm:sp3d/>
-    <dgm:txPr/>
-    <dgm:style>
-      <a:lnRef idx="2">
-        <a:scrgbClr r="0" g="0" b="0"/>
-      </a:lnRef>
-      <a:fillRef idx="1">
-        <a:scrgbClr r="0" g="0" b="0"/>
-      </a:fillRef>
-      <a:effectRef idx="0">
-        <a:scrgbClr r="0" g="0" b="0"/>
-      </a:effectRef>
-      <a:fontRef idx="minor"/>
-    </dgm:style>
-  </dgm:styleLbl>
-  <dgm:styleLbl name="revTx">
-    <dgm:scene3d>
-      <a:camera prst="orthographicFront"/>
-      <a:lightRig rig="threePt" dir="t"/>
-    </dgm:scene3d>
-    <dgm:sp3d/>
-    <dgm:txPr/>
-    <dgm:style>
-      <a:lnRef idx="0">
-        <a:scrgbClr r="0" g="0" b="0"/>
-      </a:lnRef>
-      <a:fillRef idx="0">
-        <a:scrgbClr r="0" g="0" b="0"/>
-      </a:fillRef>
-      <a:effectRef idx="0">
-        <a:scrgbClr r="0" g="0" b="0"/>
-      </a:effectRef>
-      <a:fontRef idx="minor"/>
-    </dgm:style>
-  </dgm:styleLbl>
-</dgm:styleDef>
-</file>
-
 <file path=ppt/notesMasters/notesMaster1.xml><?xml version="1.0" encoding="utf-8"?>
 <p:notesMaster xmlns:a="http://schemas.openxmlformats.org/drawingml/2006/main" xmlns:r="http://schemas.openxmlformats.org/officeDocument/2006/relationships" xmlns:p="http://schemas.openxmlformats.org/presentationml/2006/main">
   <p:cSld>
@@ -3377,17 +260,17 @@
         <p:spPr>
           <a:xfrm>
             <a:off x="0" y="0"/>
-            <a:ext cx="2971800" cy="457200"/>
+            <a:ext cx="3169920" cy="480060"/>
           </a:xfrm>
           <a:prstGeom prst="rect">
             <a:avLst/>
           </a:prstGeom>
         </p:spPr>
         <p:txBody>
-          <a:bodyPr vert="horz" lIns="91440" tIns="45720" rIns="91440" bIns="45720" rtlCol="0"/>
+          <a:bodyPr vert="horz" lIns="96661" tIns="48331" rIns="96661" bIns="48331" rtlCol="0"/>
           <a:lstStyle>
             <a:lvl1pPr algn="l">
-              <a:defRPr sz="1200"/>
+              <a:defRPr sz="1300"/>
             </a:lvl1pPr>
           </a:lstStyle>
           <a:p>
@@ -3407,24 +290,24 @@
         </p:nvSpPr>
         <p:spPr>
           <a:xfrm>
-            <a:off x="3884613" y="0"/>
-            <a:ext cx="2971800" cy="457200"/>
+            <a:off x="4143587" y="0"/>
+            <a:ext cx="3169920" cy="480060"/>
           </a:xfrm>
           <a:prstGeom prst="rect">
             <a:avLst/>
           </a:prstGeom>
         </p:spPr>
         <p:txBody>
-          <a:bodyPr vert="horz" lIns="91440" tIns="45720" rIns="91440" bIns="45720" rtlCol="0"/>
+          <a:bodyPr vert="horz" lIns="96661" tIns="48331" rIns="96661" bIns="48331" rtlCol="0"/>
           <a:lstStyle>
             <a:lvl1pPr algn="r">
-              <a:defRPr sz="1200"/>
+              <a:defRPr sz="1300"/>
             </a:lvl1pPr>
           </a:lstStyle>
           <a:p>
             <a:fld id="{B30E51E2-B254-44F4-A32B-7A29226C2481}" type="datetimeFigureOut">
               <a:rPr lang="en-US" smtClean="0"/>
-              <a:t>10/6/2011</a:t>
+              <a:t>6/12/2012</a:t>
             </a:fld>
             <a:endParaRPr lang="en-US"/>
           </a:p>
@@ -3442,8 +325,8 @@
         </p:nvSpPr>
         <p:spPr>
           <a:xfrm>
-            <a:off x="1143000" y="685800"/>
-            <a:ext cx="4572000" cy="3429000"/>
+            <a:off x="1257300" y="720725"/>
+            <a:ext cx="4800600" cy="3600450"/>
           </a:xfrm>
           <a:prstGeom prst="rect">
             <a:avLst/>
@@ -3456,7 +339,7 @@
           </a:ln>
         </p:spPr>
         <p:txBody>
-          <a:bodyPr vert="horz" lIns="91440" tIns="45720" rIns="91440" bIns="45720" rtlCol="0" anchor="ctr"/>
+          <a:bodyPr vert="horz" lIns="96661" tIns="48331" rIns="96661" bIns="48331" rtlCol="0" anchor="ctr"/>
           <a:lstStyle/>
           <a:p>
             <a:endParaRPr lang="en-US"/>
@@ -3475,15 +358,15 @@
         </p:nvSpPr>
         <p:spPr>
           <a:xfrm>
-            <a:off x="685800" y="4343400"/>
-            <a:ext cx="5486400" cy="4114800"/>
+            <a:off x="731520" y="4560570"/>
+            <a:ext cx="5852160" cy="4320540"/>
           </a:xfrm>
           <a:prstGeom prst="rect">
             <a:avLst/>
           </a:prstGeom>
         </p:spPr>
         <p:txBody>
-          <a:bodyPr vert="horz" lIns="91440" tIns="45720" rIns="91440" bIns="45720" rtlCol="0"/>
+          <a:bodyPr vert="horz" lIns="96661" tIns="48331" rIns="96661" bIns="48331" rtlCol="0"/>
           <a:lstStyle/>
           <a:p>
             <a:pPr lvl="0"/>
@@ -3535,18 +418,18 @@
         </p:nvSpPr>
         <p:spPr>
           <a:xfrm>
-            <a:off x="0" y="8685213"/>
-            <a:ext cx="2971800" cy="457200"/>
+            <a:off x="0" y="9119474"/>
+            <a:ext cx="3169920" cy="480060"/>
           </a:xfrm>
           <a:prstGeom prst="rect">
             <a:avLst/>
           </a:prstGeom>
         </p:spPr>
         <p:txBody>
-          <a:bodyPr vert="horz" lIns="91440" tIns="45720" rIns="91440" bIns="45720" rtlCol="0" anchor="b"/>
+          <a:bodyPr vert="horz" lIns="96661" tIns="48331" rIns="96661" bIns="48331" rtlCol="0" anchor="b"/>
           <a:lstStyle>
             <a:lvl1pPr algn="l">
-              <a:defRPr sz="1200"/>
+              <a:defRPr sz="1300"/>
             </a:lvl1pPr>
           </a:lstStyle>
           <a:p>
@@ -3566,18 +449,18 @@
         </p:nvSpPr>
         <p:spPr>
           <a:xfrm>
-            <a:off x="3884613" y="8685213"/>
-            <a:ext cx="2971800" cy="457200"/>
+            <a:off x="4143587" y="9119474"/>
+            <a:ext cx="3169920" cy="480060"/>
           </a:xfrm>
           <a:prstGeom prst="rect">
             <a:avLst/>
           </a:prstGeom>
         </p:spPr>
         <p:txBody>
-          <a:bodyPr vert="horz" lIns="91440" tIns="45720" rIns="91440" bIns="45720" rtlCol="0" anchor="b"/>
+          <a:bodyPr vert="horz" lIns="96661" tIns="48331" rIns="96661" bIns="48331" rtlCol="0" anchor="b"/>
           <a:lstStyle>
             <a:lvl1pPr algn="r">
-              <a:defRPr sz="1200"/>
+              <a:defRPr sz="1300"/>
             </a:lvl1pPr>
           </a:lstStyle>
           <a:p>
@@ -4087,7 +970,7 @@
           <a:p>
             <a:fld id="{0726731B-73AE-4764-BD2F-D9EF590552D1}" type="datetime1">
               <a:rPr lang="en-US" smtClean="0"/>
-              <a:t>10/6/2011</a:t>
+              <a:t>6/12/2012</a:t>
             </a:fld>
             <a:endParaRPr lang="ru-RU"/>
           </a:p>
@@ -4447,7 +1330,7 @@
           <a:p>
             <a:fld id="{BE92B150-0527-4B3E-8D18-65D26F36B10C}" type="datetime1">
               <a:rPr lang="en-US" smtClean="0"/>
-              <a:t>10/6/2011</a:t>
+              <a:t>6/12/2012</a:t>
             </a:fld>
             <a:endParaRPr lang="ru-RU"/>
           </a:p>
@@ -4623,7 +1506,7 @@
           <a:p>
             <a:fld id="{3805B2F1-EAF3-4E31-8D6B-BFE4EBFC961C}" type="datetime1">
               <a:rPr lang="en-US" smtClean="0"/>
-              <a:t>10/6/2011</a:t>
+              <a:t>6/12/2012</a:t>
             </a:fld>
             <a:endParaRPr lang="ru-RU"/>
           </a:p>
@@ -4859,7 +1742,7 @@
           <a:p>
             <a:fld id="{C0E09063-1CF3-4C9D-93FA-6682A4D1B2B7}" type="datetime1">
               <a:rPr lang="en-US" smtClean="0"/>
-              <a:t>10/6/2011</a:t>
+              <a:t>6/12/2012</a:t>
             </a:fld>
             <a:endParaRPr lang="ru-RU"/>
           </a:p>
@@ -5129,7 +2012,7 @@
           <a:p>
             <a:fld id="{8CACE0EA-94CC-4159-A24C-857D2ECE3312}" type="datetime1">
               <a:rPr lang="en-US" smtClean="0"/>
-              <a:t>10/6/2011</a:t>
+              <a:t>6/12/2012</a:t>
             </a:fld>
             <a:endParaRPr lang="ru-RU"/>
           </a:p>
@@ -5350,7 +2233,7 @@
           <a:p>
             <a:fld id="{28A3A6D3-700E-4550-8781-3F3A213F116A}" type="datetime1">
               <a:rPr lang="en-US" smtClean="0"/>
-              <a:t>10/6/2011</a:t>
+              <a:t>6/12/2012</a:t>
             </a:fld>
             <a:endParaRPr lang="ru-RU"/>
           </a:p>
@@ -5703,7 +2586,7 @@
           <a:p>
             <a:fld id="{C094DA10-682C-452D-A07D-251C0B8FF50C}" type="datetime1">
               <a:rPr lang="en-US" smtClean="0"/>
-              <a:t>10/6/2011</a:t>
+              <a:t>6/12/2012</a:t>
             </a:fld>
             <a:endParaRPr lang="ru-RU"/>
           </a:p>
@@ -5936,7 +2819,7 @@
           <a:p>
             <a:fld id="{CBA38D33-7B6B-4F4C-815C-2C0B40848FC5}" type="datetime1">
               <a:rPr lang="en-US" smtClean="0"/>
-              <a:t>10/6/2011</a:t>
+              <a:t>6/12/2012</a:t>
             </a:fld>
             <a:endParaRPr lang="ru-RU"/>
           </a:p>
@@ -6077,7 +2960,7 @@
           <a:p>
             <a:fld id="{2506A9A5-3113-45F1-A7F9-5E16424E28F1}" type="datetime1">
               <a:rPr lang="en-US" smtClean="0"/>
-              <a:t>10/6/2011</a:t>
+              <a:t>6/12/2012</a:t>
             </a:fld>
             <a:endParaRPr lang="ru-RU"/>
           </a:p>
@@ -6355,7 +3238,7 @@
           <a:p>
             <a:fld id="{6F67231C-04F4-4B4B-A49C-36B7F2EA029B}" type="datetime1">
               <a:rPr lang="en-US" smtClean="0"/>
-              <a:t>10/6/2011</a:t>
+              <a:t>6/12/2012</a:t>
             </a:fld>
             <a:endParaRPr lang="ru-RU"/>
           </a:p>
@@ -6763,7 +3646,7 @@
           <a:p>
             <a:fld id="{FC425E2B-886F-4BD7-BF41-1C2264AEC252}" type="datetime1">
               <a:rPr lang="en-US" smtClean="0"/>
-              <a:t>10/6/2011</a:t>
+              <a:t>6/12/2012</a:t>
             </a:fld>
             <a:endParaRPr lang="ru-RU"/>
           </a:p>
@@ -7102,7 +3985,7 @@
           <a:p>
             <a:fld id="{E4F15197-C749-4FB5-954D-438F5077D616}" type="datetime1">
               <a:rPr lang="en-US" smtClean="0"/>
-              <a:t>10/6/2011</a:t>
+              <a:t>6/12/2012</a:t>
             </a:fld>
             <a:endParaRPr lang="ru-RU"/>
           </a:p>
@@ -8410,7 +5293,7 @@
           <a:p>
             <a:fld id="{000039D3-6F56-416D-86DB-2B3B976DB752}" type="datetime1">
               <a:rPr lang="en-US" smtClean="0"/>
-              <a:t>10/6/2011</a:t>
+              <a:t>6/12/2012</a:t>
             </a:fld>
             <a:endParaRPr lang="ru-RU"/>
           </a:p>
@@ -8512,7 +5395,7 @@
           <a:p>
             <a:fld id="{C0E09063-1CF3-4C9D-93FA-6682A4D1B2B7}" type="datetime1">
               <a:rPr lang="en-US" smtClean="0"/>
-              <a:t>10/6/2011</a:t>
+              <a:t>6/12/2012</a:t>
             </a:fld>
             <a:endParaRPr lang="ru-RU"/>
           </a:p>
@@ -8676,7 +5559,7 @@
           <a:p>
             <a:fld id="{C0E09063-1CF3-4C9D-93FA-6682A4D1B2B7}" type="datetime1">
               <a:rPr lang="en-US" smtClean="0"/>
-              <a:t>10/6/2011</a:t>
+              <a:t>6/12/2012</a:t>
             </a:fld>
             <a:endParaRPr lang="ru-RU"/>
           </a:p>
@@ -10029,7 +6912,7 @@
           <a:p>
             <a:fld id="{C0E09063-1CF3-4C9D-93FA-6682A4D1B2B7}" type="datetime1">
               <a:rPr lang="en-US" smtClean="0"/>
-              <a:t>10/6/2011</a:t>
+              <a:t>6/12/2012</a:t>
             </a:fld>
             <a:endParaRPr lang="ru-RU"/>
           </a:p>
@@ -11711,7 +8594,7 @@
           <a:p>
             <a:fld id="{C0E09063-1CF3-4C9D-93FA-6682A4D1B2B7}" type="datetime1">
               <a:rPr lang="en-US" smtClean="0"/>
-              <a:t>10/6/2011</a:t>
+              <a:t>6/12/2012</a:t>
             </a:fld>
             <a:endParaRPr lang="ru-RU"/>
           </a:p>
@@ -17135,7 +14018,7 @@
           <a:p>
             <a:fld id="{C0E09063-1CF3-4C9D-93FA-6682A4D1B2B7}" type="datetime1">
               <a:rPr lang="en-US" smtClean="0"/>
-              <a:t>10/6/2011</a:t>
+              <a:t>6/12/2012</a:t>
             </a:fld>
             <a:endParaRPr lang="ru-RU"/>
           </a:p>
@@ -18820,7 +15703,7 @@
           <a:p>
             <a:fld id="{95EDE2EE-A42E-4C9A-A67C-E322880CF359}" type="datetime1">
               <a:rPr lang="en-US" smtClean="0"/>
-              <a:t>10/6/2011</a:t>
+              <a:t>6/12/2012</a:t>
             </a:fld>
             <a:endParaRPr lang="ru-RU"/>
           </a:p>
@@ -19881,7 +16764,7 @@
           <a:p>
             <a:fld id="{364598AD-C54A-47BE-B41B-03D8077F0C38}" type="datetime1">
               <a:rPr lang="en-US" smtClean="0"/>
-              <a:t>10/6/2011</a:t>
+              <a:t>6/12/2012</a:t>
             </a:fld>
             <a:endParaRPr lang="ru-RU"/>
           </a:p>
@@ -21311,7 +18194,7 @@
           <a:p>
             <a:fld id="{C0E09063-1CF3-4C9D-93FA-6682A4D1B2B7}" type="datetime1">
               <a:rPr lang="en-US" smtClean="0"/>
-              <a:t>10/6/2011</a:t>
+              <a:t>6/12/2012</a:t>
             </a:fld>
             <a:endParaRPr lang="ru-RU"/>
           </a:p>
@@ -23890,7 +20773,7 @@
           <a:p>
             <a:fld id="{C0E09063-1CF3-4C9D-93FA-6682A4D1B2B7}" type="datetime1">
               <a:rPr lang="en-US" smtClean="0"/>
-              <a:t>10/6/2011</a:t>
+              <a:t>6/12/2012</a:t>
             </a:fld>
             <a:endParaRPr lang="ru-RU"/>
           </a:p>
@@ -25190,7 +22073,7 @@
           <a:p>
             <a:fld id="{C0E09063-1CF3-4C9D-93FA-6682A4D1B2B7}" type="datetime1">
               <a:rPr lang="en-US" smtClean="0"/>
-              <a:t>10/6/2011</a:t>
+              <a:t>6/12/2012</a:t>
             </a:fld>
             <a:endParaRPr lang="ru-RU"/>
           </a:p>
@@ -27177,7 +24060,7 @@
           <a:p>
             <a:fld id="{25707722-CC3A-4FF6-AB60-A1C62B011C40}" type="datetime1">
               <a:rPr lang="en-US" smtClean="0"/>
-              <a:t>10/6/2011</a:t>
+              <a:t>6/12/2012</a:t>
             </a:fld>
             <a:endParaRPr lang="ru-RU"/>
           </a:p>
@@ -28232,7 +25115,7 @@
           <a:p>
             <a:fld id="{0A53CF6C-C3C1-4C7C-AAE8-E7AE7D9BF8AE}" type="datetime1">
               <a:rPr lang="en-US" smtClean="0"/>
-              <a:t>10/6/2011</a:t>
+              <a:t>6/12/2012</a:t>
             </a:fld>
             <a:endParaRPr lang="ru-RU"/>
           </a:p>
@@ -28339,7 +25222,7 @@
           <a:p>
             <a:fld id="{C0E09063-1CF3-4C9D-93FA-6682A4D1B2B7}" type="datetime1">
               <a:rPr lang="en-US" smtClean="0"/>
-              <a:t>10/6/2011</a:t>
+              <a:t>6/12/2012</a:t>
             </a:fld>
             <a:endParaRPr lang="ru-RU"/>
           </a:p>
@@ -28603,7 +25486,7 @@
           <a:p>
             <a:fld id="{C0E09063-1CF3-4C9D-93FA-6682A4D1B2B7}" type="datetime1">
               <a:rPr lang="en-US" smtClean="0"/>
-              <a:t>10/6/2011</a:t>
+              <a:t>6/12/2012</a:t>
             </a:fld>
             <a:endParaRPr lang="ru-RU"/>
           </a:p>
@@ -31422,7 +28305,7 @@
           <a:p>
             <a:fld id="{BC988F4E-721E-4598-AC35-CD185956DAEE}" type="datetime1">
               <a:rPr lang="en-US" smtClean="0"/>
-              <a:t>10/6/2011</a:t>
+              <a:t>6/12/2012</a:t>
             </a:fld>
             <a:endParaRPr lang="ru-RU"/>
           </a:p>
@@ -33147,7 +30030,7 @@
           <a:p>
             <a:fld id="{C0E09063-1CF3-4C9D-93FA-6682A4D1B2B7}" type="datetime1">
               <a:rPr lang="en-US" smtClean="0"/>
-              <a:t>10/6/2011</a:t>
+              <a:t>6/12/2012</a:t>
             </a:fld>
             <a:endParaRPr lang="ru-RU"/>
           </a:p>
@@ -33350,7 +30233,7 @@
           <a:p>
             <a:fld id="{C0E09063-1CF3-4C9D-93FA-6682A4D1B2B7}" type="datetime1">
               <a:rPr lang="en-US" smtClean="0"/>
-              <a:t>10/6/2011</a:t>
+              <a:t>6/12/2012</a:t>
             </a:fld>
             <a:endParaRPr lang="ru-RU"/>
           </a:p>
@@ -33538,7 +30421,7 @@
           <a:p>
             <a:fld id="{C0E09063-1CF3-4C9D-93FA-6682A4D1B2B7}" type="datetime1">
               <a:rPr lang="en-US" smtClean="0"/>
-              <a:t>10/6/2011</a:t>
+              <a:t>6/12/2012</a:t>
             </a:fld>
             <a:endParaRPr lang="ru-RU"/>
           </a:p>
@@ -36327,7 +33210,7 @@
           <a:p>
             <a:fld id="{C0E09063-1CF3-4C9D-93FA-6682A4D1B2B7}" type="datetime1">
               <a:rPr lang="en-US" smtClean="0"/>
-              <a:t>10/6/2011</a:t>
+              <a:t>6/12/2012</a:t>
             </a:fld>
             <a:endParaRPr lang="ru-RU"/>
           </a:p>
@@ -36783,7 +33666,7 @@
           <a:p>
             <a:fld id="{C0E09063-1CF3-4C9D-93FA-6682A4D1B2B7}" type="datetime1">
               <a:rPr lang="en-US" smtClean="0"/>
-              <a:t>10/6/2011</a:t>
+              <a:t>6/12/2012</a:t>
             </a:fld>
             <a:endParaRPr lang="ru-RU"/>
           </a:p>
@@ -37940,7 +34823,7 @@
           <a:p>
             <a:fld id="{FE74E680-8F32-4DBB-B322-90D1C0B3389E}" type="datetime1">
               <a:rPr lang="en-US" smtClean="0"/>
-              <a:t>10/6/2011</a:t>
+              <a:t>6/12/2012</a:t>
             </a:fld>
             <a:endParaRPr lang="ru-RU" dirty="0"/>
           </a:p>
@@ -39504,7 +36387,7 @@
           <a:p>
             <a:fld id="{4A9649DD-2F14-4514-82D6-FAB512AA7A0E}" type="datetime1">
               <a:rPr lang="en-US" smtClean="0"/>
-              <a:t>10/6/2011</a:t>
+              <a:t>6/12/2012</a:t>
             </a:fld>
             <a:endParaRPr lang="ru-RU"/>
           </a:p>
@@ -40032,7 +36915,7 @@
           <a:p>
             <a:fld id="{C0E09063-1CF3-4C9D-93FA-6682A4D1B2B7}" type="datetime1">
               <a:rPr lang="en-US" smtClean="0"/>
-              <a:t>10/6/2011</a:t>
+              <a:t>6/12/2012</a:t>
             </a:fld>
             <a:endParaRPr lang="ru-RU"/>
           </a:p>
@@ -40417,7 +37300,7 @@
           <a:p>
             <a:fld id="{C0E09063-1CF3-4C9D-93FA-6682A4D1B2B7}" type="datetime1">
               <a:rPr lang="en-US" smtClean="0"/>
-              <a:t>10/6/2011</a:t>
+              <a:t>6/12/2012</a:t>
             </a:fld>
             <a:endParaRPr lang="ru-RU"/>
           </a:p>
@@ -40703,7 +37586,7 @@
           <a:p>
             <a:fld id="{90231927-408C-49A6-AA0E-E4B777926223}" type="datetime1">
               <a:rPr lang="en-US" smtClean="0"/>
-              <a:t>10/6/2011</a:t>
+              <a:t>6/12/2012</a:t>
             </a:fld>
             <a:endParaRPr lang="ru-RU" dirty="0"/>
           </a:p>
@@ -41062,7 +37945,7 @@
           <a:p>
             <a:fld id="{95EDE2EE-A42E-4C9A-A67C-E322880CF359}" type="datetime1">
               <a:rPr lang="en-US" smtClean="0"/>
-              <a:t>10/6/2011</a:t>
+              <a:t>6/12/2012</a:t>
             </a:fld>
             <a:endParaRPr lang="ru-RU"/>
           </a:p>
@@ -41293,7 +38176,7 @@
           <a:p>
             <a:fld id="{C0E09063-1CF3-4C9D-93FA-6682A4D1B2B7}" type="datetime1">
               <a:rPr lang="en-US" smtClean="0"/>
-              <a:t>10/6/2011</a:t>
+              <a:t>6/12/2012</a:t>
             </a:fld>
             <a:endParaRPr lang="ru-RU"/>
           </a:p>
@@ -45000,7 +41883,7 @@
           <a:p>
             <a:fld id="{D1EA5027-7B9F-41AD-89FF-EF4C00E0C0C1}" type="datetime1">
               <a:rPr lang="en-US" smtClean="0"/>
-              <a:t>10/6/2011</a:t>
+              <a:t>6/12/2012</a:t>
             </a:fld>
             <a:endParaRPr lang="ru-RU"/>
           </a:p>
@@ -46233,7 +43116,7 @@
           <a:p>
             <a:fld id="{C0E09063-1CF3-4C9D-93FA-6682A4D1B2B7}" type="datetime1">
               <a:rPr lang="en-US" smtClean="0"/>
-              <a:t>10/6/2011</a:t>
+              <a:t>6/12/2012</a:t>
             </a:fld>
             <a:endParaRPr lang="ru-RU" dirty="0"/>
           </a:p>
@@ -47912,6 +44795,1107 @@
           <a:chExt cx="0" cy="0"/>
         </a:xfrm>
       </p:grpSpPr>
+      <p:grpSp>
+        <p:nvGrpSpPr>
+          <p:cNvPr id="5" name="Группа 4"/>
+          <p:cNvGrpSpPr/>
+          <p:nvPr/>
+        </p:nvGrpSpPr>
+        <p:grpSpPr>
+          <a:xfrm>
+            <a:off x="2485310" y="1539070"/>
+            <a:ext cx="4630579" cy="4002035"/>
+            <a:chOff x="2485310" y="1539070"/>
+            <a:chExt cx="4630579" cy="4002035"/>
+          </a:xfrm>
+        </p:grpSpPr>
+        <p:sp>
+          <p:nvSpPr>
+            <p:cNvPr id="7" name="Полилиния 6"/>
+            <p:cNvSpPr/>
+            <p:nvPr/>
+          </p:nvSpPr>
+          <p:spPr>
+            <a:xfrm>
+              <a:off x="4133105" y="1539070"/>
+              <a:ext cx="1334988" cy="867742"/>
+            </a:xfrm>
+            <a:custGeom>
+              <a:avLst/>
+              <a:gdLst>
+                <a:gd name="connsiteX0" fmla="*/ 0 w 1334988"/>
+                <a:gd name="connsiteY0" fmla="*/ 144627 h 867742"/>
+                <a:gd name="connsiteX1" fmla="*/ 144627 w 1334988"/>
+                <a:gd name="connsiteY1" fmla="*/ 0 h 867742"/>
+                <a:gd name="connsiteX2" fmla="*/ 1190361 w 1334988"/>
+                <a:gd name="connsiteY2" fmla="*/ 0 h 867742"/>
+                <a:gd name="connsiteX3" fmla="*/ 1334988 w 1334988"/>
+                <a:gd name="connsiteY3" fmla="*/ 144627 h 867742"/>
+                <a:gd name="connsiteX4" fmla="*/ 1334988 w 1334988"/>
+                <a:gd name="connsiteY4" fmla="*/ 723115 h 867742"/>
+                <a:gd name="connsiteX5" fmla="*/ 1190361 w 1334988"/>
+                <a:gd name="connsiteY5" fmla="*/ 867742 h 867742"/>
+                <a:gd name="connsiteX6" fmla="*/ 144627 w 1334988"/>
+                <a:gd name="connsiteY6" fmla="*/ 867742 h 867742"/>
+                <a:gd name="connsiteX7" fmla="*/ 0 w 1334988"/>
+                <a:gd name="connsiteY7" fmla="*/ 723115 h 867742"/>
+                <a:gd name="connsiteX8" fmla="*/ 0 w 1334988"/>
+                <a:gd name="connsiteY8" fmla="*/ 144627 h 867742"/>
+              </a:gdLst>
+              <a:ahLst/>
+              <a:cxnLst>
+                <a:cxn ang="0">
+                  <a:pos x="connsiteX0" y="connsiteY0"/>
+                </a:cxn>
+                <a:cxn ang="0">
+                  <a:pos x="connsiteX1" y="connsiteY1"/>
+                </a:cxn>
+                <a:cxn ang="0">
+                  <a:pos x="connsiteX2" y="connsiteY2"/>
+                </a:cxn>
+                <a:cxn ang="0">
+                  <a:pos x="connsiteX3" y="connsiteY3"/>
+                </a:cxn>
+                <a:cxn ang="0">
+                  <a:pos x="connsiteX4" y="connsiteY4"/>
+                </a:cxn>
+                <a:cxn ang="0">
+                  <a:pos x="connsiteX5" y="connsiteY5"/>
+                </a:cxn>
+                <a:cxn ang="0">
+                  <a:pos x="connsiteX6" y="connsiteY6"/>
+                </a:cxn>
+                <a:cxn ang="0">
+                  <a:pos x="connsiteX7" y="connsiteY7"/>
+                </a:cxn>
+                <a:cxn ang="0">
+                  <a:pos x="connsiteX8" y="connsiteY8"/>
+                </a:cxn>
+              </a:cxnLst>
+              <a:rect l="l" t="t" r="r" b="b"/>
+              <a:pathLst>
+                <a:path w="1334988" h="867742">
+                  <a:moveTo>
+                    <a:pt x="0" y="144627"/>
+                  </a:moveTo>
+                  <a:cubicBezTo>
+                    <a:pt x="0" y="64752"/>
+                    <a:pt x="64752" y="0"/>
+                    <a:pt x="144627" y="0"/>
+                  </a:cubicBezTo>
+                  <a:lnTo>
+                    <a:pt x="1190361" y="0"/>
+                  </a:lnTo>
+                  <a:cubicBezTo>
+                    <a:pt x="1270236" y="0"/>
+                    <a:pt x="1334988" y="64752"/>
+                    <a:pt x="1334988" y="144627"/>
+                  </a:cubicBezTo>
+                  <a:lnTo>
+                    <a:pt x="1334988" y="723115"/>
+                  </a:lnTo>
+                  <a:cubicBezTo>
+                    <a:pt x="1334988" y="802990"/>
+                    <a:pt x="1270236" y="867742"/>
+                    <a:pt x="1190361" y="867742"/>
+                  </a:cubicBezTo>
+                  <a:lnTo>
+                    <a:pt x="144627" y="867742"/>
+                  </a:lnTo>
+                  <a:cubicBezTo>
+                    <a:pt x="64752" y="867742"/>
+                    <a:pt x="0" y="802990"/>
+                    <a:pt x="0" y="723115"/>
+                  </a:cubicBezTo>
+                  <a:lnTo>
+                    <a:pt x="0" y="144627"/>
+                  </a:lnTo>
+                  <a:close/>
+                </a:path>
+              </a:pathLst>
+            </a:custGeom>
+          </p:spPr>
+          <p:style>
+            <a:lnRef idx="1">
+              <a:schemeClr val="accent2"/>
+            </a:lnRef>
+            <a:fillRef idx="3">
+              <a:schemeClr val="accent2"/>
+            </a:fillRef>
+            <a:effectRef idx="2">
+              <a:schemeClr val="accent2"/>
+            </a:effectRef>
+            <a:fontRef idx="minor">
+              <a:schemeClr val="lt1"/>
+            </a:fontRef>
+          </p:style>
+          <p:txBody>
+            <a:bodyPr spcFirstLastPara="0" vert="horz" wrap="square" lIns="107130" tIns="107130" rIns="107130" bIns="107130" numCol="1" spcCol="1270" anchor="ctr" anchorCtr="0">
+              <a:noAutofit/>
+            </a:bodyPr>
+            <a:lstStyle/>
+            <a:p>
+              <a:pPr lvl="0" algn="ctr" defTabSz="755650">
+                <a:lnSpc>
+                  <a:spcPct val="90000"/>
+                </a:lnSpc>
+                <a:spcBef>
+                  <a:spcPct val="0"/>
+                </a:spcBef>
+                <a:spcAft>
+                  <a:spcPct val="35000"/>
+                </a:spcAft>
+              </a:pPr>
+              <a:r>
+                <a:rPr lang="en-US" sz="1700" kern="1200" dirty="0" smtClean="0"/>
+                <a:t>C++ </a:t>
+              </a:r>
+              <a:br>
+                <a:rPr lang="en-US" sz="1700" kern="1200" dirty="0" smtClean="0"/>
+              </a:br>
+              <a:r>
+                <a:rPr lang="en-US" sz="1700" kern="1200" dirty="0" smtClean="0"/>
+                <a:t>Users</a:t>
+              </a:r>
+              <a:endParaRPr lang="en-US" sz="1700" kern="1200" dirty="0"/>
+            </a:p>
+          </p:txBody>
+        </p:sp>
+        <p:sp>
+          <p:nvSpPr>
+            <p:cNvPr id="8" name="Полилиния 7"/>
+            <p:cNvSpPr/>
+            <p:nvPr/>
+          </p:nvSpPr>
+          <p:spPr>
+            <a:xfrm>
+              <a:off x="3068005" y="1972941"/>
+              <a:ext cx="3465188" cy="3465188"/>
+            </a:xfrm>
+            <a:custGeom>
+              <a:avLst/>
+              <a:gdLst/>
+              <a:ahLst/>
+              <a:cxnLst/>
+              <a:rect l="0" t="0" r="0" b="0"/>
+              <a:pathLst>
+                <a:path>
+                  <a:moveTo>
+                    <a:pt x="2409246" y="137594"/>
+                  </a:moveTo>
+                  <a:arcTo wR="1732594" hR="1732594" stAng="17579295" swAng="1959991"/>
+                </a:path>
+              </a:pathLst>
+            </a:custGeom>
+            <a:noFill/>
+          </p:spPr>
+          <p:style>
+            <a:lnRef idx="1">
+              <a:schemeClr val="accent1">
+                <a:hueOff val="0"/>
+                <a:satOff val="0"/>
+                <a:lumOff val="0"/>
+                <a:alphaOff val="0"/>
+              </a:schemeClr>
+            </a:lnRef>
+            <a:fillRef idx="0">
+              <a:scrgbClr r="0" g="0" b="0"/>
+            </a:fillRef>
+            <a:effectRef idx="0">
+              <a:schemeClr val="accent1">
+                <a:hueOff val="0"/>
+                <a:satOff val="0"/>
+                <a:lumOff val="0"/>
+                <a:alphaOff val="0"/>
+              </a:schemeClr>
+            </a:effectRef>
+            <a:fontRef idx="minor">
+              <a:schemeClr val="tx1">
+                <a:hueOff val="0"/>
+                <a:satOff val="0"/>
+                <a:lumOff val="0"/>
+                <a:alphaOff val="0"/>
+              </a:schemeClr>
+            </a:fontRef>
+          </p:style>
+        </p:sp>
+        <p:sp>
+          <p:nvSpPr>
+            <p:cNvPr id="9" name="Полилиния 8"/>
+            <p:cNvSpPr/>
+            <p:nvPr/>
+          </p:nvSpPr>
+          <p:spPr>
+            <a:xfrm>
+              <a:off x="5780901" y="2736263"/>
+              <a:ext cx="1334988" cy="867742"/>
+            </a:xfrm>
+            <a:custGeom>
+              <a:avLst/>
+              <a:gdLst>
+                <a:gd name="connsiteX0" fmla="*/ 0 w 1334988"/>
+                <a:gd name="connsiteY0" fmla="*/ 144627 h 867742"/>
+                <a:gd name="connsiteX1" fmla="*/ 144627 w 1334988"/>
+                <a:gd name="connsiteY1" fmla="*/ 0 h 867742"/>
+                <a:gd name="connsiteX2" fmla="*/ 1190361 w 1334988"/>
+                <a:gd name="connsiteY2" fmla="*/ 0 h 867742"/>
+                <a:gd name="connsiteX3" fmla="*/ 1334988 w 1334988"/>
+                <a:gd name="connsiteY3" fmla="*/ 144627 h 867742"/>
+                <a:gd name="connsiteX4" fmla="*/ 1334988 w 1334988"/>
+                <a:gd name="connsiteY4" fmla="*/ 723115 h 867742"/>
+                <a:gd name="connsiteX5" fmla="*/ 1190361 w 1334988"/>
+                <a:gd name="connsiteY5" fmla="*/ 867742 h 867742"/>
+                <a:gd name="connsiteX6" fmla="*/ 144627 w 1334988"/>
+                <a:gd name="connsiteY6" fmla="*/ 867742 h 867742"/>
+                <a:gd name="connsiteX7" fmla="*/ 0 w 1334988"/>
+                <a:gd name="connsiteY7" fmla="*/ 723115 h 867742"/>
+                <a:gd name="connsiteX8" fmla="*/ 0 w 1334988"/>
+                <a:gd name="connsiteY8" fmla="*/ 144627 h 867742"/>
+              </a:gdLst>
+              <a:ahLst/>
+              <a:cxnLst>
+                <a:cxn ang="0">
+                  <a:pos x="connsiteX0" y="connsiteY0"/>
+                </a:cxn>
+                <a:cxn ang="0">
+                  <a:pos x="connsiteX1" y="connsiteY1"/>
+                </a:cxn>
+                <a:cxn ang="0">
+                  <a:pos x="connsiteX2" y="connsiteY2"/>
+                </a:cxn>
+                <a:cxn ang="0">
+                  <a:pos x="connsiteX3" y="connsiteY3"/>
+                </a:cxn>
+                <a:cxn ang="0">
+                  <a:pos x="connsiteX4" y="connsiteY4"/>
+                </a:cxn>
+                <a:cxn ang="0">
+                  <a:pos x="connsiteX5" y="connsiteY5"/>
+                </a:cxn>
+                <a:cxn ang="0">
+                  <a:pos x="connsiteX6" y="connsiteY6"/>
+                </a:cxn>
+                <a:cxn ang="0">
+                  <a:pos x="connsiteX7" y="connsiteY7"/>
+                </a:cxn>
+                <a:cxn ang="0">
+                  <a:pos x="connsiteX8" y="connsiteY8"/>
+                </a:cxn>
+              </a:cxnLst>
+              <a:rect l="l" t="t" r="r" b="b"/>
+              <a:pathLst>
+                <a:path w="1334988" h="867742">
+                  <a:moveTo>
+                    <a:pt x="0" y="144627"/>
+                  </a:moveTo>
+                  <a:cubicBezTo>
+                    <a:pt x="0" y="64752"/>
+                    <a:pt x="64752" y="0"/>
+                    <a:pt x="144627" y="0"/>
+                  </a:cubicBezTo>
+                  <a:lnTo>
+                    <a:pt x="1190361" y="0"/>
+                  </a:lnTo>
+                  <a:cubicBezTo>
+                    <a:pt x="1270236" y="0"/>
+                    <a:pt x="1334988" y="64752"/>
+                    <a:pt x="1334988" y="144627"/>
+                  </a:cubicBezTo>
+                  <a:lnTo>
+                    <a:pt x="1334988" y="723115"/>
+                  </a:lnTo>
+                  <a:cubicBezTo>
+                    <a:pt x="1334988" y="802990"/>
+                    <a:pt x="1270236" y="867742"/>
+                    <a:pt x="1190361" y="867742"/>
+                  </a:cubicBezTo>
+                  <a:lnTo>
+                    <a:pt x="144627" y="867742"/>
+                  </a:lnTo>
+                  <a:cubicBezTo>
+                    <a:pt x="64752" y="867742"/>
+                    <a:pt x="0" y="802990"/>
+                    <a:pt x="0" y="723115"/>
+                  </a:cubicBezTo>
+                  <a:lnTo>
+                    <a:pt x="0" y="144627"/>
+                  </a:lnTo>
+                  <a:close/>
+                </a:path>
+              </a:pathLst>
+            </a:custGeom>
+            <a:solidFill>
+              <a:schemeClr val="accent2">
+                <a:lumMod val="50000"/>
+              </a:schemeClr>
+            </a:solidFill>
+          </p:spPr>
+          <p:style>
+            <a:lnRef idx="2">
+              <a:schemeClr val="lt1">
+                <a:hueOff val="0"/>
+                <a:satOff val="0"/>
+                <a:lumOff val="0"/>
+                <a:alphaOff val="0"/>
+              </a:schemeClr>
+            </a:lnRef>
+            <a:fillRef idx="1">
+              <a:scrgbClr r="0" g="0" b="0"/>
+            </a:fillRef>
+            <a:effectRef idx="0">
+              <a:schemeClr val="accent1">
+                <a:hueOff val="0"/>
+                <a:satOff val="0"/>
+                <a:lumOff val="0"/>
+                <a:alphaOff val="0"/>
+              </a:schemeClr>
+            </a:effectRef>
+            <a:fontRef idx="minor">
+              <a:schemeClr val="lt1"/>
+            </a:fontRef>
+          </p:style>
+          <p:txBody>
+            <a:bodyPr spcFirstLastPara="0" vert="horz" wrap="square" lIns="107130" tIns="107130" rIns="107130" bIns="107130" numCol="1" spcCol="1270" anchor="ctr" anchorCtr="0">
+              <a:noAutofit/>
+            </a:bodyPr>
+            <a:lstStyle/>
+            <a:p>
+              <a:pPr lvl="0" algn="ctr" defTabSz="755650">
+                <a:lnSpc>
+                  <a:spcPct val="90000"/>
+                </a:lnSpc>
+                <a:spcBef>
+                  <a:spcPct val="0"/>
+                </a:spcBef>
+                <a:spcAft>
+                  <a:spcPct val="35000"/>
+                </a:spcAft>
+              </a:pPr>
+              <a:r>
+                <a:rPr lang="en-US" sz="1700" kern="1200" dirty="0" smtClean="0"/>
+                <a:t>Python Users</a:t>
+              </a:r>
+              <a:endParaRPr lang="en-US" sz="1700" kern="1200" dirty="0"/>
+            </a:p>
+          </p:txBody>
+        </p:sp>
+        <p:sp>
+          <p:nvSpPr>
+            <p:cNvPr id="10" name="Полилиния 9"/>
+            <p:cNvSpPr/>
+            <p:nvPr/>
+          </p:nvSpPr>
+          <p:spPr>
+            <a:xfrm>
+              <a:off x="3068005" y="1972941"/>
+              <a:ext cx="3465188" cy="3465188"/>
+            </a:xfrm>
+            <a:custGeom>
+              <a:avLst/>
+              <a:gdLst/>
+              <a:ahLst/>
+              <a:cxnLst/>
+              <a:rect l="0" t="0" r="0" b="0"/>
+              <a:pathLst>
+                <a:path>
+                  <a:moveTo>
+                    <a:pt x="3462825" y="1642133"/>
+                  </a:moveTo>
+                  <a:arcTo wR="1732594" hR="1732594" stAng="21420430" swAng="2195114"/>
+                </a:path>
+              </a:pathLst>
+            </a:custGeom>
+            <a:noFill/>
+          </p:spPr>
+          <p:style>
+            <a:lnRef idx="1">
+              <a:schemeClr val="accent1">
+                <a:hueOff val="0"/>
+                <a:satOff val="0"/>
+                <a:lumOff val="0"/>
+                <a:alphaOff val="0"/>
+              </a:schemeClr>
+            </a:lnRef>
+            <a:fillRef idx="0">
+              <a:scrgbClr r="0" g="0" b="0"/>
+            </a:fillRef>
+            <a:effectRef idx="0">
+              <a:schemeClr val="accent1">
+                <a:hueOff val="0"/>
+                <a:satOff val="0"/>
+                <a:lumOff val="0"/>
+                <a:alphaOff val="0"/>
+              </a:schemeClr>
+            </a:effectRef>
+            <a:fontRef idx="minor">
+              <a:schemeClr val="tx1">
+                <a:hueOff val="0"/>
+                <a:satOff val="0"/>
+                <a:lumOff val="0"/>
+                <a:alphaOff val="0"/>
+              </a:schemeClr>
+            </a:fontRef>
+          </p:style>
+        </p:sp>
+        <p:sp>
+          <p:nvSpPr>
+            <p:cNvPr id="11" name="Полилиния 10"/>
+            <p:cNvSpPr/>
+            <p:nvPr/>
+          </p:nvSpPr>
+          <p:spPr>
+            <a:xfrm>
+              <a:off x="5151499" y="4673363"/>
+              <a:ext cx="1334988" cy="867742"/>
+            </a:xfrm>
+            <a:custGeom>
+              <a:avLst/>
+              <a:gdLst>
+                <a:gd name="connsiteX0" fmla="*/ 0 w 1334988"/>
+                <a:gd name="connsiteY0" fmla="*/ 144627 h 867742"/>
+                <a:gd name="connsiteX1" fmla="*/ 144627 w 1334988"/>
+                <a:gd name="connsiteY1" fmla="*/ 0 h 867742"/>
+                <a:gd name="connsiteX2" fmla="*/ 1190361 w 1334988"/>
+                <a:gd name="connsiteY2" fmla="*/ 0 h 867742"/>
+                <a:gd name="connsiteX3" fmla="*/ 1334988 w 1334988"/>
+                <a:gd name="connsiteY3" fmla="*/ 144627 h 867742"/>
+                <a:gd name="connsiteX4" fmla="*/ 1334988 w 1334988"/>
+                <a:gd name="connsiteY4" fmla="*/ 723115 h 867742"/>
+                <a:gd name="connsiteX5" fmla="*/ 1190361 w 1334988"/>
+                <a:gd name="connsiteY5" fmla="*/ 867742 h 867742"/>
+                <a:gd name="connsiteX6" fmla="*/ 144627 w 1334988"/>
+                <a:gd name="connsiteY6" fmla="*/ 867742 h 867742"/>
+                <a:gd name="connsiteX7" fmla="*/ 0 w 1334988"/>
+                <a:gd name="connsiteY7" fmla="*/ 723115 h 867742"/>
+                <a:gd name="connsiteX8" fmla="*/ 0 w 1334988"/>
+                <a:gd name="connsiteY8" fmla="*/ 144627 h 867742"/>
+              </a:gdLst>
+              <a:ahLst/>
+              <a:cxnLst>
+                <a:cxn ang="0">
+                  <a:pos x="connsiteX0" y="connsiteY0"/>
+                </a:cxn>
+                <a:cxn ang="0">
+                  <a:pos x="connsiteX1" y="connsiteY1"/>
+                </a:cxn>
+                <a:cxn ang="0">
+                  <a:pos x="connsiteX2" y="connsiteY2"/>
+                </a:cxn>
+                <a:cxn ang="0">
+                  <a:pos x="connsiteX3" y="connsiteY3"/>
+                </a:cxn>
+                <a:cxn ang="0">
+                  <a:pos x="connsiteX4" y="connsiteY4"/>
+                </a:cxn>
+                <a:cxn ang="0">
+                  <a:pos x="connsiteX5" y="connsiteY5"/>
+                </a:cxn>
+                <a:cxn ang="0">
+                  <a:pos x="connsiteX6" y="connsiteY6"/>
+                </a:cxn>
+                <a:cxn ang="0">
+                  <a:pos x="connsiteX7" y="connsiteY7"/>
+                </a:cxn>
+                <a:cxn ang="0">
+                  <a:pos x="connsiteX8" y="connsiteY8"/>
+                </a:cxn>
+              </a:cxnLst>
+              <a:rect l="l" t="t" r="r" b="b"/>
+              <a:pathLst>
+                <a:path w="1334988" h="867742">
+                  <a:moveTo>
+                    <a:pt x="0" y="144627"/>
+                  </a:moveTo>
+                  <a:cubicBezTo>
+                    <a:pt x="0" y="64752"/>
+                    <a:pt x="64752" y="0"/>
+                    <a:pt x="144627" y="0"/>
+                  </a:cubicBezTo>
+                  <a:lnTo>
+                    <a:pt x="1190361" y="0"/>
+                  </a:lnTo>
+                  <a:cubicBezTo>
+                    <a:pt x="1270236" y="0"/>
+                    <a:pt x="1334988" y="64752"/>
+                    <a:pt x="1334988" y="144627"/>
+                  </a:cubicBezTo>
+                  <a:lnTo>
+                    <a:pt x="1334988" y="723115"/>
+                  </a:lnTo>
+                  <a:cubicBezTo>
+                    <a:pt x="1334988" y="802990"/>
+                    <a:pt x="1270236" y="867742"/>
+                    <a:pt x="1190361" y="867742"/>
+                  </a:cubicBezTo>
+                  <a:lnTo>
+                    <a:pt x="144627" y="867742"/>
+                  </a:lnTo>
+                  <a:cubicBezTo>
+                    <a:pt x="64752" y="867742"/>
+                    <a:pt x="0" y="802990"/>
+                    <a:pt x="0" y="723115"/>
+                  </a:cubicBezTo>
+                  <a:lnTo>
+                    <a:pt x="0" y="144627"/>
+                  </a:lnTo>
+                  <a:close/>
+                </a:path>
+              </a:pathLst>
+            </a:custGeom>
+            <a:solidFill>
+              <a:schemeClr val="tx1">
+                <a:lumMod val="95000"/>
+                <a:lumOff val="5000"/>
+              </a:schemeClr>
+            </a:solidFill>
+          </p:spPr>
+          <p:style>
+            <a:lnRef idx="2">
+              <a:schemeClr val="lt1">
+                <a:hueOff val="0"/>
+                <a:satOff val="0"/>
+                <a:lumOff val="0"/>
+                <a:alphaOff val="0"/>
+              </a:schemeClr>
+            </a:lnRef>
+            <a:fillRef idx="1">
+              <a:scrgbClr r="0" g="0" b="0"/>
+            </a:fillRef>
+            <a:effectRef idx="0">
+              <a:schemeClr val="accent1">
+                <a:hueOff val="0"/>
+                <a:satOff val="0"/>
+                <a:lumOff val="0"/>
+                <a:alphaOff val="0"/>
+              </a:schemeClr>
+            </a:effectRef>
+            <a:fontRef idx="minor">
+              <a:schemeClr val="lt1"/>
+            </a:fontRef>
+          </p:style>
+          <p:txBody>
+            <a:bodyPr spcFirstLastPara="0" vert="horz" wrap="square" lIns="107130" tIns="107130" rIns="107130" bIns="107130" numCol="1" spcCol="1270" anchor="ctr" anchorCtr="0">
+              <a:noAutofit/>
+            </a:bodyPr>
+            <a:lstStyle/>
+            <a:p>
+              <a:pPr lvl="0" algn="ctr" defTabSz="755650">
+                <a:lnSpc>
+                  <a:spcPct val="90000"/>
+                </a:lnSpc>
+                <a:spcBef>
+                  <a:spcPct val="0"/>
+                </a:spcBef>
+                <a:spcAft>
+                  <a:spcPct val="35000"/>
+                </a:spcAft>
+              </a:pPr>
+              <a:r>
+                <a:rPr lang="en-US" sz="1700" kern="1200" dirty="0" smtClean="0"/>
+                <a:t>&gt; Command line tools _</a:t>
+              </a:r>
+              <a:endParaRPr lang="en-US" sz="1700" kern="1200" dirty="0"/>
+            </a:p>
+          </p:txBody>
+        </p:sp>
+        <p:sp>
+          <p:nvSpPr>
+            <p:cNvPr id="13" name="Полилиния 12"/>
+            <p:cNvSpPr/>
+            <p:nvPr/>
+          </p:nvSpPr>
+          <p:spPr>
+            <a:xfrm>
+              <a:off x="3068005" y="1972941"/>
+              <a:ext cx="3465188" cy="3465188"/>
+            </a:xfrm>
+            <a:custGeom>
+              <a:avLst/>
+              <a:gdLst/>
+              <a:ahLst/>
+              <a:cxnLst/>
+              <a:rect l="0" t="0" r="0" b="0"/>
+              <a:pathLst>
+                <a:path>
+                  <a:moveTo>
+                    <a:pt x="2076618" y="3430690"/>
+                  </a:moveTo>
+                  <a:arcTo wR="1732594" hR="1732594" stAng="4712834" swAng="1374332"/>
+                </a:path>
+              </a:pathLst>
+            </a:custGeom>
+            <a:noFill/>
+          </p:spPr>
+          <p:style>
+            <a:lnRef idx="1">
+              <a:schemeClr val="accent1">
+                <a:hueOff val="0"/>
+                <a:satOff val="0"/>
+                <a:lumOff val="0"/>
+                <a:alphaOff val="0"/>
+              </a:schemeClr>
+            </a:lnRef>
+            <a:fillRef idx="0">
+              <a:scrgbClr r="0" g="0" b="0"/>
+            </a:fillRef>
+            <a:effectRef idx="0">
+              <a:schemeClr val="accent1">
+                <a:hueOff val="0"/>
+                <a:satOff val="0"/>
+                <a:lumOff val="0"/>
+                <a:alphaOff val="0"/>
+              </a:schemeClr>
+            </a:effectRef>
+            <a:fontRef idx="minor">
+              <a:schemeClr val="tx1">
+                <a:hueOff val="0"/>
+                <a:satOff val="0"/>
+                <a:lumOff val="0"/>
+                <a:alphaOff val="0"/>
+              </a:schemeClr>
+            </a:fontRef>
+          </p:style>
+        </p:sp>
+        <p:sp>
+          <p:nvSpPr>
+            <p:cNvPr id="14" name="Полилиния 13"/>
+            <p:cNvSpPr/>
+            <p:nvPr/>
+          </p:nvSpPr>
+          <p:spPr>
+            <a:xfrm>
+              <a:off x="3114712" y="4673363"/>
+              <a:ext cx="1334988" cy="867742"/>
+            </a:xfrm>
+            <a:custGeom>
+              <a:avLst/>
+              <a:gdLst>
+                <a:gd name="connsiteX0" fmla="*/ 0 w 1334988"/>
+                <a:gd name="connsiteY0" fmla="*/ 144627 h 867742"/>
+                <a:gd name="connsiteX1" fmla="*/ 144627 w 1334988"/>
+                <a:gd name="connsiteY1" fmla="*/ 0 h 867742"/>
+                <a:gd name="connsiteX2" fmla="*/ 1190361 w 1334988"/>
+                <a:gd name="connsiteY2" fmla="*/ 0 h 867742"/>
+                <a:gd name="connsiteX3" fmla="*/ 1334988 w 1334988"/>
+                <a:gd name="connsiteY3" fmla="*/ 144627 h 867742"/>
+                <a:gd name="connsiteX4" fmla="*/ 1334988 w 1334988"/>
+                <a:gd name="connsiteY4" fmla="*/ 723115 h 867742"/>
+                <a:gd name="connsiteX5" fmla="*/ 1190361 w 1334988"/>
+                <a:gd name="connsiteY5" fmla="*/ 867742 h 867742"/>
+                <a:gd name="connsiteX6" fmla="*/ 144627 w 1334988"/>
+                <a:gd name="connsiteY6" fmla="*/ 867742 h 867742"/>
+                <a:gd name="connsiteX7" fmla="*/ 0 w 1334988"/>
+                <a:gd name="connsiteY7" fmla="*/ 723115 h 867742"/>
+                <a:gd name="connsiteX8" fmla="*/ 0 w 1334988"/>
+                <a:gd name="connsiteY8" fmla="*/ 144627 h 867742"/>
+              </a:gdLst>
+              <a:ahLst/>
+              <a:cxnLst>
+                <a:cxn ang="0">
+                  <a:pos x="connsiteX0" y="connsiteY0"/>
+                </a:cxn>
+                <a:cxn ang="0">
+                  <a:pos x="connsiteX1" y="connsiteY1"/>
+                </a:cxn>
+                <a:cxn ang="0">
+                  <a:pos x="connsiteX2" y="connsiteY2"/>
+                </a:cxn>
+                <a:cxn ang="0">
+                  <a:pos x="connsiteX3" y="connsiteY3"/>
+                </a:cxn>
+                <a:cxn ang="0">
+                  <a:pos x="connsiteX4" y="connsiteY4"/>
+                </a:cxn>
+                <a:cxn ang="0">
+                  <a:pos x="connsiteX5" y="connsiteY5"/>
+                </a:cxn>
+                <a:cxn ang="0">
+                  <a:pos x="connsiteX6" y="connsiteY6"/>
+                </a:cxn>
+                <a:cxn ang="0">
+                  <a:pos x="connsiteX7" y="connsiteY7"/>
+                </a:cxn>
+                <a:cxn ang="0">
+                  <a:pos x="connsiteX8" y="connsiteY8"/>
+                </a:cxn>
+              </a:cxnLst>
+              <a:rect l="l" t="t" r="r" b="b"/>
+              <a:pathLst>
+                <a:path w="1334988" h="867742">
+                  <a:moveTo>
+                    <a:pt x="0" y="144627"/>
+                  </a:moveTo>
+                  <a:cubicBezTo>
+                    <a:pt x="0" y="64752"/>
+                    <a:pt x="64752" y="0"/>
+                    <a:pt x="144627" y="0"/>
+                  </a:cubicBezTo>
+                  <a:lnTo>
+                    <a:pt x="1190361" y="0"/>
+                  </a:lnTo>
+                  <a:cubicBezTo>
+                    <a:pt x="1270236" y="0"/>
+                    <a:pt x="1334988" y="64752"/>
+                    <a:pt x="1334988" y="144627"/>
+                  </a:cubicBezTo>
+                  <a:lnTo>
+                    <a:pt x="1334988" y="723115"/>
+                  </a:lnTo>
+                  <a:cubicBezTo>
+                    <a:pt x="1334988" y="802990"/>
+                    <a:pt x="1270236" y="867742"/>
+                    <a:pt x="1190361" y="867742"/>
+                  </a:cubicBezTo>
+                  <a:lnTo>
+                    <a:pt x="144627" y="867742"/>
+                  </a:lnTo>
+                  <a:cubicBezTo>
+                    <a:pt x="64752" y="867742"/>
+                    <a:pt x="0" y="802990"/>
+                    <a:pt x="0" y="723115"/>
+                  </a:cubicBezTo>
+                  <a:lnTo>
+                    <a:pt x="0" y="144627"/>
+                  </a:lnTo>
+                  <a:close/>
+                </a:path>
+              </a:pathLst>
+            </a:custGeom>
+            <a:solidFill>
+              <a:schemeClr val="bg1">
+                <a:lumMod val="95000"/>
+              </a:schemeClr>
+            </a:solidFill>
+            <a:ln>
+              <a:solidFill>
+                <a:schemeClr val="tx2">
+                  <a:lumMod val="50000"/>
+                </a:schemeClr>
+              </a:solidFill>
+            </a:ln>
+          </p:spPr>
+          <p:style>
+            <a:lnRef idx="2">
+              <a:scrgbClr r="0" g="0" b="0"/>
+            </a:lnRef>
+            <a:fillRef idx="1">
+              <a:scrgbClr r="0" g="0" b="0"/>
+            </a:fillRef>
+            <a:effectRef idx="0">
+              <a:schemeClr val="accent1">
+                <a:hueOff val="0"/>
+                <a:satOff val="0"/>
+                <a:lumOff val="0"/>
+                <a:alphaOff val="0"/>
+              </a:schemeClr>
+            </a:effectRef>
+            <a:fontRef idx="minor">
+              <a:schemeClr val="lt1"/>
+            </a:fontRef>
+          </p:style>
+          <p:txBody>
+            <a:bodyPr spcFirstLastPara="0" vert="horz" wrap="square" lIns="107130" tIns="107130" rIns="107130" bIns="107130" numCol="1" spcCol="1270" anchor="ctr" anchorCtr="0">
+              <a:noAutofit/>
+            </a:bodyPr>
+            <a:lstStyle/>
+            <a:p>
+              <a:pPr lvl="0" algn="ctr" defTabSz="755650">
+                <a:lnSpc>
+                  <a:spcPct val="90000"/>
+                </a:lnSpc>
+                <a:spcBef>
+                  <a:spcPct val="0"/>
+                </a:spcBef>
+                <a:spcAft>
+                  <a:spcPct val="35000"/>
+                </a:spcAft>
+              </a:pPr>
+              <a:r>
+                <a:rPr lang="en-US" sz="1700" kern="1200" dirty="0" smtClean="0">
+                  <a:solidFill>
+                    <a:srgbClr val="002060"/>
+                  </a:solidFill>
+                </a:rPr>
+                <a:t>WEB</a:t>
+              </a:r>
+              <a:endParaRPr lang="en-US" sz="1700" kern="1200" dirty="0">
+                <a:solidFill>
+                  <a:srgbClr val="002060"/>
+                </a:solidFill>
+              </a:endParaRPr>
+            </a:p>
+          </p:txBody>
+        </p:sp>
+        <p:sp>
+          <p:nvSpPr>
+            <p:cNvPr id="15" name="Полилиния 14"/>
+            <p:cNvSpPr/>
+            <p:nvPr/>
+          </p:nvSpPr>
+          <p:spPr>
+            <a:xfrm>
+              <a:off x="3068005" y="1972941"/>
+              <a:ext cx="3465188" cy="3465188"/>
+            </a:xfrm>
+            <a:custGeom>
+              <a:avLst/>
+              <a:gdLst/>
+              <a:ahLst/>
+              <a:cxnLst/>
+              <a:rect l="0" t="0" r="0" b="0"/>
+              <a:pathLst>
+                <a:path>
+                  <a:moveTo>
+                    <a:pt x="289352" y="2691206"/>
+                  </a:moveTo>
+                  <a:arcTo wR="1732594" hR="1732594" stAng="8784456" swAng="2195114"/>
+                </a:path>
+              </a:pathLst>
+            </a:custGeom>
+            <a:noFill/>
+          </p:spPr>
+          <p:style>
+            <a:lnRef idx="1">
+              <a:schemeClr val="accent1">
+                <a:hueOff val="0"/>
+                <a:satOff val="0"/>
+                <a:lumOff val="0"/>
+                <a:alphaOff val="0"/>
+              </a:schemeClr>
+            </a:lnRef>
+            <a:fillRef idx="0">
+              <a:scrgbClr r="0" g="0" b="0"/>
+            </a:fillRef>
+            <a:effectRef idx="0">
+              <a:schemeClr val="accent1">
+                <a:hueOff val="0"/>
+                <a:satOff val="0"/>
+                <a:lumOff val="0"/>
+                <a:alphaOff val="0"/>
+              </a:schemeClr>
+            </a:effectRef>
+            <a:fontRef idx="minor">
+              <a:schemeClr val="tx1">
+                <a:hueOff val="0"/>
+                <a:satOff val="0"/>
+                <a:lumOff val="0"/>
+                <a:alphaOff val="0"/>
+              </a:schemeClr>
+            </a:fontRef>
+          </p:style>
+        </p:sp>
+        <p:sp>
+          <p:nvSpPr>
+            <p:cNvPr id="16" name="Полилиния 15"/>
+            <p:cNvSpPr/>
+            <p:nvPr/>
+          </p:nvSpPr>
+          <p:spPr>
+            <a:xfrm>
+              <a:off x="2485310" y="2736263"/>
+              <a:ext cx="1334988" cy="867742"/>
+            </a:xfrm>
+            <a:custGeom>
+              <a:avLst/>
+              <a:gdLst>
+                <a:gd name="connsiteX0" fmla="*/ 0 w 1334988"/>
+                <a:gd name="connsiteY0" fmla="*/ 144627 h 867742"/>
+                <a:gd name="connsiteX1" fmla="*/ 144627 w 1334988"/>
+                <a:gd name="connsiteY1" fmla="*/ 0 h 867742"/>
+                <a:gd name="connsiteX2" fmla="*/ 1190361 w 1334988"/>
+                <a:gd name="connsiteY2" fmla="*/ 0 h 867742"/>
+                <a:gd name="connsiteX3" fmla="*/ 1334988 w 1334988"/>
+                <a:gd name="connsiteY3" fmla="*/ 144627 h 867742"/>
+                <a:gd name="connsiteX4" fmla="*/ 1334988 w 1334988"/>
+                <a:gd name="connsiteY4" fmla="*/ 723115 h 867742"/>
+                <a:gd name="connsiteX5" fmla="*/ 1190361 w 1334988"/>
+                <a:gd name="connsiteY5" fmla="*/ 867742 h 867742"/>
+                <a:gd name="connsiteX6" fmla="*/ 144627 w 1334988"/>
+                <a:gd name="connsiteY6" fmla="*/ 867742 h 867742"/>
+                <a:gd name="connsiteX7" fmla="*/ 0 w 1334988"/>
+                <a:gd name="connsiteY7" fmla="*/ 723115 h 867742"/>
+                <a:gd name="connsiteX8" fmla="*/ 0 w 1334988"/>
+                <a:gd name="connsiteY8" fmla="*/ 144627 h 867742"/>
+              </a:gdLst>
+              <a:ahLst/>
+              <a:cxnLst>
+                <a:cxn ang="0">
+                  <a:pos x="connsiteX0" y="connsiteY0"/>
+                </a:cxn>
+                <a:cxn ang="0">
+                  <a:pos x="connsiteX1" y="connsiteY1"/>
+                </a:cxn>
+                <a:cxn ang="0">
+                  <a:pos x="connsiteX2" y="connsiteY2"/>
+                </a:cxn>
+                <a:cxn ang="0">
+                  <a:pos x="connsiteX3" y="connsiteY3"/>
+                </a:cxn>
+                <a:cxn ang="0">
+                  <a:pos x="connsiteX4" y="connsiteY4"/>
+                </a:cxn>
+                <a:cxn ang="0">
+                  <a:pos x="connsiteX5" y="connsiteY5"/>
+                </a:cxn>
+                <a:cxn ang="0">
+                  <a:pos x="connsiteX6" y="connsiteY6"/>
+                </a:cxn>
+                <a:cxn ang="0">
+                  <a:pos x="connsiteX7" y="connsiteY7"/>
+                </a:cxn>
+                <a:cxn ang="0">
+                  <a:pos x="connsiteX8" y="connsiteY8"/>
+                </a:cxn>
+              </a:cxnLst>
+              <a:rect l="l" t="t" r="r" b="b"/>
+              <a:pathLst>
+                <a:path w="1334988" h="867742">
+                  <a:moveTo>
+                    <a:pt x="0" y="144627"/>
+                  </a:moveTo>
+                  <a:cubicBezTo>
+                    <a:pt x="0" y="64752"/>
+                    <a:pt x="64752" y="0"/>
+                    <a:pt x="144627" y="0"/>
+                  </a:cubicBezTo>
+                  <a:lnTo>
+                    <a:pt x="1190361" y="0"/>
+                  </a:lnTo>
+                  <a:cubicBezTo>
+                    <a:pt x="1270236" y="0"/>
+                    <a:pt x="1334988" y="64752"/>
+                    <a:pt x="1334988" y="144627"/>
+                  </a:cubicBezTo>
+                  <a:lnTo>
+                    <a:pt x="1334988" y="723115"/>
+                  </a:lnTo>
+                  <a:cubicBezTo>
+                    <a:pt x="1334988" y="802990"/>
+                    <a:pt x="1270236" y="867742"/>
+                    <a:pt x="1190361" y="867742"/>
+                  </a:cubicBezTo>
+                  <a:lnTo>
+                    <a:pt x="144627" y="867742"/>
+                  </a:lnTo>
+                  <a:cubicBezTo>
+                    <a:pt x="64752" y="867742"/>
+                    <a:pt x="0" y="802990"/>
+                    <a:pt x="0" y="723115"/>
+                  </a:cubicBezTo>
+                  <a:lnTo>
+                    <a:pt x="0" y="144627"/>
+                  </a:lnTo>
+                  <a:close/>
+                </a:path>
+              </a:pathLst>
+            </a:custGeom>
+          </p:spPr>
+          <p:style>
+            <a:lnRef idx="1">
+              <a:schemeClr val="accent6"/>
+            </a:lnRef>
+            <a:fillRef idx="3">
+              <a:schemeClr val="accent6"/>
+            </a:fillRef>
+            <a:effectRef idx="2">
+              <a:schemeClr val="accent6"/>
+            </a:effectRef>
+            <a:fontRef idx="minor">
+              <a:schemeClr val="lt1"/>
+            </a:fontRef>
+          </p:style>
+          <p:txBody>
+            <a:bodyPr spcFirstLastPara="0" vert="horz" wrap="square" lIns="107130" tIns="107130" rIns="107130" bIns="107130" numCol="1" spcCol="1270" anchor="ctr" anchorCtr="0">
+              <a:noAutofit/>
+            </a:bodyPr>
+            <a:lstStyle/>
+            <a:p>
+              <a:pPr lvl="0" algn="ctr" defTabSz="755650">
+                <a:lnSpc>
+                  <a:spcPct val="90000"/>
+                </a:lnSpc>
+                <a:spcBef>
+                  <a:spcPct val="0"/>
+                </a:spcBef>
+                <a:spcAft>
+                  <a:spcPct val="35000"/>
+                </a:spcAft>
+              </a:pPr>
+              <a:r>
+                <a:rPr lang="en-US" sz="1700" kern="1200" dirty="0" smtClean="0">
+                  <a:solidFill>
+                    <a:srgbClr val="FFC000"/>
+                  </a:solidFill>
+                </a:rPr>
+                <a:t>JANA</a:t>
+              </a:r>
+              <a:r>
+                <a:rPr lang="en-US" sz="1700" kern="1200" dirty="0" smtClean="0"/>
+                <a:t> Users</a:t>
+              </a:r>
+              <a:endParaRPr lang="en-US" sz="1700" kern="1200" dirty="0"/>
+            </a:p>
+          </p:txBody>
+        </p:sp>
+        <p:sp>
+          <p:nvSpPr>
+            <p:cNvPr id="17" name="Полилиния 16"/>
+            <p:cNvSpPr/>
+            <p:nvPr/>
+          </p:nvSpPr>
+          <p:spPr>
+            <a:xfrm>
+              <a:off x="3068005" y="1972941"/>
+              <a:ext cx="3465188" cy="3465188"/>
+            </a:xfrm>
+            <a:custGeom>
+              <a:avLst/>
+              <a:gdLst/>
+              <a:ahLst/>
+              <a:cxnLst/>
+              <a:rect l="0" t="0" r="0" b="0"/>
+              <a:pathLst>
+                <a:path>
+                  <a:moveTo>
+                    <a:pt x="302072" y="755102"/>
+                  </a:moveTo>
+                  <a:arcTo wR="1732594" hR="1732594" stAng="12860714" swAng="1959991"/>
+                </a:path>
+              </a:pathLst>
+            </a:custGeom>
+            <a:noFill/>
+          </p:spPr>
+          <p:style>
+            <a:lnRef idx="1">
+              <a:schemeClr val="accent1">
+                <a:hueOff val="0"/>
+                <a:satOff val="0"/>
+                <a:lumOff val="0"/>
+                <a:alphaOff val="0"/>
+              </a:schemeClr>
+            </a:lnRef>
+            <a:fillRef idx="0">
+              <a:scrgbClr r="0" g="0" b="0"/>
+            </a:fillRef>
+            <a:effectRef idx="0">
+              <a:schemeClr val="accent1">
+                <a:hueOff val="0"/>
+                <a:satOff val="0"/>
+                <a:lumOff val="0"/>
+                <a:alphaOff val="0"/>
+              </a:schemeClr>
+            </a:effectRef>
+            <a:fontRef idx="minor">
+              <a:schemeClr val="tx1">
+                <a:hueOff val="0"/>
+                <a:satOff val="0"/>
+                <a:lumOff val="0"/>
+                <a:alphaOff val="0"/>
+              </a:schemeClr>
+            </a:fontRef>
+          </p:style>
+        </p:sp>
+      </p:grpSp>
       <p:sp>
         <p:nvSpPr>
           <p:cNvPr id="2" name="Title 1"/>
@@ -47952,7 +45936,7 @@
           <a:p>
             <a:fld id="{C0E09063-1CF3-4C9D-93FA-6682A4D1B2B7}" type="datetime1">
               <a:rPr lang="en-US" smtClean="0"/>
-              <a:t>10/6/2011</a:t>
+              <a:t>6/12/2012</a:t>
             </a:fld>
             <a:endParaRPr lang="ru-RU"/>
           </a:p>
@@ -47999,41 +45983,19 @@
             </a:avLst>
           </a:prstGeom>
           <a:solidFill>
-            <a:srgbClr val="C00000"/>
+            <a:srgbClr val="FF0000"/>
           </a:solidFill>
-          <a:ln>
-            <a:noFill/>
-          </a:ln>
-          <a:effectLst>
-            <a:outerShdw blurRad="44450" dist="27940" dir="5400000" algn="ctr">
-              <a:srgbClr val="000000">
-                <a:alpha val="32000"/>
-              </a:srgbClr>
-            </a:outerShdw>
-          </a:effectLst>
-          <a:scene3d>
-            <a:camera prst="orthographicFront">
-              <a:rot lat="0" lon="0" rev="0"/>
-            </a:camera>
-            <a:lightRig rig="balanced" dir="t">
-              <a:rot lat="0" lon="0" rev="8700000"/>
-            </a:lightRig>
-          </a:scene3d>
-          <a:sp3d>
-            <a:bevelT w="190500" h="38100"/>
-          </a:sp3d>
+          <a:ln/>
         </p:spPr>
         <p:style>
-          <a:lnRef idx="2">
-            <a:schemeClr val="accent1">
-              <a:shade val="50000"/>
-            </a:schemeClr>
+          <a:lnRef idx="0">
+            <a:schemeClr val="accent2"/>
           </a:lnRef>
-          <a:fillRef idx="1">
-            <a:schemeClr val="accent1"/>
+          <a:fillRef idx="3">
+            <a:schemeClr val="accent2"/>
           </a:fillRef>
-          <a:effectRef idx="0">
-            <a:schemeClr val="accent1"/>
+          <a:effectRef idx="3">
+            <a:schemeClr val="accent2"/>
           </a:effectRef>
           <a:fontRef idx="minor">
             <a:schemeClr val="lt1"/>
@@ -48045,42 +46007,13 @@
           <a:p>
             <a:pPr algn="ctr"/>
             <a:r>
-              <a:rPr lang="en-US" dirty="0" smtClean="0"/>
+              <a:rPr lang="en-US" sz="2800" dirty="0" smtClean="0"/>
               <a:t>CCDB</a:t>
             </a:r>
-          </a:p>
-          <a:p>
-            <a:pPr algn="ctr"/>
-            <a:r>
-              <a:rPr lang="en-US" dirty="0" smtClean="0"/>
-              <a:t>Package</a:t>
-            </a:r>
-            <a:endParaRPr lang="en-US" dirty="0"/>
+            <a:endParaRPr lang="en-US" sz="2800" dirty="0"/>
           </a:p>
         </p:txBody>
       </p:sp>
-      <p:graphicFrame>
-        <p:nvGraphicFramePr>
-          <p:cNvPr id="18" name="Diagram 17"/>
-          <p:cNvGraphicFramePr/>
-          <p:nvPr>
-            <p:extLst>
-              <p:ext uri="{D42A27DB-BD31-4B8C-83A1-F6EECF244321}">
-                <p14:modId xmlns:p14="http://schemas.microsoft.com/office/powerpoint/2010/main" val="3766616406"/>
-              </p:ext>
-            </p:extLst>
-          </p:nvPr>
-        </p:nvGraphicFramePr>
-        <p:xfrm>
-          <a:off x="1752600" y="1536700"/>
-          <a:ext cx="6096000" cy="4064000"/>
-        </p:xfrm>
-        <a:graphic>
-          <a:graphicData uri="http://schemas.openxmlformats.org/drawingml/2006/diagram">
-            <dgm:relIds xmlns:dgm="http://schemas.openxmlformats.org/drawingml/2006/diagram" xmlns:r="http://schemas.openxmlformats.org/officeDocument/2006/relationships" r:dm="rId2" r:lo="rId3" r:qs="rId4" r:cs="rId5"/>
-          </a:graphicData>
-        </a:graphic>
-      </p:graphicFrame>
       <p:pic>
         <p:nvPicPr>
           <p:cNvPr id="12" name="Picture 2" descr="http://www.youthedesigner.com/wp-content/uploads/2008/05/free-vector-images-globe-icon-set.jpg"/>
@@ -48090,7 +46023,7 @@
           <p:nvPr/>
         </p:nvPicPr>
         <p:blipFill rotWithShape="1">
-          <a:blip r:embed="rId7" cstate="print">
+          <a:blip r:embed="rId2" cstate="print">
             <a:extLst>
               <a:ext uri="{28A0092B-C50C-407E-A947-70E740481C1C}">
                 <a14:useLocalDpi xmlns:a14="http://schemas.microsoft.com/office/drawing/2010/main" val="0"/>
@@ -48129,7 +46062,7 @@
           <p:nvPr/>
         </p:nvPicPr>
         <p:blipFill>
-          <a:blip r:embed="rId8" cstate="print">
+          <a:blip r:embed="rId3" cstate="print">
             <a:extLst>
               <a:ext uri="{28A0092B-C50C-407E-A947-70E740481C1C}">
                 <a14:useLocalDpi xmlns:a14="http://schemas.microsoft.com/office/drawing/2010/main" val="0"/>
@@ -48322,7 +46255,7 @@
           <a:p>
             <a:fld id="{BC988F4E-721E-4598-AC35-CD185956DAEE}" type="datetime1">
               <a:rPr lang="en-US" smtClean="0"/>
-              <a:t>10/6/2011</a:t>
+              <a:t>6/12/2012</a:t>
             </a:fld>
             <a:endParaRPr lang="ru-RU"/>
           </a:p>
@@ -48403,7 +46336,7 @@
         <p:spPr>
           <a:xfrm>
             <a:off x="3293765" y="3232575"/>
-            <a:ext cx="2506184" cy="1720425"/>
+            <a:ext cx="2506184" cy="584774"/>
           </a:xfrm>
           <a:prstGeom prst="rect">
             <a:avLst/>
@@ -48456,7 +46389,7 @@
             <a:pPr algn="ctr"/>
             <a:r>
               <a:rPr lang="en-US" dirty="0" smtClean="0"/>
-              <a:t>Low level API</a:t>
+              <a:t>Low level C++ API</a:t>
             </a:r>
             <a:endParaRPr lang="ru-RU" dirty="0"/>
           </a:p>
@@ -48470,8 +46403,8 @@
         </p:nvSpPr>
         <p:spPr>
           <a:xfrm>
-            <a:off x="3311254" y="5715000"/>
-            <a:ext cx="2506184" cy="609600"/>
+            <a:off x="3311254" y="4409460"/>
+            <a:ext cx="2506184" cy="695940"/>
           </a:xfrm>
           <a:prstGeom prst="flowChartMagneticDisk">
             <a:avLst/>
@@ -48503,7 +46436,7 @@
             <a:pPr algn="ctr"/>
             <a:r>
               <a:rPr lang="en-US" sz="1600" dirty="0" smtClean="0"/>
-              <a:t>Data</a:t>
+              <a:t>Data storage</a:t>
             </a:r>
             <a:endParaRPr lang="ru-RU" sz="1600" dirty="0"/>
           </a:p>
@@ -48517,7 +46450,7 @@
         </p:nvSpPr>
         <p:spPr>
           <a:xfrm>
-            <a:off x="4394457" y="5049811"/>
+            <a:off x="4411946" y="3876060"/>
             <a:ext cx="304800" cy="533400"/>
           </a:xfrm>
           <a:prstGeom prst="upDownArrow">
@@ -48560,7 +46493,7 @@
         </p:nvSpPr>
         <p:spPr>
           <a:xfrm>
-            <a:off x="6553198" y="3232574"/>
+            <a:off x="6553197" y="3226649"/>
             <a:ext cx="1054519" cy="584775"/>
           </a:xfrm>
           <a:prstGeom prst="rect">
@@ -49042,7 +46975,7 @@
           <a:p>
             <a:fld id="{C0E09063-1CF3-4C9D-93FA-6682A4D1B2B7}" type="datetime1">
               <a:rPr lang="en-US" smtClean="0"/>
-              <a:t>10/6/2011</a:t>
+              <a:t>6/12/2012</a:t>
             </a:fld>
             <a:endParaRPr lang="ru-RU"/>
           </a:p>
@@ -50589,7 +48522,7 @@
           <a:p>
             <a:fld id="{C0E09063-1CF3-4C9D-93FA-6682A4D1B2B7}" type="datetime1">
               <a:rPr lang="en-US" smtClean="0"/>
-              <a:t>10/6/2011</a:t>
+              <a:t>6/12/2012</a:t>
             </a:fld>
             <a:endParaRPr lang="ru-RU"/>
           </a:p>

</xml_diff>